<commit_message>
revisão pptss Banco de Dados CRUD python
</commit_message>
<xml_diff>
--- a/01 Classes/Aula 12, 13 Programação Python - Banco de Dados.pptx
+++ b/01 Classes/Aula 12, 13 Programação Python - Banco de Dados.pptx
@@ -5,17 +5,23 @@
     <p:sldMasterId id="2147483671" r:id="rId1"/>
   </p:sldMasterIdLst>
   <p:notesMasterIdLst>
-    <p:notesMasterId r:id="rId10"/>
+    <p:notesMasterId r:id="rId16"/>
   </p:notesMasterIdLst>
   <p:sldIdLst>
     <p:sldId id="256" r:id="rId2"/>
     <p:sldId id="291" r:id="rId3"/>
     <p:sldId id="331" r:id="rId4"/>
-    <p:sldId id="323" r:id="rId5"/>
-    <p:sldId id="333" r:id="rId6"/>
-    <p:sldId id="334" r:id="rId7"/>
-    <p:sldId id="337" r:id="rId8"/>
-    <p:sldId id="309" r:id="rId9"/>
+    <p:sldId id="338" r:id="rId5"/>
+    <p:sldId id="339" r:id="rId6"/>
+    <p:sldId id="340" r:id="rId7"/>
+    <p:sldId id="341" r:id="rId8"/>
+    <p:sldId id="342" r:id="rId9"/>
+    <p:sldId id="343" r:id="rId10"/>
+    <p:sldId id="323" r:id="rId11"/>
+    <p:sldId id="333" r:id="rId12"/>
+    <p:sldId id="334" r:id="rId13"/>
+    <p:sldId id="337" r:id="rId14"/>
+    <p:sldId id="309" r:id="rId15"/>
   </p:sldIdLst>
   <p:sldSz cx="9144000" cy="5143500" type="screen16x9"/>
   <p:notesSz cx="6858000" cy="9144000"/>
@@ -374,6 +380,138 @@
 </p:notes>
 </file>
 
+<file path=ppt/notesSlides/notesSlide10.xml><?xml version="1.0" encoding="utf-8"?>
+<p:notes xmlns:a="http://schemas.openxmlformats.org/drawingml/2006/main" xmlns:r="http://schemas.openxmlformats.org/officeDocument/2006/relationships" xmlns:p="http://schemas.openxmlformats.org/presentationml/2006/main">
+  <p:cSld>
+    <p:spTree>
+      <p:nvGrpSpPr>
+        <p:cNvPr id="1" name=""/>
+        <p:cNvGrpSpPr/>
+        <p:nvPr/>
+      </p:nvGrpSpPr>
+      <p:grpSpPr>
+        <a:xfrm>
+          <a:off x="0" y="0"/>
+          <a:ext cx="0" cy="0"/>
+          <a:chOff x="0" y="0"/>
+          <a:chExt cx="0" cy="0"/>
+        </a:xfrm>
+      </p:grpSpPr>
+      <p:sp>
+        <p:nvSpPr>
+          <p:cNvPr id="2" name="Espaço Reservado para Imagem de Slide 1"/>
+          <p:cNvSpPr>
+            <a:spLocks noGrp="1" noRot="1" noChangeAspect="1"/>
+          </p:cNvSpPr>
+          <p:nvPr>
+            <p:ph type="sldImg"/>
+          </p:nvPr>
+        </p:nvSpPr>
+        <p:spPr>
+          <a:xfrm>
+            <a:off x="381000" y="685800"/>
+            <a:ext cx="6096000" cy="3429000"/>
+          </a:xfrm>
+        </p:spPr>
+      </p:sp>
+      <p:sp>
+        <p:nvSpPr>
+          <p:cNvPr id="3" name="Espaço Reservado para Anotações 2"/>
+          <p:cNvSpPr>
+            <a:spLocks noGrp="1"/>
+          </p:cNvSpPr>
+          <p:nvPr>
+            <p:ph type="body" idx="1"/>
+          </p:nvPr>
+        </p:nvSpPr>
+        <p:spPr/>
+        <p:txBody>
+          <a:bodyPr/>
+          <a:lstStyle/>
+          <a:p>
+            <a:endParaRPr lang="pt-BR" dirty="0"/>
+          </a:p>
+        </p:txBody>
+      </p:sp>
+    </p:spTree>
+    <p:extLst>
+      <p:ext uri="{BB962C8B-B14F-4D97-AF65-F5344CB8AC3E}">
+        <p14:creationId xmlns:p14="http://schemas.microsoft.com/office/powerpoint/2010/main" val="2296249050"/>
+      </p:ext>
+    </p:extLst>
+  </p:cSld>
+  <p:clrMapOvr>
+    <a:masterClrMapping/>
+  </p:clrMapOvr>
+</p:notes>
+</file>
+
+<file path=ppt/notesSlides/notesSlide11.xml><?xml version="1.0" encoding="utf-8"?>
+<p:notes xmlns:a="http://schemas.openxmlformats.org/drawingml/2006/main" xmlns:r="http://schemas.openxmlformats.org/officeDocument/2006/relationships" xmlns:p="http://schemas.openxmlformats.org/presentationml/2006/main">
+  <p:cSld>
+    <p:spTree>
+      <p:nvGrpSpPr>
+        <p:cNvPr id="1" name=""/>
+        <p:cNvGrpSpPr/>
+        <p:nvPr/>
+      </p:nvGrpSpPr>
+      <p:grpSpPr>
+        <a:xfrm>
+          <a:off x="0" y="0"/>
+          <a:ext cx="0" cy="0"/>
+          <a:chOff x="0" y="0"/>
+          <a:chExt cx="0" cy="0"/>
+        </a:xfrm>
+      </p:grpSpPr>
+      <p:sp>
+        <p:nvSpPr>
+          <p:cNvPr id="2" name="Espaço Reservado para Imagem de Slide 1"/>
+          <p:cNvSpPr>
+            <a:spLocks noGrp="1" noRot="1" noChangeAspect="1"/>
+          </p:cNvSpPr>
+          <p:nvPr>
+            <p:ph type="sldImg"/>
+          </p:nvPr>
+        </p:nvSpPr>
+        <p:spPr>
+          <a:xfrm>
+            <a:off x="381000" y="685800"/>
+            <a:ext cx="6096000" cy="3429000"/>
+          </a:xfrm>
+        </p:spPr>
+      </p:sp>
+      <p:sp>
+        <p:nvSpPr>
+          <p:cNvPr id="3" name="Espaço Reservado para Anotações 2"/>
+          <p:cNvSpPr>
+            <a:spLocks noGrp="1"/>
+          </p:cNvSpPr>
+          <p:nvPr>
+            <p:ph type="body" idx="1"/>
+          </p:nvPr>
+        </p:nvSpPr>
+        <p:spPr/>
+        <p:txBody>
+          <a:bodyPr/>
+          <a:lstStyle/>
+          <a:p>
+            <a:endParaRPr lang="pt-BR" dirty="0"/>
+          </a:p>
+        </p:txBody>
+      </p:sp>
+    </p:spTree>
+    <p:extLst>
+      <p:ext uri="{BB962C8B-B14F-4D97-AF65-F5344CB8AC3E}">
+        <p14:creationId xmlns:p14="http://schemas.microsoft.com/office/powerpoint/2010/main" val="4290351292"/>
+      </p:ext>
+    </p:extLst>
+  </p:cSld>
+  <p:clrMapOvr>
+    <a:masterClrMapping/>
+  </p:clrMapOvr>
+</p:notes>
+</file>
+
 <file path=ppt/notesSlides/notesSlide2.xml><?xml version="1.0" encoding="utf-8"?>
 <p:notes xmlns:a="http://schemas.openxmlformats.org/drawingml/2006/main" xmlns:r="http://schemas.openxmlformats.org/officeDocument/2006/relationships" xmlns:p="http://schemas.openxmlformats.org/presentationml/2006/main">
   <p:cSld>
@@ -430,7 +568,7 @@
     </p:spTree>
     <p:extLst>
       <p:ext uri="{BB962C8B-B14F-4D97-AF65-F5344CB8AC3E}">
-        <p14:creationId xmlns:p14="http://schemas.microsoft.com/office/powerpoint/2010/main" val="2709569597"/>
+        <p14:creationId xmlns:p14="http://schemas.microsoft.com/office/powerpoint/2010/main" val="2069460881"/>
       </p:ext>
     </p:extLst>
   </p:cSld>
@@ -496,7 +634,7 @@
     </p:spTree>
     <p:extLst>
       <p:ext uri="{BB962C8B-B14F-4D97-AF65-F5344CB8AC3E}">
-        <p14:creationId xmlns:p14="http://schemas.microsoft.com/office/powerpoint/2010/main" val="585304384"/>
+        <p14:creationId xmlns:p14="http://schemas.microsoft.com/office/powerpoint/2010/main" val="3253851464"/>
       </p:ext>
     </p:extLst>
   </p:cSld>
@@ -562,7 +700,7 @@
     </p:spTree>
     <p:extLst>
       <p:ext uri="{BB962C8B-B14F-4D97-AF65-F5344CB8AC3E}">
-        <p14:creationId xmlns:p14="http://schemas.microsoft.com/office/powerpoint/2010/main" val="2296249050"/>
+        <p14:creationId xmlns:p14="http://schemas.microsoft.com/office/powerpoint/2010/main" val="355499387"/>
       </p:ext>
     </p:extLst>
   </p:cSld>
@@ -628,7 +766,271 @@
     </p:spTree>
     <p:extLst>
       <p:ext uri="{BB962C8B-B14F-4D97-AF65-F5344CB8AC3E}">
-        <p14:creationId xmlns:p14="http://schemas.microsoft.com/office/powerpoint/2010/main" val="4290351292"/>
+        <p14:creationId xmlns:p14="http://schemas.microsoft.com/office/powerpoint/2010/main" val="152022818"/>
+      </p:ext>
+    </p:extLst>
+  </p:cSld>
+  <p:clrMapOvr>
+    <a:masterClrMapping/>
+  </p:clrMapOvr>
+</p:notes>
+</file>
+
+<file path=ppt/notesSlides/notesSlide6.xml><?xml version="1.0" encoding="utf-8"?>
+<p:notes xmlns:a="http://schemas.openxmlformats.org/drawingml/2006/main" xmlns:r="http://schemas.openxmlformats.org/officeDocument/2006/relationships" xmlns:p="http://schemas.openxmlformats.org/presentationml/2006/main">
+  <p:cSld>
+    <p:spTree>
+      <p:nvGrpSpPr>
+        <p:cNvPr id="1" name=""/>
+        <p:cNvGrpSpPr/>
+        <p:nvPr/>
+      </p:nvGrpSpPr>
+      <p:grpSpPr>
+        <a:xfrm>
+          <a:off x="0" y="0"/>
+          <a:ext cx="0" cy="0"/>
+          <a:chOff x="0" y="0"/>
+          <a:chExt cx="0" cy="0"/>
+        </a:xfrm>
+      </p:grpSpPr>
+      <p:sp>
+        <p:nvSpPr>
+          <p:cNvPr id="2" name="Espaço Reservado para Imagem de Slide 1"/>
+          <p:cNvSpPr>
+            <a:spLocks noGrp="1" noRot="1" noChangeAspect="1"/>
+          </p:cNvSpPr>
+          <p:nvPr>
+            <p:ph type="sldImg"/>
+          </p:nvPr>
+        </p:nvSpPr>
+        <p:spPr>
+          <a:xfrm>
+            <a:off x="381000" y="685800"/>
+            <a:ext cx="6096000" cy="3429000"/>
+          </a:xfrm>
+        </p:spPr>
+      </p:sp>
+      <p:sp>
+        <p:nvSpPr>
+          <p:cNvPr id="3" name="Espaço Reservado para Anotações 2"/>
+          <p:cNvSpPr>
+            <a:spLocks noGrp="1"/>
+          </p:cNvSpPr>
+          <p:nvPr>
+            <p:ph type="body" idx="1"/>
+          </p:nvPr>
+        </p:nvSpPr>
+        <p:spPr/>
+        <p:txBody>
+          <a:bodyPr/>
+          <a:lstStyle/>
+          <a:p>
+            <a:endParaRPr lang="pt-BR" dirty="0"/>
+          </a:p>
+        </p:txBody>
+      </p:sp>
+    </p:spTree>
+    <p:extLst>
+      <p:ext uri="{BB962C8B-B14F-4D97-AF65-F5344CB8AC3E}">
+        <p14:creationId xmlns:p14="http://schemas.microsoft.com/office/powerpoint/2010/main" val="103641948"/>
+      </p:ext>
+    </p:extLst>
+  </p:cSld>
+  <p:clrMapOvr>
+    <a:masterClrMapping/>
+  </p:clrMapOvr>
+</p:notes>
+</file>
+
+<file path=ppt/notesSlides/notesSlide7.xml><?xml version="1.0" encoding="utf-8"?>
+<p:notes xmlns:a="http://schemas.openxmlformats.org/drawingml/2006/main" xmlns:r="http://schemas.openxmlformats.org/officeDocument/2006/relationships" xmlns:p="http://schemas.openxmlformats.org/presentationml/2006/main">
+  <p:cSld>
+    <p:spTree>
+      <p:nvGrpSpPr>
+        <p:cNvPr id="1" name=""/>
+        <p:cNvGrpSpPr/>
+        <p:nvPr/>
+      </p:nvGrpSpPr>
+      <p:grpSpPr>
+        <a:xfrm>
+          <a:off x="0" y="0"/>
+          <a:ext cx="0" cy="0"/>
+          <a:chOff x="0" y="0"/>
+          <a:chExt cx="0" cy="0"/>
+        </a:xfrm>
+      </p:grpSpPr>
+      <p:sp>
+        <p:nvSpPr>
+          <p:cNvPr id="2" name="Espaço Reservado para Imagem de Slide 1"/>
+          <p:cNvSpPr>
+            <a:spLocks noGrp="1" noRot="1" noChangeAspect="1"/>
+          </p:cNvSpPr>
+          <p:nvPr>
+            <p:ph type="sldImg"/>
+          </p:nvPr>
+        </p:nvSpPr>
+        <p:spPr>
+          <a:xfrm>
+            <a:off x="381000" y="685800"/>
+            <a:ext cx="6096000" cy="3429000"/>
+          </a:xfrm>
+        </p:spPr>
+      </p:sp>
+      <p:sp>
+        <p:nvSpPr>
+          <p:cNvPr id="3" name="Espaço Reservado para Anotações 2"/>
+          <p:cNvSpPr>
+            <a:spLocks noGrp="1"/>
+          </p:cNvSpPr>
+          <p:nvPr>
+            <p:ph type="body" idx="1"/>
+          </p:nvPr>
+        </p:nvSpPr>
+        <p:spPr/>
+        <p:txBody>
+          <a:bodyPr/>
+          <a:lstStyle/>
+          <a:p>
+            <a:endParaRPr lang="pt-BR" dirty="0"/>
+          </a:p>
+        </p:txBody>
+      </p:sp>
+    </p:spTree>
+    <p:extLst>
+      <p:ext uri="{BB962C8B-B14F-4D97-AF65-F5344CB8AC3E}">
+        <p14:creationId xmlns:p14="http://schemas.microsoft.com/office/powerpoint/2010/main" val="1104284737"/>
+      </p:ext>
+    </p:extLst>
+  </p:cSld>
+  <p:clrMapOvr>
+    <a:masterClrMapping/>
+  </p:clrMapOvr>
+</p:notes>
+</file>
+
+<file path=ppt/notesSlides/notesSlide8.xml><?xml version="1.0" encoding="utf-8"?>
+<p:notes xmlns:a="http://schemas.openxmlformats.org/drawingml/2006/main" xmlns:r="http://schemas.openxmlformats.org/officeDocument/2006/relationships" xmlns:p="http://schemas.openxmlformats.org/presentationml/2006/main">
+  <p:cSld>
+    <p:spTree>
+      <p:nvGrpSpPr>
+        <p:cNvPr id="1" name=""/>
+        <p:cNvGrpSpPr/>
+        <p:nvPr/>
+      </p:nvGrpSpPr>
+      <p:grpSpPr>
+        <a:xfrm>
+          <a:off x="0" y="0"/>
+          <a:ext cx="0" cy="0"/>
+          <a:chOff x="0" y="0"/>
+          <a:chExt cx="0" cy="0"/>
+        </a:xfrm>
+      </p:grpSpPr>
+      <p:sp>
+        <p:nvSpPr>
+          <p:cNvPr id="2" name="Espaço Reservado para Imagem de Slide 1"/>
+          <p:cNvSpPr>
+            <a:spLocks noGrp="1" noRot="1" noChangeAspect="1"/>
+          </p:cNvSpPr>
+          <p:nvPr>
+            <p:ph type="sldImg"/>
+          </p:nvPr>
+        </p:nvSpPr>
+        <p:spPr>
+          <a:xfrm>
+            <a:off x="381000" y="685800"/>
+            <a:ext cx="6096000" cy="3429000"/>
+          </a:xfrm>
+        </p:spPr>
+      </p:sp>
+      <p:sp>
+        <p:nvSpPr>
+          <p:cNvPr id="3" name="Espaço Reservado para Anotações 2"/>
+          <p:cNvSpPr>
+            <a:spLocks noGrp="1"/>
+          </p:cNvSpPr>
+          <p:nvPr>
+            <p:ph type="body" idx="1"/>
+          </p:nvPr>
+        </p:nvSpPr>
+        <p:spPr/>
+        <p:txBody>
+          <a:bodyPr/>
+          <a:lstStyle/>
+          <a:p>
+            <a:endParaRPr lang="pt-BR" dirty="0"/>
+          </a:p>
+        </p:txBody>
+      </p:sp>
+    </p:spTree>
+    <p:extLst>
+      <p:ext uri="{BB962C8B-B14F-4D97-AF65-F5344CB8AC3E}">
+        <p14:creationId xmlns:p14="http://schemas.microsoft.com/office/powerpoint/2010/main" val="2709569597"/>
+      </p:ext>
+    </p:extLst>
+  </p:cSld>
+  <p:clrMapOvr>
+    <a:masterClrMapping/>
+  </p:clrMapOvr>
+</p:notes>
+</file>
+
+<file path=ppt/notesSlides/notesSlide9.xml><?xml version="1.0" encoding="utf-8"?>
+<p:notes xmlns:a="http://schemas.openxmlformats.org/drawingml/2006/main" xmlns:r="http://schemas.openxmlformats.org/officeDocument/2006/relationships" xmlns:p="http://schemas.openxmlformats.org/presentationml/2006/main">
+  <p:cSld>
+    <p:spTree>
+      <p:nvGrpSpPr>
+        <p:cNvPr id="1" name=""/>
+        <p:cNvGrpSpPr/>
+        <p:nvPr/>
+      </p:nvGrpSpPr>
+      <p:grpSpPr>
+        <a:xfrm>
+          <a:off x="0" y="0"/>
+          <a:ext cx="0" cy="0"/>
+          <a:chOff x="0" y="0"/>
+          <a:chExt cx="0" cy="0"/>
+        </a:xfrm>
+      </p:grpSpPr>
+      <p:sp>
+        <p:nvSpPr>
+          <p:cNvPr id="2" name="Espaço Reservado para Imagem de Slide 1"/>
+          <p:cNvSpPr>
+            <a:spLocks noGrp="1" noRot="1" noChangeAspect="1"/>
+          </p:cNvSpPr>
+          <p:nvPr>
+            <p:ph type="sldImg"/>
+          </p:nvPr>
+        </p:nvSpPr>
+        <p:spPr>
+          <a:xfrm>
+            <a:off x="381000" y="685800"/>
+            <a:ext cx="6096000" cy="3429000"/>
+          </a:xfrm>
+        </p:spPr>
+      </p:sp>
+      <p:sp>
+        <p:nvSpPr>
+          <p:cNvPr id="3" name="Espaço Reservado para Anotações 2"/>
+          <p:cNvSpPr>
+            <a:spLocks noGrp="1"/>
+          </p:cNvSpPr>
+          <p:nvPr>
+            <p:ph type="body" idx="1"/>
+          </p:nvPr>
+        </p:nvSpPr>
+        <p:spPr/>
+        <p:txBody>
+          <a:bodyPr/>
+          <a:lstStyle/>
+          <a:p>
+            <a:endParaRPr lang="pt-BR" dirty="0"/>
+          </a:p>
+        </p:txBody>
+      </p:sp>
+    </p:spTree>
+    <p:extLst>
+      <p:ext uri="{BB962C8B-B14F-4D97-AF65-F5344CB8AC3E}">
+        <p14:creationId xmlns:p14="http://schemas.microsoft.com/office/powerpoint/2010/main" val="585304384"/>
       </p:ext>
     </p:extLst>
   </p:cSld>
@@ -777,7 +1179,7 @@
           <a:p>
             <a:fld id="{48A87A34-81AB-432B-8DAE-1953F412C126}" type="datetimeFigureOut">
               <a:rPr lang="en-US" smtClean="0"/>
-              <a:t>5/14/2022</a:t>
+              <a:t>5/16/2022</a:t>
             </a:fld>
             <a:endParaRPr lang="en-US" dirty="0"/>
           </a:p>
@@ -988,7 +1390,7 @@
           <a:p>
             <a:fld id="{48A87A34-81AB-432B-8DAE-1953F412C126}" type="datetimeFigureOut">
               <a:rPr lang="en-US" smtClean="0"/>
-              <a:t>5/14/2022</a:t>
+              <a:t>5/16/2022</a:t>
             </a:fld>
             <a:endParaRPr lang="en-US" dirty="0"/>
           </a:p>
@@ -1203,7 +1605,7 @@
           <a:p>
             <a:fld id="{48A87A34-81AB-432B-8DAE-1953F412C126}" type="datetimeFigureOut">
               <a:rPr lang="en-US" smtClean="0"/>
-              <a:t>5/14/2022</a:t>
+              <a:t>5/16/2022</a:t>
             </a:fld>
             <a:endParaRPr lang="en-US" dirty="0"/>
           </a:p>
@@ -1571,7 +1973,7 @@
           <a:p>
             <a:fld id="{48A87A34-81AB-432B-8DAE-1953F412C126}" type="datetimeFigureOut">
               <a:rPr lang="en-US" smtClean="0"/>
-              <a:t>5/14/2022</a:t>
+              <a:t>5/16/2022</a:t>
             </a:fld>
             <a:endParaRPr lang="en-US" dirty="0"/>
           </a:p>
@@ -1850,7 +2252,7 @@
           <a:p>
             <a:fld id="{48A87A34-81AB-432B-8DAE-1953F412C126}" type="datetimeFigureOut">
               <a:rPr lang="en-US" smtClean="0"/>
-              <a:t>5/14/2022</a:t>
+              <a:t>5/16/2022</a:t>
             </a:fld>
             <a:endParaRPr lang="en-US" dirty="0"/>
           </a:p>
@@ -2118,7 +2520,7 @@
           <a:p>
             <a:fld id="{48A87A34-81AB-432B-8DAE-1953F412C126}" type="datetimeFigureOut">
               <a:rPr lang="en-US" smtClean="0"/>
-              <a:t>5/14/2022</a:t>
+              <a:t>5/16/2022</a:t>
             </a:fld>
             <a:endParaRPr lang="en-US" dirty="0"/>
           </a:p>
@@ -2534,7 +2936,7 @@
           <a:p>
             <a:fld id="{48A87A34-81AB-432B-8DAE-1953F412C126}" type="datetimeFigureOut">
               <a:rPr lang="en-US" smtClean="0"/>
-              <a:t>5/14/2022</a:t>
+              <a:t>5/16/2022</a:t>
             </a:fld>
             <a:endParaRPr lang="en-US" dirty="0"/>
           </a:p>
@@ -2683,7 +3085,7 @@
           <a:p>
             <a:fld id="{48A87A34-81AB-432B-8DAE-1953F412C126}" type="datetimeFigureOut">
               <a:rPr lang="en-US" smtClean="0"/>
-              <a:t>5/14/2022</a:t>
+              <a:t>5/16/2022</a:t>
             </a:fld>
             <a:endParaRPr lang="en-US" dirty="0"/>
           </a:p>
@@ -2809,7 +3211,7 @@
           <a:p>
             <a:fld id="{48A87A34-81AB-432B-8DAE-1953F412C126}" type="datetimeFigureOut">
               <a:rPr lang="en-US" smtClean="0"/>
-              <a:t>5/14/2022</a:t>
+              <a:t>5/16/2022</a:t>
             </a:fld>
             <a:endParaRPr lang="en-US" dirty="0"/>
           </a:p>
@@ -3060,7 +3462,7 @@
           <a:p>
             <a:fld id="{48A87A34-81AB-432B-8DAE-1953F412C126}" type="datetimeFigureOut">
               <a:rPr lang="en-US" smtClean="0"/>
-              <a:t>5/14/2022</a:t>
+              <a:t>5/16/2022</a:t>
             </a:fld>
             <a:endParaRPr lang="en-US" dirty="0"/>
           </a:p>
@@ -3506,7 +3908,7 @@
             <a:fld id="{48A87A34-81AB-432B-8DAE-1953F412C126}" type="datetimeFigureOut">
               <a:rPr lang="en-US" smtClean="0"/>
               <a:pPr/>
-              <a:t>5/14/2022</a:t>
+              <a:t>5/16/2022</a:t>
             </a:fld>
             <a:endParaRPr lang="en-US" dirty="0"/>
           </a:p>
@@ -3834,7 +4236,7 @@
             <a:fld id="{48A87A34-81AB-432B-8DAE-1953F412C126}" type="datetimeFigureOut">
               <a:rPr lang="en-US" smtClean="0"/>
               <a:pPr/>
-              <a:t>5/14/2022</a:t>
+              <a:t>5/16/2022</a:t>
             </a:fld>
             <a:endParaRPr lang="en-US" dirty="0"/>
           </a:p>
@@ -4859,6 +5261,1124 @@
 </p:sld>
 </file>
 
+<file path=ppt/slides/slide10.xml><?xml version="1.0" encoding="utf-8"?>
+<p:sld xmlns:a="http://schemas.openxmlformats.org/drawingml/2006/main" xmlns:r="http://schemas.openxmlformats.org/officeDocument/2006/relationships" xmlns:p="http://schemas.openxmlformats.org/presentationml/2006/main">
+  <p:cSld>
+    <p:spTree>
+      <p:nvGrpSpPr>
+        <p:cNvPr id="1" name=""/>
+        <p:cNvGrpSpPr/>
+        <p:nvPr/>
+      </p:nvGrpSpPr>
+      <p:grpSpPr>
+        <a:xfrm>
+          <a:off x="0" y="0"/>
+          <a:ext cx="0" cy="0"/>
+          <a:chOff x="0" y="0"/>
+          <a:chExt cx="0" cy="0"/>
+        </a:xfrm>
+      </p:grpSpPr>
+      <p:sp>
+        <p:nvSpPr>
+          <p:cNvPr id="6" name="Title 1"/>
+          <p:cNvSpPr>
+            <a:spLocks noGrp="1"/>
+          </p:cNvSpPr>
+          <p:nvPr>
+            <p:ph type="title"/>
+          </p:nvPr>
+        </p:nvSpPr>
+        <p:spPr/>
+        <p:txBody>
+          <a:bodyPr>
+            <a:normAutofit/>
+          </a:bodyPr>
+          <a:lstStyle/>
+          <a:p>
+            <a:r>
+              <a:rPr lang="en-US" b="1" dirty="0" err="1">
+                <a:solidFill>
+                  <a:srgbClr val="0070C0"/>
+                </a:solidFill>
+              </a:rPr>
+              <a:t>Leitura</a:t>
+            </a:r>
+            <a:r>
+              <a:rPr lang="en-US" b="1" dirty="0">
+                <a:solidFill>
+                  <a:srgbClr val="0070C0"/>
+                </a:solidFill>
+              </a:rPr>
+              <a:t> </a:t>
+            </a:r>
+            <a:r>
+              <a:rPr lang="en-US" b="1" dirty="0" err="1">
+                <a:solidFill>
+                  <a:srgbClr val="0070C0"/>
+                </a:solidFill>
+              </a:rPr>
+              <a:t>Específica</a:t>
+            </a:r>
+            <a:endParaRPr lang="en-US" b="1" dirty="0">
+              <a:solidFill>
+                <a:srgbClr val="0070C0"/>
+              </a:solidFill>
+            </a:endParaRPr>
+          </a:p>
+        </p:txBody>
+      </p:sp>
+      <p:sp>
+        <p:nvSpPr>
+          <p:cNvPr id="8" name="Text Placeholder 2"/>
+          <p:cNvSpPr>
+            <a:spLocks noGrp="1"/>
+          </p:cNvSpPr>
+          <p:nvPr>
+            <p:ph type="body" sz="half" idx="1"/>
+          </p:nvPr>
+        </p:nvSpPr>
+        <p:spPr>
+          <a:xfrm>
+            <a:off x="142865" y="1200151"/>
+            <a:ext cx="8865056" cy="3394472"/>
+          </a:xfrm>
+        </p:spPr>
+        <p:txBody>
+          <a:bodyPr>
+            <a:noAutofit/>
+          </a:bodyPr>
+          <a:lstStyle/>
+          <a:p>
+            <a:pPr marL="0" indent="0" algn="just">
+              <a:buNone/>
+            </a:pPr>
+            <a:endParaRPr lang="pt-BR" dirty="0">
+              <a:latin typeface="Times New Roman" panose="02020603050405020304" pitchFamily="18" charset="0"/>
+              <a:cs typeface="Times New Roman" panose="02020603050405020304" pitchFamily="18" charset="0"/>
+            </a:endParaRPr>
+          </a:p>
+          <a:p>
+            <a:pPr marL="0" indent="0" algn="just">
+              <a:buNone/>
+            </a:pPr>
+            <a:endParaRPr lang="pt-BR" dirty="0">
+              <a:latin typeface="Times New Roman" panose="02020603050405020304" pitchFamily="18" charset="0"/>
+              <a:cs typeface="Times New Roman" panose="02020603050405020304" pitchFamily="18" charset="0"/>
+            </a:endParaRPr>
+          </a:p>
+          <a:p>
+            <a:pPr marL="0" indent="0" algn="just">
+              <a:buNone/>
+            </a:pPr>
+            <a:r>
+              <a:rPr lang="pt-BR" dirty="0">
+                <a:latin typeface="Times New Roman" panose="02020603050405020304" pitchFamily="18" charset="0"/>
+                <a:cs typeface="Times New Roman" panose="02020603050405020304" pitchFamily="18" charset="0"/>
+              </a:rPr>
+              <a:t>[1] Site: </a:t>
+            </a:r>
+            <a:r>
+              <a:rPr lang="pt-BR" dirty="0">
+                <a:latin typeface="Times New Roman" panose="02020603050405020304" pitchFamily="18" charset="0"/>
+                <a:cs typeface="Times New Roman" panose="02020603050405020304" pitchFamily="18" charset="0"/>
+                <a:hlinkClick r:id="rId3"/>
+              </a:rPr>
+              <a:t>https://www.w3schools.com/sql/default.asp</a:t>
+            </a:r>
+            <a:endParaRPr lang="pt-BR" dirty="0">
+              <a:latin typeface="Times New Roman" panose="02020603050405020304" pitchFamily="18" charset="0"/>
+              <a:cs typeface="Times New Roman" panose="02020603050405020304" pitchFamily="18" charset="0"/>
+            </a:endParaRPr>
+          </a:p>
+          <a:p>
+            <a:pPr marL="0" indent="0" algn="just">
+              <a:buNone/>
+            </a:pPr>
+            <a:r>
+              <a:rPr lang="pt-BR" dirty="0">
+                <a:latin typeface="Times New Roman" panose="02020603050405020304" pitchFamily="18" charset="0"/>
+                <a:cs typeface="Times New Roman" panose="02020603050405020304" pitchFamily="18" charset="0"/>
+              </a:rPr>
+              <a:t> 	      </a:t>
+            </a:r>
+            <a:r>
+              <a:rPr lang="pt-BR" dirty="0">
+                <a:latin typeface="Times New Roman" panose="02020603050405020304" pitchFamily="18" charset="0"/>
+                <a:cs typeface="Times New Roman" panose="02020603050405020304" pitchFamily="18" charset="0"/>
+                <a:hlinkClick r:id="rId4"/>
+              </a:rPr>
+              <a:t>https://www.w3schools.com/sql/sql_intro.asp</a:t>
+            </a:r>
+            <a:endParaRPr lang="pt-BR" dirty="0">
+              <a:latin typeface="Times New Roman" panose="02020603050405020304" pitchFamily="18" charset="0"/>
+              <a:cs typeface="Times New Roman" panose="02020603050405020304" pitchFamily="18" charset="0"/>
+            </a:endParaRPr>
+          </a:p>
+          <a:p>
+            <a:pPr marL="0" indent="0" algn="just">
+              <a:buNone/>
+            </a:pPr>
+            <a:endParaRPr lang="pt-BR" dirty="0">
+              <a:latin typeface="Calibri" panose="020F0502020204030204" pitchFamily="34" charset="0"/>
+            </a:endParaRPr>
+          </a:p>
+        </p:txBody>
+      </p:sp>
+    </p:spTree>
+    <p:extLst>
+      <p:ext uri="{BB962C8B-B14F-4D97-AF65-F5344CB8AC3E}">
+        <p14:creationId xmlns:p14="http://schemas.microsoft.com/office/powerpoint/2010/main" val="2747596967"/>
+      </p:ext>
+    </p:extLst>
+  </p:cSld>
+  <p:clrMapOvr>
+    <a:masterClrMapping/>
+  </p:clrMapOvr>
+  <p:transition spd="med"/>
+</p:sld>
+</file>
+
+<file path=ppt/slides/slide11.xml><?xml version="1.0" encoding="utf-8"?>
+<p:sld xmlns:a="http://schemas.openxmlformats.org/drawingml/2006/main" xmlns:r="http://schemas.openxmlformats.org/officeDocument/2006/relationships" xmlns:p="http://schemas.openxmlformats.org/presentationml/2006/main">
+  <p:cSld>
+    <p:spTree>
+      <p:nvGrpSpPr>
+        <p:cNvPr id="1" name=""/>
+        <p:cNvGrpSpPr/>
+        <p:nvPr/>
+      </p:nvGrpSpPr>
+      <p:grpSpPr>
+        <a:xfrm>
+          <a:off x="0" y="0"/>
+          <a:ext cx="0" cy="0"/>
+          <a:chOff x="0" y="0"/>
+          <a:chExt cx="0" cy="0"/>
+        </a:xfrm>
+      </p:grpSpPr>
+      <p:sp>
+        <p:nvSpPr>
+          <p:cNvPr id="6" name="Title 1"/>
+          <p:cNvSpPr>
+            <a:spLocks noGrp="1"/>
+          </p:cNvSpPr>
+          <p:nvPr>
+            <p:ph type="title"/>
+          </p:nvPr>
+        </p:nvSpPr>
+        <p:spPr/>
+        <p:txBody>
+          <a:bodyPr>
+            <a:normAutofit/>
+          </a:bodyPr>
+          <a:lstStyle/>
+          <a:p>
+            <a:r>
+              <a:rPr lang="en-US" b="1" dirty="0" err="1">
+                <a:solidFill>
+                  <a:srgbClr val="0070C0"/>
+                </a:solidFill>
+              </a:rPr>
+              <a:t>Aprenda</a:t>
+            </a:r>
+            <a:r>
+              <a:rPr lang="en-US" b="1" dirty="0">
+                <a:solidFill>
+                  <a:srgbClr val="0070C0"/>
+                </a:solidFill>
+              </a:rPr>
+              <a:t>+</a:t>
+            </a:r>
+          </a:p>
+        </p:txBody>
+      </p:sp>
+      <p:sp>
+        <p:nvSpPr>
+          <p:cNvPr id="8" name="Text Placeholder 2"/>
+          <p:cNvSpPr>
+            <a:spLocks noGrp="1"/>
+          </p:cNvSpPr>
+          <p:nvPr>
+            <p:ph type="body" sz="half" idx="1"/>
+          </p:nvPr>
+        </p:nvSpPr>
+        <p:spPr>
+          <a:xfrm>
+            <a:off x="142865" y="1200151"/>
+            <a:ext cx="8865056" cy="3394472"/>
+          </a:xfrm>
+        </p:spPr>
+        <p:txBody>
+          <a:bodyPr>
+            <a:noAutofit/>
+          </a:bodyPr>
+          <a:lstStyle/>
+          <a:p>
+            <a:pPr marL="0" indent="0" algn="just">
+              <a:buNone/>
+            </a:pPr>
+            <a:endParaRPr lang="pt-BR" sz="2000" dirty="0">
+              <a:latin typeface="Times New Roman" panose="02020603050405020304" pitchFamily="18" charset="0"/>
+              <a:cs typeface="Times New Roman" panose="02020603050405020304" pitchFamily="18" charset="0"/>
+            </a:endParaRPr>
+          </a:p>
+          <a:p>
+            <a:pPr marL="0" indent="0" algn="just">
+              <a:buNone/>
+            </a:pPr>
+            <a:endParaRPr lang="pt-BR" sz="2000" dirty="0">
+              <a:latin typeface="Times New Roman" panose="02020603050405020304" pitchFamily="18" charset="0"/>
+              <a:cs typeface="Times New Roman" panose="02020603050405020304" pitchFamily="18" charset="0"/>
+            </a:endParaRPr>
+          </a:p>
+          <a:p>
+            <a:pPr marL="0" indent="0" algn="just">
+              <a:buNone/>
+            </a:pPr>
+            <a:r>
+              <a:rPr lang="pt-BR" sz="2000" dirty="0">
+                <a:latin typeface="Times New Roman" panose="02020603050405020304" pitchFamily="18" charset="0"/>
+                <a:cs typeface="Times New Roman" panose="02020603050405020304" pitchFamily="18" charset="0"/>
+              </a:rPr>
+              <a:t>[2] </a:t>
+            </a:r>
+            <a:r>
+              <a:rPr lang="pt-BR" sz="2000" dirty="0">
+                <a:latin typeface="Times New Roman" panose="02020603050405020304" pitchFamily="18" charset="0"/>
+                <a:cs typeface="Times New Roman" panose="02020603050405020304" pitchFamily="18" charset="0"/>
+                <a:hlinkClick r:id="rId3"/>
+              </a:rPr>
+              <a:t>https://www.youtube.com/watch?v=FXlixv8Ieoc</a:t>
+            </a:r>
+            <a:endParaRPr lang="pt-BR" sz="2000" dirty="0">
+              <a:latin typeface="Times New Roman" panose="02020603050405020304" pitchFamily="18" charset="0"/>
+              <a:cs typeface="Times New Roman" panose="02020603050405020304" pitchFamily="18" charset="0"/>
+            </a:endParaRPr>
+          </a:p>
+          <a:p>
+            <a:pPr marL="0" indent="0" algn="just">
+              <a:buNone/>
+            </a:pPr>
+            <a:endParaRPr lang="pt-BR" sz="2000" dirty="0">
+              <a:latin typeface="Calibri" panose="020F0502020204030204" pitchFamily="34" charset="0"/>
+            </a:endParaRPr>
+          </a:p>
+        </p:txBody>
+      </p:sp>
+    </p:spTree>
+    <p:extLst>
+      <p:ext uri="{BB962C8B-B14F-4D97-AF65-F5344CB8AC3E}">
+        <p14:creationId xmlns:p14="http://schemas.microsoft.com/office/powerpoint/2010/main" val="3680270425"/>
+      </p:ext>
+    </p:extLst>
+  </p:cSld>
+  <p:clrMapOvr>
+    <a:masterClrMapping/>
+  </p:clrMapOvr>
+  <p:transition spd="med"/>
+</p:sld>
+</file>
+
+<file path=ppt/slides/slide12.xml><?xml version="1.0" encoding="utf-8"?>
+<p:sld xmlns:a="http://schemas.openxmlformats.org/drawingml/2006/main" xmlns:r="http://schemas.openxmlformats.org/officeDocument/2006/relationships" xmlns:p="http://schemas.openxmlformats.org/presentationml/2006/main">
+  <p:cSld>
+    <p:spTree>
+      <p:nvGrpSpPr>
+        <p:cNvPr id="1" name=""/>
+        <p:cNvGrpSpPr/>
+        <p:nvPr/>
+      </p:nvGrpSpPr>
+      <p:grpSpPr>
+        <a:xfrm>
+          <a:off x="0" y="0"/>
+          <a:ext cx="0" cy="0"/>
+          <a:chOff x="0" y="0"/>
+          <a:chExt cx="0" cy="0"/>
+        </a:xfrm>
+      </p:grpSpPr>
+      <p:sp>
+        <p:nvSpPr>
+          <p:cNvPr id="6" name="Title 1"/>
+          <p:cNvSpPr>
+            <a:spLocks noGrp="1"/>
+          </p:cNvSpPr>
+          <p:nvPr>
+            <p:ph type="title"/>
+          </p:nvPr>
+        </p:nvSpPr>
+        <p:spPr/>
+        <p:txBody>
+          <a:bodyPr>
+            <a:normAutofit/>
+          </a:bodyPr>
+          <a:lstStyle/>
+          <a:p>
+            <a:r>
+              <a:rPr lang="en-US" b="1" dirty="0" err="1">
+                <a:solidFill>
+                  <a:srgbClr val="0070C0"/>
+                </a:solidFill>
+              </a:rPr>
+              <a:t>Dinâmica</a:t>
+            </a:r>
+            <a:r>
+              <a:rPr lang="en-US" b="1" dirty="0">
+                <a:solidFill>
+                  <a:srgbClr val="0070C0"/>
+                </a:solidFill>
+              </a:rPr>
+              <a:t>/</a:t>
+            </a:r>
+            <a:r>
+              <a:rPr lang="en-US" b="1" dirty="0" err="1">
+                <a:solidFill>
+                  <a:srgbClr val="0070C0"/>
+                </a:solidFill>
+              </a:rPr>
+              <a:t>Atividades</a:t>
+            </a:r>
+            <a:endParaRPr lang="en-US" b="1" dirty="0">
+              <a:solidFill>
+                <a:srgbClr val="0070C0"/>
+              </a:solidFill>
+            </a:endParaRPr>
+          </a:p>
+        </p:txBody>
+      </p:sp>
+      <p:sp>
+        <p:nvSpPr>
+          <p:cNvPr id="8" name="Text Placeholder 2"/>
+          <p:cNvSpPr>
+            <a:spLocks noGrp="1"/>
+          </p:cNvSpPr>
+          <p:nvPr>
+            <p:ph type="body" sz="half" idx="1"/>
+          </p:nvPr>
+        </p:nvSpPr>
+        <p:spPr>
+          <a:xfrm>
+            <a:off x="139472" y="1063230"/>
+            <a:ext cx="8865056" cy="3606305"/>
+          </a:xfrm>
+        </p:spPr>
+        <p:txBody>
+          <a:bodyPr>
+            <a:noAutofit/>
+          </a:bodyPr>
+          <a:lstStyle/>
+          <a:p>
+            <a:pPr algn="just">
+              <a:buFontTx/>
+              <a:buChar char="-"/>
+            </a:pPr>
+            <a:r>
+              <a:rPr lang="pt-BR" b="1" dirty="0">
+                <a:latin typeface="Times New Roman" panose="02020603050405020304" pitchFamily="18" charset="0"/>
+                <a:cs typeface="Times New Roman" panose="02020603050405020304" pitchFamily="18" charset="0"/>
+              </a:rPr>
+              <a:t>Exercícios de Fixação</a:t>
+            </a:r>
+          </a:p>
+          <a:p>
+            <a:pPr marL="0" indent="0" algn="just">
+              <a:buNone/>
+            </a:pPr>
+            <a:r>
+              <a:rPr lang="pt-BR" dirty="0">
+                <a:latin typeface="Times New Roman" panose="02020603050405020304" pitchFamily="18" charset="0"/>
+                <a:cs typeface="Times New Roman" panose="02020603050405020304" pitchFamily="18" charset="0"/>
+              </a:rPr>
+              <a:t>	Desafios em Sala de Aula.</a:t>
+            </a:r>
+          </a:p>
+          <a:p>
+            <a:pPr marL="0" indent="0" algn="just">
+              <a:buNone/>
+            </a:pPr>
+            <a:endParaRPr lang="pt-BR" dirty="0">
+              <a:latin typeface="Times New Roman" panose="02020603050405020304" pitchFamily="18" charset="0"/>
+              <a:cs typeface="Times New Roman" panose="02020603050405020304" pitchFamily="18" charset="0"/>
+            </a:endParaRPr>
+          </a:p>
+          <a:p>
+            <a:pPr algn="just">
+              <a:buFontTx/>
+              <a:buChar char="-"/>
+            </a:pPr>
+            <a:r>
+              <a:rPr lang="pt-BR" b="1" dirty="0">
+                <a:solidFill>
+                  <a:srgbClr val="FF0000"/>
+                </a:solidFill>
+                <a:latin typeface="Times New Roman" panose="02020603050405020304" pitchFamily="18" charset="0"/>
+                <a:cs typeface="Times New Roman" panose="02020603050405020304" pitchFamily="18" charset="0"/>
+              </a:rPr>
+              <a:t>Atividade (domínio – livre escolha)</a:t>
+            </a:r>
+          </a:p>
+          <a:p>
+            <a:pPr marL="0" indent="0" algn="just">
+              <a:buNone/>
+            </a:pPr>
+            <a:r>
+              <a:rPr lang="pt-BR" dirty="0">
+                <a:latin typeface="Times New Roman" panose="02020603050405020304" pitchFamily="18" charset="0"/>
+                <a:cs typeface="Times New Roman" panose="02020603050405020304" pitchFamily="18" charset="0"/>
+              </a:rPr>
+              <a:t>	Criar uma app, implementando um CRUD.</a:t>
+            </a:r>
+          </a:p>
+          <a:p>
+            <a:pPr marL="0" indent="0" algn="just">
+              <a:buNone/>
+            </a:pPr>
+            <a:endParaRPr lang="pt-BR" dirty="0">
+              <a:latin typeface="Times New Roman" panose="02020603050405020304" pitchFamily="18" charset="0"/>
+              <a:cs typeface="Times New Roman" panose="02020603050405020304" pitchFamily="18" charset="0"/>
+            </a:endParaRPr>
+          </a:p>
+          <a:p>
+            <a:pPr marL="0" indent="0" algn="just">
+              <a:buNone/>
+            </a:pPr>
+            <a:endParaRPr lang="pt-BR" dirty="0">
+              <a:latin typeface="Times New Roman" panose="02020603050405020304" pitchFamily="18" charset="0"/>
+              <a:cs typeface="Times New Roman" panose="02020603050405020304" pitchFamily="18" charset="0"/>
+            </a:endParaRPr>
+          </a:p>
+        </p:txBody>
+      </p:sp>
+    </p:spTree>
+    <p:extLst>
+      <p:ext uri="{BB962C8B-B14F-4D97-AF65-F5344CB8AC3E}">
+        <p14:creationId xmlns:p14="http://schemas.microsoft.com/office/powerpoint/2010/main" val="2470652989"/>
+      </p:ext>
+    </p:extLst>
+  </p:cSld>
+  <p:clrMapOvr>
+    <a:masterClrMapping/>
+  </p:clrMapOvr>
+  <p:transition spd="med"/>
+</p:sld>
+</file>
+
+<file path=ppt/slides/slide13.xml><?xml version="1.0" encoding="utf-8"?>
+<p:sld xmlns:a="http://schemas.openxmlformats.org/drawingml/2006/main" xmlns:r="http://schemas.openxmlformats.org/officeDocument/2006/relationships" xmlns:p="http://schemas.openxmlformats.org/presentationml/2006/main">
+  <p:cSld>
+    <p:spTree>
+      <p:nvGrpSpPr>
+        <p:cNvPr id="1" name=""/>
+        <p:cNvGrpSpPr/>
+        <p:nvPr/>
+      </p:nvGrpSpPr>
+      <p:grpSpPr>
+        <a:xfrm>
+          <a:off x="0" y="0"/>
+          <a:ext cx="0" cy="0"/>
+          <a:chOff x="0" y="0"/>
+          <a:chExt cx="0" cy="0"/>
+        </a:xfrm>
+      </p:grpSpPr>
+      <p:sp>
+        <p:nvSpPr>
+          <p:cNvPr id="6" name="Title 1"/>
+          <p:cNvSpPr>
+            <a:spLocks noGrp="1"/>
+          </p:cNvSpPr>
+          <p:nvPr>
+            <p:ph type="title"/>
+          </p:nvPr>
+        </p:nvSpPr>
+        <p:spPr/>
+        <p:txBody>
+          <a:bodyPr>
+            <a:normAutofit/>
+          </a:bodyPr>
+          <a:lstStyle/>
+          <a:p>
+            <a:r>
+              <a:rPr lang="en-US" b="1" dirty="0" err="1">
+                <a:solidFill>
+                  <a:srgbClr val="0070C0"/>
+                </a:solidFill>
+              </a:rPr>
+              <a:t>Referências</a:t>
+            </a:r>
+            <a:r>
+              <a:rPr lang="en-US" b="1" dirty="0">
+                <a:solidFill>
+                  <a:srgbClr val="0070C0"/>
+                </a:solidFill>
+              </a:rPr>
+              <a:t> </a:t>
+            </a:r>
+            <a:r>
+              <a:rPr lang="en-US" b="1" dirty="0" err="1">
+                <a:solidFill>
+                  <a:srgbClr val="0070C0"/>
+                </a:solidFill>
+              </a:rPr>
+              <a:t>Bibliográficas</a:t>
+            </a:r>
+            <a:endParaRPr lang="en-US" b="1" dirty="0">
+              <a:solidFill>
+                <a:srgbClr val="0070C0"/>
+              </a:solidFill>
+            </a:endParaRPr>
+          </a:p>
+        </p:txBody>
+      </p:sp>
+      <p:sp>
+        <p:nvSpPr>
+          <p:cNvPr id="8" name="Text Placeholder 2"/>
+          <p:cNvSpPr>
+            <a:spLocks noGrp="1"/>
+          </p:cNvSpPr>
+          <p:nvPr>
+            <p:ph type="body" sz="half" idx="1"/>
+          </p:nvPr>
+        </p:nvSpPr>
+        <p:spPr>
+          <a:xfrm>
+            <a:off x="142865" y="1200151"/>
+            <a:ext cx="8865056" cy="3394472"/>
+          </a:xfrm>
+        </p:spPr>
+        <p:txBody>
+          <a:bodyPr>
+            <a:noAutofit/>
+          </a:bodyPr>
+          <a:lstStyle/>
+          <a:p>
+            <a:pPr marL="0" indent="0" algn="just">
+              <a:buNone/>
+            </a:pPr>
+            <a:endParaRPr lang="pt-BR" sz="1800" dirty="0">
+              <a:latin typeface="Times New Roman" panose="02020603050405020304" pitchFamily="18" charset="0"/>
+              <a:cs typeface="Times New Roman" panose="02020603050405020304" pitchFamily="18" charset="0"/>
+            </a:endParaRPr>
+          </a:p>
+          <a:p>
+            <a:pPr marL="0" indent="0" algn="just">
+              <a:buNone/>
+            </a:pPr>
+            <a:r>
+              <a:rPr lang="pt-BR" sz="1800" dirty="0">
+                <a:latin typeface="Times New Roman" panose="02020603050405020304" pitchFamily="18" charset="0"/>
+                <a:cs typeface="Times New Roman" panose="02020603050405020304" pitchFamily="18" charset="0"/>
+              </a:rPr>
+              <a:t>[1] SEBESTA, Robert W. Conceitos de Linguagens de Programação. 11. edição. Porto Alegre: Bookman, 2018., Capítulo 1 (Preliminares).</a:t>
+            </a:r>
+          </a:p>
+          <a:p>
+            <a:pPr marL="0" indent="0" algn="just">
+              <a:buNone/>
+            </a:pPr>
+            <a:endParaRPr lang="pt-BR" sz="1800" dirty="0">
+              <a:latin typeface="Times New Roman" panose="02020603050405020304" pitchFamily="18" charset="0"/>
+              <a:cs typeface="Times New Roman" panose="02020603050405020304" pitchFamily="18" charset="0"/>
+            </a:endParaRPr>
+          </a:p>
+          <a:p>
+            <a:pPr marL="0" indent="0" algn="just">
+              <a:buNone/>
+            </a:pPr>
+            <a:r>
+              <a:rPr lang="pt-BR" sz="1800" dirty="0">
+                <a:latin typeface="Times New Roman" panose="02020603050405020304" pitchFamily="18" charset="0"/>
+                <a:cs typeface="Times New Roman" panose="02020603050405020304" pitchFamily="18" charset="0"/>
+              </a:rPr>
+              <a:t>[2] BORGES, Luiz Eduardo. Python para desenvolvedores: aborda Python 3.3. </a:t>
+            </a:r>
+            <a:r>
+              <a:rPr lang="pt-BR" sz="1800" dirty="0" err="1">
+                <a:latin typeface="Times New Roman" panose="02020603050405020304" pitchFamily="18" charset="0"/>
+                <a:cs typeface="Times New Roman" panose="02020603050405020304" pitchFamily="18" charset="0"/>
+              </a:rPr>
+              <a:t>Novatec</a:t>
+            </a:r>
+            <a:r>
+              <a:rPr lang="pt-BR" sz="1800" dirty="0">
+                <a:latin typeface="Times New Roman" panose="02020603050405020304" pitchFamily="18" charset="0"/>
+                <a:cs typeface="Times New Roman" panose="02020603050405020304" pitchFamily="18" charset="0"/>
+              </a:rPr>
+              <a:t> Editora, 2014.</a:t>
+            </a:r>
+          </a:p>
+          <a:p>
+            <a:pPr marL="0" indent="0" algn="just">
+              <a:buNone/>
+            </a:pPr>
+            <a:endParaRPr lang="pt-BR" sz="1800" dirty="0">
+              <a:latin typeface="Times New Roman" panose="02020603050405020304" pitchFamily="18" charset="0"/>
+              <a:cs typeface="Times New Roman" panose="02020603050405020304" pitchFamily="18" charset="0"/>
+            </a:endParaRPr>
+          </a:p>
+        </p:txBody>
+      </p:sp>
+    </p:spTree>
+    <p:extLst>
+      <p:ext uri="{BB962C8B-B14F-4D97-AF65-F5344CB8AC3E}">
+        <p14:creationId xmlns:p14="http://schemas.microsoft.com/office/powerpoint/2010/main" val="1115311843"/>
+      </p:ext>
+    </p:extLst>
+  </p:cSld>
+  <p:clrMapOvr>
+    <a:masterClrMapping/>
+  </p:clrMapOvr>
+  <p:transition spd="med"/>
+</p:sld>
+</file>
+
+<file path=ppt/slides/slide14.xml><?xml version="1.0" encoding="utf-8"?>
+<p:sld xmlns:a="http://schemas.openxmlformats.org/drawingml/2006/main" xmlns:r="http://schemas.openxmlformats.org/officeDocument/2006/relationships" xmlns:p="http://schemas.openxmlformats.org/presentationml/2006/main">
+  <p:cSld>
+    <p:spTree>
+      <p:nvGrpSpPr>
+        <p:cNvPr id="1" name=""/>
+        <p:cNvGrpSpPr/>
+        <p:nvPr/>
+      </p:nvGrpSpPr>
+      <p:grpSpPr>
+        <a:xfrm>
+          <a:off x="0" y="0"/>
+          <a:ext cx="0" cy="0"/>
+          <a:chOff x="0" y="0"/>
+          <a:chExt cx="0" cy="0"/>
+        </a:xfrm>
+      </p:grpSpPr>
+      <p:pic>
+        <p:nvPicPr>
+          <p:cNvPr id="112" name="Picture 6" descr="Picture 6"/>
+          <p:cNvPicPr>
+            <a:picLocks noChangeAspect="1"/>
+          </p:cNvPicPr>
+          <p:nvPr/>
+        </p:nvPicPr>
+        <p:blipFill>
+          <a:blip r:embed="rId2"/>
+          <a:stretch>
+            <a:fillRect/>
+          </a:stretch>
+        </p:blipFill>
+        <p:spPr>
+          <a:xfrm>
+            <a:off x="0" y="0"/>
+            <a:ext cx="9144000" cy="5143500"/>
+          </a:xfrm>
+          <a:prstGeom prst="rect">
+            <a:avLst/>
+          </a:prstGeom>
+          <a:ln w="12700">
+            <a:miter lim="400000"/>
+            <a:headEnd/>
+            <a:tailEnd/>
+          </a:ln>
+        </p:spPr>
+      </p:pic>
+      <p:pic>
+        <p:nvPicPr>
+          <p:cNvPr id="114" name="Picture 5" descr="Picture 5"/>
+          <p:cNvPicPr>
+            <a:picLocks noChangeAspect="1"/>
+          </p:cNvPicPr>
+          <p:nvPr/>
+        </p:nvPicPr>
+        <p:blipFill>
+          <a:blip r:embed="rId3"/>
+          <a:stretch>
+            <a:fillRect/>
+          </a:stretch>
+        </p:blipFill>
+        <p:spPr>
+          <a:xfrm>
+            <a:off x="469900" y="0"/>
+            <a:ext cx="4391984" cy="171450"/>
+          </a:xfrm>
+          <a:prstGeom prst="rect">
+            <a:avLst/>
+          </a:prstGeom>
+          <a:ln w="12700">
+            <a:miter lim="400000"/>
+            <a:headEnd/>
+            <a:tailEnd/>
+          </a:ln>
+        </p:spPr>
+      </p:pic>
+      <p:pic>
+        <p:nvPicPr>
+          <p:cNvPr id="115" name="Imagem" descr="Imagem"/>
+          <p:cNvPicPr>
+            <a:picLocks noChangeAspect="1"/>
+          </p:cNvPicPr>
+          <p:nvPr/>
+        </p:nvPicPr>
+        <p:blipFill>
+          <a:blip r:embed="rId4"/>
+          <a:stretch>
+            <a:fillRect/>
+          </a:stretch>
+        </p:blipFill>
+        <p:spPr>
+          <a:xfrm>
+            <a:off x="823046" y="300823"/>
+            <a:ext cx="3685692" cy="1189055"/>
+          </a:xfrm>
+          <a:prstGeom prst="rect">
+            <a:avLst/>
+          </a:prstGeom>
+          <a:ln w="12700">
+            <a:miter lim="400000"/>
+            <a:headEnd/>
+            <a:tailEnd/>
+          </a:ln>
+        </p:spPr>
+      </p:pic>
+      <p:sp>
+        <p:nvSpPr>
+          <p:cNvPr id="3" name="Título 2"/>
+          <p:cNvSpPr>
+            <a:spLocks noGrp="1"/>
+          </p:cNvSpPr>
+          <p:nvPr>
+            <p:ph type="ctrTitle"/>
+          </p:nvPr>
+        </p:nvSpPr>
+        <p:spPr>
+          <a:xfrm>
+            <a:off x="285751" y="2386770"/>
+            <a:ext cx="8615364" cy="1102519"/>
+          </a:xfrm>
+        </p:spPr>
+        <p:txBody>
+          <a:bodyPr>
+            <a:noAutofit/>
+          </a:bodyPr>
+          <a:lstStyle/>
+          <a:p>
+            <a:r>
+              <a:rPr lang="pt-BR" sz="4800" b="1" dirty="0">
+                <a:solidFill>
+                  <a:schemeClr val="bg1"/>
+                </a:solidFill>
+              </a:rPr>
+              <a:t>Programação Python</a:t>
+            </a:r>
+          </a:p>
+        </p:txBody>
+      </p:sp>
+      <p:sp>
+        <p:nvSpPr>
+          <p:cNvPr id="6" name="Título 2"/>
+          <p:cNvSpPr txBox="1"/>
+          <p:nvPr/>
+        </p:nvSpPr>
+        <p:spPr>
+          <a:xfrm>
+            <a:off x="975683" y="3866663"/>
+            <a:ext cx="7772400" cy="1102519"/>
+          </a:xfrm>
+          <a:prstGeom prst="rect">
+            <a:avLst/>
+          </a:prstGeom>
+          <a:ln w="12700">
+            <a:miter lim="400000"/>
+          </a:ln>
+        </p:spPr>
+        <p:txBody>
+          <a:bodyPr lIns="45718" tIns="45718" rIns="45718" bIns="45718" anchor="ctr">
+            <a:noAutofit/>
+          </a:bodyPr>
+          <a:lstStyle>
+            <a:lvl1pPr marL="0" marR="0" indent="0" algn="ctr" defTabSz="457200" rtl="0" latinLnBrk="0">
+              <a:lnSpc>
+                <a:spcPct val="100000"/>
+              </a:lnSpc>
+              <a:spcBef>
+                <a:spcPts val="0"/>
+              </a:spcBef>
+              <a:spcAft>
+                <a:spcPts val="0"/>
+              </a:spcAft>
+              <a:buClrTx/>
+              <a:buSzTx/>
+              <a:buFontTx/>
+              <a:buNone/>
+              <a:defRPr sz="4400" b="0" i="0" u="none" strike="noStrike" cap="none" spc="0" baseline="0">
+                <a:ln>
+                  <a:noFill/>
+                </a:ln>
+                <a:solidFill>
+                  <a:srgbClr val="000000"/>
+                </a:solidFill>
+                <a:uFillTx/>
+                <a:latin typeface="+mj-lt"/>
+                <a:ea typeface="+mj-ea"/>
+                <a:cs typeface="+mj-cs"/>
+                <a:sym typeface="Calibri"/>
+              </a:defRPr>
+            </a:lvl1pPr>
+            <a:lvl2pPr marL="0" marR="0" indent="0" algn="ctr" defTabSz="457200" rtl="0" latinLnBrk="0">
+              <a:lnSpc>
+                <a:spcPct val="100000"/>
+              </a:lnSpc>
+              <a:spcBef>
+                <a:spcPts val="0"/>
+              </a:spcBef>
+              <a:spcAft>
+                <a:spcPts val="0"/>
+              </a:spcAft>
+              <a:buClrTx/>
+              <a:buSzTx/>
+              <a:buFontTx/>
+              <a:buNone/>
+              <a:defRPr sz="4400" b="0" i="0" u="none" strike="noStrike" cap="none" spc="0" baseline="0">
+                <a:ln>
+                  <a:noFill/>
+                </a:ln>
+                <a:solidFill>
+                  <a:srgbClr val="000000"/>
+                </a:solidFill>
+                <a:uFillTx/>
+                <a:latin typeface="+mj-lt"/>
+                <a:ea typeface="+mj-ea"/>
+                <a:cs typeface="+mj-cs"/>
+                <a:sym typeface="Calibri"/>
+              </a:defRPr>
+            </a:lvl2pPr>
+            <a:lvl3pPr marL="0" marR="0" indent="0" algn="ctr" defTabSz="457200" rtl="0" latinLnBrk="0">
+              <a:lnSpc>
+                <a:spcPct val="100000"/>
+              </a:lnSpc>
+              <a:spcBef>
+                <a:spcPts val="0"/>
+              </a:spcBef>
+              <a:spcAft>
+                <a:spcPts val="0"/>
+              </a:spcAft>
+              <a:buClrTx/>
+              <a:buSzTx/>
+              <a:buFontTx/>
+              <a:buNone/>
+              <a:defRPr sz="4400" b="0" i="0" u="none" strike="noStrike" cap="none" spc="0" baseline="0">
+                <a:ln>
+                  <a:noFill/>
+                </a:ln>
+                <a:solidFill>
+                  <a:srgbClr val="000000"/>
+                </a:solidFill>
+                <a:uFillTx/>
+                <a:latin typeface="+mj-lt"/>
+                <a:ea typeface="+mj-ea"/>
+                <a:cs typeface="+mj-cs"/>
+                <a:sym typeface="Calibri"/>
+              </a:defRPr>
+            </a:lvl3pPr>
+            <a:lvl4pPr marL="0" marR="0" indent="0" algn="ctr" defTabSz="457200" rtl="0" latinLnBrk="0">
+              <a:lnSpc>
+                <a:spcPct val="100000"/>
+              </a:lnSpc>
+              <a:spcBef>
+                <a:spcPts val="0"/>
+              </a:spcBef>
+              <a:spcAft>
+                <a:spcPts val="0"/>
+              </a:spcAft>
+              <a:buClrTx/>
+              <a:buSzTx/>
+              <a:buFontTx/>
+              <a:buNone/>
+              <a:defRPr sz="4400" b="0" i="0" u="none" strike="noStrike" cap="none" spc="0" baseline="0">
+                <a:ln>
+                  <a:noFill/>
+                </a:ln>
+                <a:solidFill>
+                  <a:srgbClr val="000000"/>
+                </a:solidFill>
+                <a:uFillTx/>
+                <a:latin typeface="+mj-lt"/>
+                <a:ea typeface="+mj-ea"/>
+                <a:cs typeface="+mj-cs"/>
+                <a:sym typeface="Calibri"/>
+              </a:defRPr>
+            </a:lvl4pPr>
+            <a:lvl5pPr marL="0" marR="0" indent="0" algn="ctr" defTabSz="457200" rtl="0" latinLnBrk="0">
+              <a:lnSpc>
+                <a:spcPct val="100000"/>
+              </a:lnSpc>
+              <a:spcBef>
+                <a:spcPts val="0"/>
+              </a:spcBef>
+              <a:spcAft>
+                <a:spcPts val="0"/>
+              </a:spcAft>
+              <a:buClrTx/>
+              <a:buSzTx/>
+              <a:buFontTx/>
+              <a:buNone/>
+              <a:defRPr sz="4400" b="0" i="0" u="none" strike="noStrike" cap="none" spc="0" baseline="0">
+                <a:ln>
+                  <a:noFill/>
+                </a:ln>
+                <a:solidFill>
+                  <a:srgbClr val="000000"/>
+                </a:solidFill>
+                <a:uFillTx/>
+                <a:latin typeface="+mj-lt"/>
+                <a:ea typeface="+mj-ea"/>
+                <a:cs typeface="+mj-cs"/>
+                <a:sym typeface="Calibri"/>
+              </a:defRPr>
+            </a:lvl5pPr>
+            <a:lvl6pPr marL="0" marR="0" indent="0" algn="ctr" defTabSz="457200" rtl="0" latinLnBrk="0">
+              <a:lnSpc>
+                <a:spcPct val="100000"/>
+              </a:lnSpc>
+              <a:spcBef>
+                <a:spcPts val="0"/>
+              </a:spcBef>
+              <a:spcAft>
+                <a:spcPts val="0"/>
+              </a:spcAft>
+              <a:buClrTx/>
+              <a:buSzTx/>
+              <a:buFontTx/>
+              <a:buNone/>
+              <a:defRPr sz="4400" b="0" i="0" u="none" strike="noStrike" cap="none" spc="0" baseline="0">
+                <a:ln>
+                  <a:noFill/>
+                </a:ln>
+                <a:solidFill>
+                  <a:srgbClr val="000000"/>
+                </a:solidFill>
+                <a:uFillTx/>
+                <a:latin typeface="+mj-lt"/>
+                <a:ea typeface="+mj-ea"/>
+                <a:cs typeface="+mj-cs"/>
+                <a:sym typeface="Calibri"/>
+              </a:defRPr>
+            </a:lvl6pPr>
+            <a:lvl7pPr marL="0" marR="0" indent="0" algn="ctr" defTabSz="457200" rtl="0" latinLnBrk="0">
+              <a:lnSpc>
+                <a:spcPct val="100000"/>
+              </a:lnSpc>
+              <a:spcBef>
+                <a:spcPts val="0"/>
+              </a:spcBef>
+              <a:spcAft>
+                <a:spcPts val="0"/>
+              </a:spcAft>
+              <a:buClrTx/>
+              <a:buSzTx/>
+              <a:buFontTx/>
+              <a:buNone/>
+              <a:defRPr sz="4400" b="0" i="0" u="none" strike="noStrike" cap="none" spc="0" baseline="0">
+                <a:ln>
+                  <a:noFill/>
+                </a:ln>
+                <a:solidFill>
+                  <a:srgbClr val="000000"/>
+                </a:solidFill>
+                <a:uFillTx/>
+                <a:latin typeface="+mj-lt"/>
+                <a:ea typeface="+mj-ea"/>
+                <a:cs typeface="+mj-cs"/>
+                <a:sym typeface="Calibri"/>
+              </a:defRPr>
+            </a:lvl7pPr>
+            <a:lvl8pPr marL="0" marR="0" indent="0" algn="ctr" defTabSz="457200" rtl="0" latinLnBrk="0">
+              <a:lnSpc>
+                <a:spcPct val="100000"/>
+              </a:lnSpc>
+              <a:spcBef>
+                <a:spcPts val="0"/>
+              </a:spcBef>
+              <a:spcAft>
+                <a:spcPts val="0"/>
+              </a:spcAft>
+              <a:buClrTx/>
+              <a:buSzTx/>
+              <a:buFontTx/>
+              <a:buNone/>
+              <a:defRPr sz="4400" b="0" i="0" u="none" strike="noStrike" cap="none" spc="0" baseline="0">
+                <a:ln>
+                  <a:noFill/>
+                </a:ln>
+                <a:solidFill>
+                  <a:srgbClr val="000000"/>
+                </a:solidFill>
+                <a:uFillTx/>
+                <a:latin typeface="+mj-lt"/>
+                <a:ea typeface="+mj-ea"/>
+                <a:cs typeface="+mj-cs"/>
+                <a:sym typeface="Calibri"/>
+              </a:defRPr>
+            </a:lvl8pPr>
+            <a:lvl9pPr marL="0" marR="0" indent="0" algn="ctr" defTabSz="457200" rtl="0" latinLnBrk="0">
+              <a:lnSpc>
+                <a:spcPct val="100000"/>
+              </a:lnSpc>
+              <a:spcBef>
+                <a:spcPts val="0"/>
+              </a:spcBef>
+              <a:spcAft>
+                <a:spcPts val="0"/>
+              </a:spcAft>
+              <a:buClrTx/>
+              <a:buSzTx/>
+              <a:buFontTx/>
+              <a:buNone/>
+              <a:defRPr sz="4400" b="0" i="0" u="none" strike="noStrike" cap="none" spc="0" baseline="0">
+                <a:ln>
+                  <a:noFill/>
+                </a:ln>
+                <a:solidFill>
+                  <a:srgbClr val="000000"/>
+                </a:solidFill>
+                <a:uFillTx/>
+                <a:latin typeface="+mj-lt"/>
+                <a:ea typeface="+mj-ea"/>
+                <a:cs typeface="+mj-cs"/>
+                <a:sym typeface="Calibri"/>
+              </a:defRPr>
+            </a:lvl9pPr>
+          </a:lstStyle>
+          <a:p>
+            <a:pPr algn="r" hangingPunct="1"/>
+            <a:r>
+              <a:rPr lang="pt-BR" sz="2000" b="1" dirty="0">
+                <a:solidFill>
+                  <a:schemeClr val="bg1"/>
+                </a:solidFill>
+              </a:rPr>
+              <a:t>Professor </a:t>
+            </a:r>
+            <a:r>
+              <a:rPr lang="pt-BR" sz="2000" b="1">
+                <a:solidFill>
+                  <a:schemeClr val="bg1"/>
+                </a:solidFill>
+              </a:rPr>
+              <a:t>M.Sc</a:t>
+            </a:r>
+            <a:r>
+              <a:rPr lang="pt-BR" sz="2000" b="1" dirty="0">
+                <a:solidFill>
+                  <a:schemeClr val="bg1"/>
+                </a:solidFill>
+              </a:rPr>
+              <a:t>. Heleno Cardoso</a:t>
+            </a:r>
+          </a:p>
+        </p:txBody>
+      </p:sp>
+    </p:spTree>
+  </p:cSld>
+  <p:clrMapOvr>
+    <a:masterClrMapping/>
+  </p:clrMapOvr>
+</p:sld>
+</file>
+
 <file path=ppt/slides/slide2.xml><?xml version="1.0" encoding="utf-8"?>
 <p:sld xmlns:a="http://schemas.openxmlformats.org/drawingml/2006/main" xmlns:r="http://schemas.openxmlformats.org/officeDocument/2006/relationships" xmlns:p="http://schemas.openxmlformats.org/presentationml/2006/main">
   <p:cSld>
@@ -5352,13 +6872,19 @@
             <p:ph type="title"/>
           </p:nvPr>
         </p:nvSpPr>
-        <p:spPr/>
+        <p:spPr>
+          <a:xfrm>
+            <a:off x="237995" y="265188"/>
+            <a:ext cx="8763140" cy="596760"/>
+          </a:xfrm>
+        </p:spPr>
         <p:txBody>
           <a:bodyPr>
             <a:normAutofit/>
           </a:bodyPr>
           <a:lstStyle/>
           <a:p>
+            <a:pPr algn="ctr"/>
             <a:r>
               <a:rPr lang="en-US" b="1" dirty="0">
                 <a:solidFill>
@@ -5382,8 +6908,8 @@
         </p:nvSpPr>
         <p:spPr>
           <a:xfrm>
-            <a:off x="142865" y="1200150"/>
-            <a:ext cx="8865056" cy="3737370"/>
+            <a:off x="142865" y="886999"/>
+            <a:ext cx="8865056" cy="4160989"/>
           </a:xfrm>
         </p:spPr>
         <p:txBody>
@@ -5403,8 +6929,244 @@
                 <a:latin typeface="Times New Roman" panose="02020603050405020304" pitchFamily="18" charset="0"/>
                 <a:cs typeface="Times New Roman" panose="02020603050405020304" pitchFamily="18" charset="0"/>
               </a:rPr>
-              <a:t>...</a:t>
-            </a:r>
+              <a:t>O </a:t>
+            </a:r>
+            <a:r>
+              <a:rPr lang="pt-BR" sz="2400" b="1" dirty="0">
+                <a:solidFill>
+                  <a:srgbClr val="FF0000"/>
+                </a:solidFill>
+                <a:latin typeface="Times New Roman" panose="02020603050405020304" pitchFamily="18" charset="0"/>
+                <a:cs typeface="Times New Roman" panose="02020603050405020304" pitchFamily="18" charset="0"/>
+              </a:rPr>
+              <a:t>Python </a:t>
+            </a:r>
+            <a:r>
+              <a:rPr lang="pt-BR" sz="2400" b="1" dirty="0" err="1">
+                <a:solidFill>
+                  <a:srgbClr val="FF0000"/>
+                </a:solidFill>
+                <a:latin typeface="Times New Roman" panose="02020603050405020304" pitchFamily="18" charset="0"/>
+                <a:cs typeface="Times New Roman" panose="02020603050405020304" pitchFamily="18" charset="0"/>
+              </a:rPr>
+              <a:t>Database</a:t>
+            </a:r>
+            <a:r>
+              <a:rPr lang="pt-BR" sz="2400" b="1" dirty="0">
+                <a:solidFill>
+                  <a:srgbClr val="FF0000"/>
+                </a:solidFill>
+                <a:latin typeface="Times New Roman" panose="02020603050405020304" pitchFamily="18" charset="0"/>
+                <a:cs typeface="Times New Roman" panose="02020603050405020304" pitchFamily="18" charset="0"/>
+              </a:rPr>
+              <a:t> API</a:t>
+            </a:r>
+            <a:r>
+              <a:rPr lang="pt-BR" sz="2400" dirty="0">
+                <a:solidFill>
+                  <a:schemeClr val="tx1"/>
+                </a:solidFill>
+                <a:latin typeface="Times New Roman" panose="02020603050405020304" pitchFamily="18" charset="0"/>
+                <a:cs typeface="Times New Roman" panose="02020603050405020304" pitchFamily="18" charset="0"/>
+              </a:rPr>
+              <a:t> (</a:t>
+            </a:r>
+            <a:r>
+              <a:rPr lang="pt-BR" sz="2400" b="1" dirty="0">
+                <a:solidFill>
+                  <a:schemeClr val="tx1"/>
+                </a:solidFill>
+                <a:latin typeface="Times New Roman" panose="02020603050405020304" pitchFamily="18" charset="0"/>
+                <a:cs typeface="Times New Roman" panose="02020603050405020304" pitchFamily="18" charset="0"/>
+              </a:rPr>
+              <a:t>DB-API</a:t>
+            </a:r>
+            <a:r>
+              <a:rPr lang="pt-BR" sz="2400" dirty="0">
+                <a:solidFill>
+                  <a:schemeClr val="tx1"/>
+                </a:solidFill>
+                <a:latin typeface="Times New Roman" panose="02020603050405020304" pitchFamily="18" charset="0"/>
+                <a:cs typeface="Times New Roman" panose="02020603050405020304" pitchFamily="18" charset="0"/>
+              </a:rPr>
+              <a:t>) define uma interface padrão para o banco de dados Python. O </a:t>
+            </a:r>
+            <a:r>
+              <a:rPr lang="pt-BR" sz="2400" dirty="0" err="1">
+                <a:solidFill>
+                  <a:schemeClr val="tx1"/>
+                </a:solidFill>
+                <a:latin typeface="Times New Roman" panose="02020603050405020304" pitchFamily="18" charset="0"/>
+                <a:cs typeface="Times New Roman" panose="02020603050405020304" pitchFamily="18" charset="0"/>
+              </a:rPr>
+              <a:t>SQLAlchemy</a:t>
+            </a:r>
+            <a:r>
+              <a:rPr lang="pt-BR" sz="2400" dirty="0">
+                <a:solidFill>
+                  <a:schemeClr val="tx1"/>
+                </a:solidFill>
+                <a:latin typeface="Times New Roman" panose="02020603050405020304" pitchFamily="18" charset="0"/>
+                <a:cs typeface="Times New Roman" panose="02020603050405020304" pitchFamily="18" charset="0"/>
+              </a:rPr>
+              <a:t> é um conjunto de ferramentas de banco de dados comuns.</a:t>
+            </a:r>
+          </a:p>
+          <a:p>
+            <a:pPr marL="0" indent="0" algn="just">
+              <a:buNone/>
+            </a:pPr>
+            <a:endParaRPr lang="pt-BR" sz="2400" dirty="0">
+              <a:latin typeface="Times New Roman" panose="02020603050405020304" pitchFamily="18" charset="0"/>
+              <a:cs typeface="Times New Roman" panose="02020603050405020304" pitchFamily="18" charset="0"/>
+            </a:endParaRPr>
+          </a:p>
+          <a:p>
+            <a:pPr marL="0" indent="0" algn="just">
+              <a:buNone/>
+            </a:pPr>
+            <a:r>
+              <a:rPr lang="pt-BR" sz="2400" dirty="0">
+                <a:solidFill>
+                  <a:schemeClr val="tx1"/>
+                </a:solidFill>
+                <a:latin typeface="Times New Roman" panose="02020603050405020304" pitchFamily="18" charset="0"/>
+                <a:cs typeface="Times New Roman" panose="02020603050405020304" pitchFamily="18" charset="0"/>
+              </a:rPr>
+              <a:t>Os </a:t>
+            </a:r>
+            <a:r>
+              <a:rPr lang="pt-BR" sz="2400" b="1" dirty="0">
+                <a:solidFill>
+                  <a:schemeClr val="tx1"/>
+                </a:solidFill>
+                <a:latin typeface="Times New Roman" panose="02020603050405020304" pitchFamily="18" charset="0"/>
+                <a:cs typeface="Times New Roman" panose="02020603050405020304" pitchFamily="18" charset="0"/>
+              </a:rPr>
+              <a:t>quatro</a:t>
+            </a:r>
+            <a:r>
+              <a:rPr lang="pt-BR" sz="2400" dirty="0">
+                <a:solidFill>
+                  <a:schemeClr val="tx1"/>
+                </a:solidFill>
+                <a:latin typeface="Times New Roman" panose="02020603050405020304" pitchFamily="18" charset="0"/>
+                <a:cs typeface="Times New Roman" panose="02020603050405020304" pitchFamily="18" charset="0"/>
+              </a:rPr>
+              <a:t> principais </a:t>
+            </a:r>
+            <a:r>
+              <a:rPr lang="pt-BR" sz="2400" b="1" dirty="0">
+                <a:solidFill>
+                  <a:schemeClr val="tx1"/>
+                </a:solidFill>
+                <a:latin typeface="Times New Roman" panose="02020603050405020304" pitchFamily="18" charset="0"/>
+                <a:cs typeface="Times New Roman" panose="02020603050405020304" pitchFamily="18" charset="0"/>
+              </a:rPr>
+              <a:t>bancos de dados livres </a:t>
+            </a:r>
+            <a:r>
+              <a:rPr lang="pt-BR" sz="2400" dirty="0">
+                <a:solidFill>
+                  <a:schemeClr val="tx1"/>
+                </a:solidFill>
+                <a:latin typeface="Times New Roman" panose="02020603050405020304" pitchFamily="18" charset="0"/>
+                <a:cs typeface="Times New Roman" panose="02020603050405020304" pitchFamily="18" charset="0"/>
+              </a:rPr>
+              <a:t>que podem ser acessados do </a:t>
+            </a:r>
+            <a:r>
+              <a:rPr lang="pt-BR" sz="2400" b="1" dirty="0">
+                <a:solidFill>
+                  <a:schemeClr val="tx1"/>
+                </a:solidFill>
+                <a:latin typeface="Times New Roman" panose="02020603050405020304" pitchFamily="18" charset="0"/>
+                <a:cs typeface="Times New Roman" panose="02020603050405020304" pitchFamily="18" charset="0"/>
+              </a:rPr>
+              <a:t>Python</a:t>
+            </a:r>
+            <a:r>
+              <a:rPr lang="pt-BR" sz="2400" dirty="0">
+                <a:solidFill>
+                  <a:schemeClr val="tx1"/>
+                </a:solidFill>
+                <a:latin typeface="Times New Roman" panose="02020603050405020304" pitchFamily="18" charset="0"/>
+                <a:cs typeface="Times New Roman" panose="02020603050405020304" pitchFamily="18" charset="0"/>
+              </a:rPr>
+              <a:t> são o </a:t>
+            </a:r>
+            <a:r>
+              <a:rPr lang="pt-BR" sz="2400" b="1" dirty="0" err="1">
+                <a:solidFill>
+                  <a:srgbClr val="FF0000"/>
+                </a:solidFill>
+                <a:latin typeface="Times New Roman" panose="02020603050405020304" pitchFamily="18" charset="0"/>
+                <a:cs typeface="Times New Roman" panose="02020603050405020304" pitchFamily="18" charset="0"/>
+              </a:rPr>
+              <a:t>SQLite</a:t>
+            </a:r>
+            <a:r>
+              <a:rPr lang="pt-BR" sz="2400" b="1" dirty="0">
+                <a:solidFill>
+                  <a:srgbClr val="FF0000"/>
+                </a:solidFill>
+                <a:latin typeface="Times New Roman" panose="02020603050405020304" pitchFamily="18" charset="0"/>
+                <a:cs typeface="Times New Roman" panose="02020603050405020304" pitchFamily="18" charset="0"/>
+              </a:rPr>
+              <a:t>, o MySQL, o PostgreSQL e o </a:t>
+            </a:r>
+            <a:r>
+              <a:rPr lang="pt-BR" sz="2400" b="1" dirty="0" err="1">
+                <a:solidFill>
+                  <a:srgbClr val="FF0000"/>
+                </a:solidFill>
+                <a:latin typeface="Times New Roman" panose="02020603050405020304" pitchFamily="18" charset="0"/>
+                <a:cs typeface="Times New Roman" panose="02020603050405020304" pitchFamily="18" charset="0"/>
+              </a:rPr>
+              <a:t>Interbase</a:t>
+            </a:r>
+            <a:r>
+              <a:rPr lang="pt-BR" sz="2400" b="1" dirty="0">
+                <a:solidFill>
+                  <a:srgbClr val="FF0000"/>
+                </a:solidFill>
+                <a:latin typeface="Times New Roman" panose="02020603050405020304" pitchFamily="18" charset="0"/>
+                <a:cs typeface="Times New Roman" panose="02020603050405020304" pitchFamily="18" charset="0"/>
+              </a:rPr>
+              <a:t>/</a:t>
+            </a:r>
+            <a:r>
+              <a:rPr lang="pt-BR" sz="2400" b="1" dirty="0" err="1">
+                <a:solidFill>
+                  <a:srgbClr val="FF0000"/>
+                </a:solidFill>
+                <a:latin typeface="Times New Roman" panose="02020603050405020304" pitchFamily="18" charset="0"/>
+                <a:cs typeface="Times New Roman" panose="02020603050405020304" pitchFamily="18" charset="0"/>
+              </a:rPr>
+              <a:t>Firebird</a:t>
+            </a:r>
+            <a:r>
+              <a:rPr lang="pt-BR" sz="2400" dirty="0">
+                <a:solidFill>
+                  <a:schemeClr val="tx1"/>
+                </a:solidFill>
+                <a:latin typeface="Times New Roman" panose="02020603050405020304" pitchFamily="18" charset="0"/>
+                <a:cs typeface="Times New Roman" panose="02020603050405020304" pitchFamily="18" charset="0"/>
+              </a:rPr>
+              <a:t>.</a:t>
+            </a:r>
+          </a:p>
+          <a:p>
+            <a:pPr marL="0" indent="0" algn="just">
+              <a:buNone/>
+            </a:pPr>
+            <a:endParaRPr lang="pt-BR" sz="2400" dirty="0">
+              <a:solidFill>
+                <a:schemeClr val="tx1"/>
+              </a:solidFill>
+              <a:latin typeface="Times New Roman" panose="02020603050405020304" pitchFamily="18" charset="0"/>
+              <a:cs typeface="Times New Roman" panose="02020603050405020304" pitchFamily="18" charset="0"/>
+            </a:endParaRPr>
           </a:p>
         </p:txBody>
       </p:sp>
@@ -5449,36 +7211,34 @@
             <p:ph type="title"/>
           </p:nvPr>
         </p:nvSpPr>
-        <p:spPr/>
+        <p:spPr>
+          <a:xfrm>
+            <a:off x="237995" y="265188"/>
+            <a:ext cx="8763140" cy="596760"/>
+          </a:xfrm>
+        </p:spPr>
         <p:txBody>
           <a:bodyPr>
             <a:normAutofit/>
           </a:bodyPr>
           <a:lstStyle/>
           <a:p>
+            <a:pPr algn="ctr"/>
+            <a:r>
+              <a:rPr lang="en-US" b="1" dirty="0">
+                <a:solidFill>
+                  <a:srgbClr val="0070C0"/>
+                </a:solidFill>
+              </a:rPr>
+              <a:t>Python – BANCO DE DADOS - </a:t>
+            </a:r>
             <a:r>
               <a:rPr lang="en-US" b="1" dirty="0" err="1">
                 <a:solidFill>
                   <a:srgbClr val="0070C0"/>
                 </a:solidFill>
               </a:rPr>
-              <a:t>Leitura</a:t>
-            </a:r>
-            <a:r>
-              <a:rPr lang="en-US" b="1" dirty="0">
-                <a:solidFill>
-                  <a:srgbClr val="0070C0"/>
-                </a:solidFill>
-              </a:rPr>
-              <a:t> </a:t>
-            </a:r>
-            <a:r>
-              <a:rPr lang="en-US" b="1" dirty="0" err="1">
-                <a:solidFill>
-                  <a:srgbClr val="0070C0"/>
-                </a:solidFill>
-              </a:rPr>
-              <a:t>Específica</a:t>
+              <a:t>Conexão</a:t>
             </a:r>
             <a:endParaRPr lang="en-US" b="1" dirty="0">
               <a:solidFill>
@@ -5500,8 +7260,8 @@
         </p:nvSpPr>
         <p:spPr>
           <a:xfrm>
-            <a:off x="142865" y="1200151"/>
-            <a:ext cx="8865056" cy="3394472"/>
+            <a:off x="142865" y="836895"/>
+            <a:ext cx="8865056" cy="4160989"/>
           </a:xfrm>
         </p:spPr>
         <p:txBody>
@@ -5513,7 +7273,85 @@
             <a:pPr marL="0" indent="0" algn="just">
               <a:buNone/>
             </a:pPr>
-            <a:endParaRPr lang="pt-BR" dirty="0">
+            <a:r>
+              <a:rPr lang="pt-BR" sz="2000" dirty="0">
+                <a:solidFill>
+                  <a:schemeClr val="tx1"/>
+                </a:solidFill>
+                <a:latin typeface="Times New Roman" panose="02020603050405020304" pitchFamily="18" charset="0"/>
+                <a:cs typeface="Times New Roman" panose="02020603050405020304" pitchFamily="18" charset="0"/>
+              </a:rPr>
+              <a:t>Instalar o </a:t>
+            </a:r>
+            <a:r>
+              <a:rPr lang="pt-BR" sz="2000" b="1" dirty="0">
+                <a:solidFill>
+                  <a:schemeClr val="tx1"/>
+                </a:solidFill>
+                <a:latin typeface="Times New Roman" panose="02020603050405020304" pitchFamily="18" charset="0"/>
+                <a:cs typeface="Times New Roman" panose="02020603050405020304" pitchFamily="18" charset="0"/>
+              </a:rPr>
+              <a:t>conector do MySQL</a:t>
+            </a:r>
+            <a:r>
+              <a:rPr lang="pt-BR" sz="2000" dirty="0">
+                <a:solidFill>
+                  <a:schemeClr val="tx1"/>
+                </a:solidFill>
+                <a:latin typeface="Times New Roman" panose="02020603050405020304" pitchFamily="18" charset="0"/>
+                <a:cs typeface="Times New Roman" panose="02020603050405020304" pitchFamily="18" charset="0"/>
+              </a:rPr>
+              <a:t> Python, </a:t>
+            </a:r>
+            <a:r>
+              <a:rPr lang="pt-BR" sz="2000" b="1" dirty="0" err="1">
+                <a:solidFill>
+                  <a:srgbClr val="FF0000"/>
+                </a:solidFill>
+                <a:latin typeface="Times New Roman" panose="02020603050405020304" pitchFamily="18" charset="0"/>
+                <a:cs typeface="Times New Roman" panose="02020603050405020304" pitchFamily="18" charset="0"/>
+              </a:rPr>
+              <a:t>mysql</a:t>
+            </a:r>
+            <a:r>
+              <a:rPr lang="pt-BR" sz="2000" b="1" dirty="0">
+                <a:solidFill>
+                  <a:srgbClr val="FF0000"/>
+                </a:solidFill>
+                <a:latin typeface="Times New Roman" panose="02020603050405020304" pitchFamily="18" charset="0"/>
+                <a:cs typeface="Times New Roman" panose="02020603050405020304" pitchFamily="18" charset="0"/>
+              </a:rPr>
+              <a:t>-conector-</a:t>
+            </a:r>
+            <a:r>
+              <a:rPr lang="pt-BR" sz="2000" b="1" dirty="0" err="1">
+                <a:solidFill>
+                  <a:srgbClr val="FF0000"/>
+                </a:solidFill>
+                <a:latin typeface="Times New Roman" panose="02020603050405020304" pitchFamily="18" charset="0"/>
+                <a:cs typeface="Times New Roman" panose="02020603050405020304" pitchFamily="18" charset="0"/>
+              </a:rPr>
+              <a:t>python</a:t>
+            </a:r>
+            <a:r>
+              <a:rPr lang="pt-BR" sz="2000" dirty="0">
+                <a:solidFill>
+                  <a:schemeClr val="tx1"/>
+                </a:solidFill>
+                <a:latin typeface="Times New Roman" panose="02020603050405020304" pitchFamily="18" charset="0"/>
+                <a:cs typeface="Times New Roman" panose="02020603050405020304" pitchFamily="18" charset="0"/>
+              </a:rPr>
+              <a:t>.</a:t>
+            </a:r>
+          </a:p>
+          <a:p>
+            <a:pPr marL="0" indent="0" algn="just">
+              <a:buNone/>
+            </a:pPr>
+            <a:endParaRPr lang="pt-BR" sz="2000" b="1" dirty="0">
+              <a:solidFill>
+                <a:schemeClr val="tx1"/>
+              </a:solidFill>
               <a:latin typeface="Times New Roman" panose="02020603050405020304" pitchFamily="18" charset="0"/>
               <a:cs typeface="Times New Roman" panose="02020603050405020304" pitchFamily="18" charset="0"/>
             </a:endParaRPr>
@@ -5523,33 +7361,39 @@
               <a:buNone/>
             </a:pPr>
             <a:r>
-              <a:rPr lang="pt-BR" dirty="0">
-                <a:latin typeface="Times New Roman" panose="02020603050405020304" pitchFamily="18" charset="0"/>
-                <a:cs typeface="Times New Roman" panose="02020603050405020304" pitchFamily="18" charset="0"/>
-              </a:rPr>
-              <a:t>[1] Site:</a:t>
-            </a:r>
-          </a:p>
-          <a:p>
-            <a:pPr marL="0" indent="0" algn="just">
-              <a:buNone/>
-            </a:pPr>
-            <a:r>
-              <a:rPr lang="pt-BR" dirty="0">
+              <a:rPr lang="pt-BR" sz="2000" b="1" dirty="0" err="1">
+                <a:solidFill>
+                  <a:schemeClr val="tx1"/>
+                </a:solidFill>
+                <a:latin typeface="Times New Roman" panose="02020603050405020304" pitchFamily="18" charset="0"/>
+                <a:cs typeface="Times New Roman" panose="02020603050405020304" pitchFamily="18" charset="0"/>
+              </a:rPr>
+              <a:t>import</a:t>
+            </a:r>
+            <a:r>
+              <a:rPr lang="pt-BR" sz="2000" dirty="0">
+                <a:solidFill>
+                  <a:schemeClr val="tx1"/>
+                </a:solidFill>
                 <a:latin typeface="Times New Roman" panose="02020603050405020304" pitchFamily="18" charset="0"/>
                 <a:cs typeface="Times New Roman" panose="02020603050405020304" pitchFamily="18" charset="0"/>
               </a:rPr>
               <a:t> </a:t>
             </a:r>
             <a:r>
-              <a:rPr lang="pt-BR" dirty="0">
-                <a:latin typeface="Times New Roman" panose="02020603050405020304" pitchFamily="18" charset="0"/>
-                <a:cs typeface="Times New Roman" panose="02020603050405020304" pitchFamily="18" charset="0"/>
-                <a:hlinkClick r:id="rId3"/>
-              </a:rPr>
-              <a:t>https://www.w3schools.com/python/python_variables.asp</a:t>
-            </a:r>
-            <a:endParaRPr lang="pt-BR" dirty="0">
+              <a:rPr lang="pt-BR" sz="2000" b="1" dirty="0" err="1">
+                <a:solidFill>
+                  <a:srgbClr val="FF0000"/>
+                </a:solidFill>
+                <a:latin typeface="Times New Roman" panose="02020603050405020304" pitchFamily="18" charset="0"/>
+                <a:cs typeface="Times New Roman" panose="02020603050405020304" pitchFamily="18" charset="0"/>
+              </a:rPr>
+              <a:t>mysql.connector</a:t>
+            </a:r>
+            <a:endParaRPr lang="pt-BR" sz="2000" b="1" dirty="0">
+              <a:solidFill>
+                <a:srgbClr val="FF0000"/>
+              </a:solidFill>
               <a:latin typeface="Times New Roman" panose="02020603050405020304" pitchFamily="18" charset="0"/>
               <a:cs typeface="Times New Roman" panose="02020603050405020304" pitchFamily="18" charset="0"/>
             </a:endParaRPr>
@@ -5558,85 +7402,353 @@
             <a:pPr marL="0" indent="0" algn="just">
               <a:buNone/>
             </a:pPr>
-            <a:endParaRPr lang="pt-BR" dirty="0">
-              <a:latin typeface="Times New Roman" panose="02020603050405020304" pitchFamily="18" charset="0"/>
-              <a:cs typeface="Times New Roman" panose="02020603050405020304" pitchFamily="18" charset="0"/>
-            </a:endParaRPr>
+            <a:r>
+              <a:rPr lang="pt-BR" sz="2000" dirty="0">
+                <a:solidFill>
+                  <a:schemeClr val="tx1"/>
+                </a:solidFill>
+                <a:latin typeface="Times New Roman" panose="02020603050405020304" pitchFamily="18" charset="0"/>
+                <a:cs typeface="Times New Roman" panose="02020603050405020304" pitchFamily="18" charset="0"/>
+              </a:rPr>
+              <a:t># Objeto de conexão</a:t>
+            </a:r>
           </a:p>
           <a:p>
             <a:pPr marL="0" indent="0" algn="just">
               <a:buNone/>
             </a:pPr>
             <a:r>
-              <a:rPr lang="pt-BR" dirty="0">
-                <a:latin typeface="Times New Roman" panose="02020603050405020304" pitchFamily="18" charset="0"/>
-                <a:cs typeface="Times New Roman" panose="02020603050405020304" pitchFamily="18" charset="0"/>
-              </a:rPr>
-              <a:t>[2] Site: </a:t>
-            </a:r>
-            <a:r>
-              <a:rPr lang="pt-BR" dirty="0">
-                <a:latin typeface="Times New Roman" panose="02020603050405020304" pitchFamily="18" charset="0"/>
-                <a:cs typeface="Times New Roman" panose="02020603050405020304" pitchFamily="18" charset="0"/>
-                <a:hlinkClick r:id="rId4"/>
-              </a:rPr>
-              <a:t>https://docs.python.org/pt-br/3/tutorial/</a:t>
-            </a:r>
-            <a:endParaRPr lang="pt-BR" dirty="0">
-              <a:latin typeface="Times New Roman" panose="02020603050405020304" pitchFamily="18" charset="0"/>
-              <a:cs typeface="Times New Roman" panose="02020603050405020304" pitchFamily="18" charset="0"/>
-            </a:endParaRPr>
+              <a:rPr lang="pt-BR" sz="2000" dirty="0" err="1">
+                <a:solidFill>
+                  <a:schemeClr val="tx1"/>
+                </a:solidFill>
+                <a:latin typeface="Times New Roman" panose="02020603050405020304" pitchFamily="18" charset="0"/>
+                <a:cs typeface="Times New Roman" panose="02020603050405020304" pitchFamily="18" charset="0"/>
+              </a:rPr>
+              <a:t>conn</a:t>
+            </a:r>
+            <a:r>
+              <a:rPr lang="pt-BR" sz="2000" dirty="0">
+                <a:solidFill>
+                  <a:schemeClr val="tx1"/>
+                </a:solidFill>
+                <a:latin typeface="Times New Roman" panose="02020603050405020304" pitchFamily="18" charset="0"/>
+                <a:cs typeface="Times New Roman" panose="02020603050405020304" pitchFamily="18" charset="0"/>
+              </a:rPr>
+              <a:t> = </a:t>
+            </a:r>
+            <a:r>
+              <a:rPr lang="pt-BR" sz="2000" b="1" dirty="0" err="1">
+                <a:solidFill>
+                  <a:srgbClr val="FF0000"/>
+                </a:solidFill>
+                <a:latin typeface="Times New Roman" panose="02020603050405020304" pitchFamily="18" charset="0"/>
+                <a:cs typeface="Times New Roman" panose="02020603050405020304" pitchFamily="18" charset="0"/>
+              </a:rPr>
+              <a:t>mysql.connector.connect</a:t>
+            </a:r>
+            <a:r>
+              <a:rPr lang="pt-BR" sz="2000" dirty="0">
+                <a:solidFill>
+                  <a:schemeClr val="tx1"/>
+                </a:solidFill>
+                <a:latin typeface="Times New Roman" panose="02020603050405020304" pitchFamily="18" charset="0"/>
+                <a:cs typeface="Times New Roman" panose="02020603050405020304" pitchFamily="18" charset="0"/>
+              </a:rPr>
+              <a:t>(</a:t>
+            </a:r>
           </a:p>
           <a:p>
             <a:pPr marL="0" indent="0" algn="just">
               <a:buNone/>
             </a:pPr>
-            <a:endParaRPr lang="pt-BR" dirty="0">
-              <a:latin typeface="Times New Roman" panose="02020603050405020304" pitchFamily="18" charset="0"/>
-              <a:cs typeface="Times New Roman" panose="02020603050405020304" pitchFamily="18" charset="0"/>
-            </a:endParaRPr>
+            <a:r>
+              <a:rPr lang="pt-BR" sz="2000" dirty="0">
+                <a:solidFill>
+                  <a:schemeClr val="tx1"/>
+                </a:solidFill>
+                <a:latin typeface="Times New Roman" panose="02020603050405020304" pitchFamily="18" charset="0"/>
+                <a:cs typeface="Times New Roman" panose="02020603050405020304" pitchFamily="18" charset="0"/>
+              </a:rPr>
+              <a:t>    </a:t>
+            </a:r>
+            <a:r>
+              <a:rPr lang="pt-BR" sz="2000" b="1" dirty="0">
+                <a:solidFill>
+                  <a:schemeClr val="tx1"/>
+                </a:solidFill>
+                <a:latin typeface="Times New Roman" panose="02020603050405020304" pitchFamily="18" charset="0"/>
+                <a:cs typeface="Times New Roman" panose="02020603050405020304" pitchFamily="18" charset="0"/>
+              </a:rPr>
+              <a:t>host</a:t>
+            </a:r>
+            <a:r>
+              <a:rPr lang="pt-BR" sz="2000" dirty="0">
+                <a:solidFill>
+                  <a:schemeClr val="tx1"/>
+                </a:solidFill>
+                <a:latin typeface="Times New Roman" panose="02020603050405020304" pitchFamily="18" charset="0"/>
+                <a:cs typeface="Times New Roman" panose="02020603050405020304" pitchFamily="18" charset="0"/>
+              </a:rPr>
+              <a:t>="</a:t>
+            </a:r>
+            <a:r>
+              <a:rPr lang="pt-BR" sz="2000" dirty="0" err="1">
+                <a:solidFill>
+                  <a:schemeClr val="tx1"/>
+                </a:solidFill>
+                <a:latin typeface="Times New Roman" panose="02020603050405020304" pitchFamily="18" charset="0"/>
+                <a:cs typeface="Times New Roman" panose="02020603050405020304" pitchFamily="18" charset="0"/>
+              </a:rPr>
+              <a:t>localhost</a:t>
+            </a:r>
+            <a:r>
+              <a:rPr lang="pt-BR" sz="2000" dirty="0">
+                <a:solidFill>
+                  <a:schemeClr val="tx1"/>
+                </a:solidFill>
+                <a:latin typeface="Times New Roman" panose="02020603050405020304" pitchFamily="18" charset="0"/>
+                <a:cs typeface="Times New Roman" panose="02020603050405020304" pitchFamily="18" charset="0"/>
+              </a:rPr>
+              <a:t>", </a:t>
+            </a:r>
+            <a:r>
+              <a:rPr lang="pt-BR" sz="2000" b="1" dirty="0" err="1">
+                <a:solidFill>
+                  <a:schemeClr val="tx1"/>
+                </a:solidFill>
+                <a:latin typeface="Times New Roman" panose="02020603050405020304" pitchFamily="18" charset="0"/>
+                <a:cs typeface="Times New Roman" panose="02020603050405020304" pitchFamily="18" charset="0"/>
+              </a:rPr>
+              <a:t>database</a:t>
+            </a:r>
+            <a:r>
+              <a:rPr lang="pt-BR" sz="2000" dirty="0">
+                <a:solidFill>
+                  <a:schemeClr val="tx1"/>
+                </a:solidFill>
+                <a:latin typeface="Times New Roman" panose="02020603050405020304" pitchFamily="18" charset="0"/>
+                <a:cs typeface="Times New Roman" panose="02020603050405020304" pitchFamily="18" charset="0"/>
+              </a:rPr>
+              <a:t>="</a:t>
+            </a:r>
+            <a:r>
+              <a:rPr lang="pt-BR" sz="2000" dirty="0" err="1">
+                <a:solidFill>
+                  <a:schemeClr val="tx1"/>
+                </a:solidFill>
+                <a:latin typeface="Times New Roman" panose="02020603050405020304" pitchFamily="18" charset="0"/>
+                <a:cs typeface="Times New Roman" panose="02020603050405020304" pitchFamily="18" charset="0"/>
+              </a:rPr>
+              <a:t>coursejdbc</a:t>
+            </a:r>
+            <a:r>
+              <a:rPr lang="pt-BR" sz="2000" dirty="0">
+                <a:solidFill>
+                  <a:schemeClr val="tx1"/>
+                </a:solidFill>
+                <a:latin typeface="Times New Roman" panose="02020603050405020304" pitchFamily="18" charset="0"/>
+                <a:cs typeface="Times New Roman" panose="02020603050405020304" pitchFamily="18" charset="0"/>
+              </a:rPr>
+              <a:t>", </a:t>
+            </a:r>
+            <a:r>
+              <a:rPr lang="pt-BR" sz="2000" b="1" dirty="0" err="1">
+                <a:solidFill>
+                  <a:schemeClr val="tx1"/>
+                </a:solidFill>
+                <a:latin typeface="Times New Roman" panose="02020603050405020304" pitchFamily="18" charset="0"/>
+                <a:cs typeface="Times New Roman" panose="02020603050405020304" pitchFamily="18" charset="0"/>
+              </a:rPr>
+              <a:t>user</a:t>
+            </a:r>
+            <a:r>
+              <a:rPr lang="pt-BR" sz="2000" dirty="0">
+                <a:solidFill>
+                  <a:schemeClr val="tx1"/>
+                </a:solidFill>
+                <a:latin typeface="Times New Roman" panose="02020603050405020304" pitchFamily="18" charset="0"/>
+                <a:cs typeface="Times New Roman" panose="02020603050405020304" pitchFamily="18" charset="0"/>
+              </a:rPr>
+              <a:t>="</a:t>
+            </a:r>
+            <a:r>
+              <a:rPr lang="pt-BR" sz="2000" dirty="0" err="1">
+                <a:solidFill>
+                  <a:schemeClr val="tx1"/>
+                </a:solidFill>
+                <a:latin typeface="Times New Roman" panose="02020603050405020304" pitchFamily="18" charset="0"/>
+                <a:cs typeface="Times New Roman" panose="02020603050405020304" pitchFamily="18" charset="0"/>
+              </a:rPr>
+              <a:t>developer</a:t>
+            </a:r>
+            <a:r>
+              <a:rPr lang="pt-BR" sz="2000" dirty="0">
+                <a:solidFill>
+                  <a:schemeClr val="tx1"/>
+                </a:solidFill>
+                <a:latin typeface="Times New Roman" panose="02020603050405020304" pitchFamily="18" charset="0"/>
+                <a:cs typeface="Times New Roman" panose="02020603050405020304" pitchFamily="18" charset="0"/>
+              </a:rPr>
+              <a:t>", </a:t>
+            </a:r>
+            <a:r>
+              <a:rPr lang="pt-BR" sz="2000" b="1" dirty="0" err="1">
+                <a:solidFill>
+                  <a:schemeClr val="tx1"/>
+                </a:solidFill>
+                <a:latin typeface="Times New Roman" panose="02020603050405020304" pitchFamily="18" charset="0"/>
+                <a:cs typeface="Times New Roman" panose="02020603050405020304" pitchFamily="18" charset="0"/>
+              </a:rPr>
+              <a:t>password</a:t>
+            </a:r>
+            <a:r>
+              <a:rPr lang="pt-BR" sz="2000" dirty="0">
+                <a:solidFill>
+                  <a:schemeClr val="tx1"/>
+                </a:solidFill>
+                <a:latin typeface="Times New Roman" panose="02020603050405020304" pitchFamily="18" charset="0"/>
+                <a:cs typeface="Times New Roman" panose="02020603050405020304" pitchFamily="18" charset="0"/>
+              </a:rPr>
+              <a:t>="12")</a:t>
+            </a:r>
           </a:p>
           <a:p>
             <a:pPr marL="0" indent="0" algn="just">
               <a:buNone/>
             </a:pPr>
-            <a:endParaRPr lang="pt-BR" dirty="0">
-              <a:latin typeface="Times New Roman" panose="02020603050405020304" pitchFamily="18" charset="0"/>
-              <a:cs typeface="Times New Roman" panose="02020603050405020304" pitchFamily="18" charset="0"/>
-            </a:endParaRPr>
+            <a:r>
+              <a:rPr lang="pt-BR" sz="2000" b="1" dirty="0" err="1">
+                <a:solidFill>
+                  <a:schemeClr val="tx1"/>
+                </a:solidFill>
+                <a:latin typeface="Times New Roman" panose="02020603050405020304" pitchFamily="18" charset="0"/>
+                <a:cs typeface="Times New Roman" panose="02020603050405020304" pitchFamily="18" charset="0"/>
+              </a:rPr>
+              <a:t>if</a:t>
+            </a:r>
+            <a:r>
+              <a:rPr lang="pt-BR" sz="2000" dirty="0">
+                <a:solidFill>
+                  <a:schemeClr val="tx1"/>
+                </a:solidFill>
+                <a:latin typeface="Times New Roman" panose="02020603050405020304" pitchFamily="18" charset="0"/>
+                <a:cs typeface="Times New Roman" panose="02020603050405020304" pitchFamily="18" charset="0"/>
+              </a:rPr>
+              <a:t> </a:t>
+            </a:r>
+            <a:r>
+              <a:rPr lang="pt-BR" sz="2000" dirty="0" err="1">
+                <a:solidFill>
+                  <a:schemeClr val="tx1"/>
+                </a:solidFill>
+                <a:latin typeface="Times New Roman" panose="02020603050405020304" pitchFamily="18" charset="0"/>
+                <a:cs typeface="Times New Roman" panose="02020603050405020304" pitchFamily="18" charset="0"/>
+              </a:rPr>
+              <a:t>conn.</a:t>
+            </a:r>
+            <a:r>
+              <a:rPr lang="pt-BR" sz="2000" b="1" dirty="0" err="1">
+                <a:solidFill>
+                  <a:srgbClr val="FF0000"/>
+                </a:solidFill>
+                <a:latin typeface="Times New Roman" panose="02020603050405020304" pitchFamily="18" charset="0"/>
+                <a:cs typeface="Times New Roman" panose="02020603050405020304" pitchFamily="18" charset="0"/>
+              </a:rPr>
+              <a:t>is_connected</a:t>
+            </a:r>
+            <a:r>
+              <a:rPr lang="pt-BR" sz="2000" dirty="0">
+                <a:solidFill>
+                  <a:schemeClr val="tx1"/>
+                </a:solidFill>
+                <a:latin typeface="Times New Roman" panose="02020603050405020304" pitchFamily="18" charset="0"/>
+                <a:cs typeface="Times New Roman" panose="02020603050405020304" pitchFamily="18" charset="0"/>
+              </a:rPr>
+              <a:t>():</a:t>
+            </a:r>
           </a:p>
           <a:p>
             <a:pPr marL="0" indent="0" algn="just">
               <a:buNone/>
             </a:pPr>
-            <a:endParaRPr lang="pt-BR" dirty="0">
-              <a:latin typeface="Times New Roman" panose="02020603050405020304" pitchFamily="18" charset="0"/>
-              <a:cs typeface="Times New Roman" panose="02020603050405020304" pitchFamily="18" charset="0"/>
-            </a:endParaRPr>
-          </a:p>
-          <a:p>
-            <a:pPr marL="0" indent="0" algn="just">
-              <a:buNone/>
-            </a:pPr>
-            <a:endParaRPr lang="pt-BR" dirty="0">
-              <a:latin typeface="Times New Roman" panose="02020603050405020304" pitchFamily="18" charset="0"/>
-              <a:cs typeface="Times New Roman" panose="02020603050405020304" pitchFamily="18" charset="0"/>
-            </a:endParaRPr>
-          </a:p>
-          <a:p>
-            <a:pPr marL="0" indent="0" algn="just">
-              <a:buNone/>
-            </a:pPr>
-            <a:endParaRPr lang="pt-BR" dirty="0">
-              <a:latin typeface="Calibri" panose="020F0502020204030204" pitchFamily="34" charset="0"/>
-            </a:endParaRPr>
+            <a:r>
+              <a:rPr lang="pt-BR" sz="2000" dirty="0">
+                <a:solidFill>
+                  <a:schemeClr val="tx1"/>
+                </a:solidFill>
+                <a:latin typeface="Times New Roman" panose="02020603050405020304" pitchFamily="18" charset="0"/>
+                <a:cs typeface="Times New Roman" panose="02020603050405020304" pitchFamily="18" charset="0"/>
+              </a:rPr>
+              <a:t>    </a:t>
+            </a:r>
+            <a:r>
+              <a:rPr lang="pt-BR" sz="2000" b="1" dirty="0">
+                <a:solidFill>
+                  <a:schemeClr val="tx1"/>
+                </a:solidFill>
+                <a:latin typeface="Times New Roman" panose="02020603050405020304" pitchFamily="18" charset="0"/>
+                <a:cs typeface="Times New Roman" panose="02020603050405020304" pitchFamily="18" charset="0"/>
+              </a:rPr>
+              <a:t>print</a:t>
+            </a:r>
+            <a:r>
+              <a:rPr lang="pt-BR" sz="2000" dirty="0">
+                <a:solidFill>
+                  <a:schemeClr val="tx1"/>
+                </a:solidFill>
+                <a:latin typeface="Times New Roman" panose="02020603050405020304" pitchFamily="18" charset="0"/>
+                <a:cs typeface="Times New Roman" panose="02020603050405020304" pitchFamily="18" charset="0"/>
+              </a:rPr>
+              <a:t>("conectado") # print(</a:t>
+            </a:r>
+            <a:r>
+              <a:rPr lang="pt-BR" sz="2000" dirty="0" err="1">
+                <a:solidFill>
+                  <a:schemeClr val="tx1"/>
+                </a:solidFill>
+                <a:latin typeface="Times New Roman" panose="02020603050405020304" pitchFamily="18" charset="0"/>
+                <a:cs typeface="Times New Roman" panose="02020603050405020304" pitchFamily="18" charset="0"/>
+              </a:rPr>
+              <a:t>conn.get_server_info</a:t>
+            </a:r>
+            <a:r>
+              <a:rPr lang="pt-BR" sz="2000" dirty="0">
+                <a:solidFill>
+                  <a:schemeClr val="tx1"/>
+                </a:solidFill>
+                <a:latin typeface="Times New Roman" panose="02020603050405020304" pitchFamily="18" charset="0"/>
+                <a:cs typeface="Times New Roman" panose="02020603050405020304" pitchFamily="18" charset="0"/>
+              </a:rPr>
+              <a:t>()) (</a:t>
+            </a:r>
+            <a:r>
+              <a:rPr lang="pt-BR" sz="2000" b="1" dirty="0">
+                <a:solidFill>
+                  <a:schemeClr val="tx1"/>
+                </a:solidFill>
+                <a:latin typeface="Times New Roman" panose="02020603050405020304" pitchFamily="18" charset="0"/>
+                <a:cs typeface="Times New Roman" panose="02020603050405020304" pitchFamily="18" charset="0"/>
+              </a:rPr>
+              <a:t>versão</a:t>
+            </a:r>
+            <a:r>
+              <a:rPr lang="pt-BR" sz="2000" dirty="0">
+                <a:solidFill>
+                  <a:schemeClr val="tx1"/>
+                </a:solidFill>
+                <a:latin typeface="Times New Roman" panose="02020603050405020304" pitchFamily="18" charset="0"/>
+                <a:cs typeface="Times New Roman" panose="02020603050405020304" pitchFamily="18" charset="0"/>
+              </a:rPr>
+              <a:t>)</a:t>
+            </a:r>
           </a:p>
         </p:txBody>
       </p:sp>
     </p:spTree>
     <p:extLst>
       <p:ext uri="{BB962C8B-B14F-4D97-AF65-F5344CB8AC3E}">
-        <p14:creationId xmlns:p14="http://schemas.microsoft.com/office/powerpoint/2010/main" val="2747596967"/>
+        <p14:creationId xmlns:p14="http://schemas.microsoft.com/office/powerpoint/2010/main" val="1580035117"/>
       </p:ext>
     </p:extLst>
   </p:cSld>
@@ -5674,28 +7786,26 @@
             <p:ph type="title"/>
           </p:nvPr>
         </p:nvSpPr>
-        <p:spPr/>
+        <p:spPr>
+          <a:xfrm>
+            <a:off x="237995" y="265188"/>
+            <a:ext cx="8763140" cy="596760"/>
+          </a:xfrm>
+        </p:spPr>
         <p:txBody>
           <a:bodyPr>
             <a:normAutofit/>
           </a:bodyPr>
           <a:lstStyle/>
           <a:p>
-            <a:r>
-              <a:rPr lang="en-US" b="1" dirty="0" err="1">
+            <a:pPr algn="ctr"/>
+            <a:r>
+              <a:rPr lang="en-US" b="1" dirty="0">
                 <a:solidFill>
                   <a:srgbClr val="0070C0"/>
                 </a:solidFill>
               </a:rPr>
-              <a:t>Aprenda</a:t>
-            </a:r>
-            <a:r>
-              <a:rPr lang="en-US" b="1" dirty="0">
-                <a:solidFill>
-                  <a:srgbClr val="0070C0"/>
-                </a:solidFill>
-              </a:rPr>
-              <a:t>+</a:t>
+              <a:t>Python – BANCO DE DADOS - SELECT</a:t>
             </a:r>
           </a:p>
         </p:txBody>
@@ -5712,8 +7822,8 @@
         </p:nvSpPr>
         <p:spPr>
           <a:xfrm>
-            <a:off x="142865" y="1200151"/>
-            <a:ext cx="8865056" cy="3394472"/>
+            <a:off x="142865" y="836895"/>
+            <a:ext cx="8865056" cy="4160989"/>
           </a:xfrm>
         </p:spPr>
         <p:txBody>
@@ -5725,7 +7835,200 @@
             <a:pPr marL="0" indent="0" algn="just">
               <a:buNone/>
             </a:pPr>
+            <a:r>
+              <a:rPr lang="pt-BR" sz="2000" dirty="0">
+                <a:solidFill>
+                  <a:schemeClr val="tx1"/>
+                </a:solidFill>
+                <a:latin typeface="Times New Roman" panose="02020603050405020304" pitchFamily="18" charset="0"/>
+                <a:cs typeface="Times New Roman" panose="02020603050405020304" pitchFamily="18" charset="0"/>
+              </a:rPr>
+              <a:t>cursor = </a:t>
+            </a:r>
+            <a:r>
+              <a:rPr lang="pt-BR" sz="2000" dirty="0" err="1">
+                <a:solidFill>
+                  <a:schemeClr val="tx1"/>
+                </a:solidFill>
+                <a:latin typeface="Times New Roman" panose="02020603050405020304" pitchFamily="18" charset="0"/>
+                <a:cs typeface="Times New Roman" panose="02020603050405020304" pitchFamily="18" charset="0"/>
+              </a:rPr>
+              <a:t>conn.</a:t>
+            </a:r>
+            <a:r>
+              <a:rPr lang="pt-BR" sz="2000" b="1" dirty="0" err="1">
+                <a:solidFill>
+                  <a:srgbClr val="FF0000"/>
+                </a:solidFill>
+                <a:latin typeface="Times New Roman" panose="02020603050405020304" pitchFamily="18" charset="0"/>
+                <a:cs typeface="Times New Roman" panose="02020603050405020304" pitchFamily="18" charset="0"/>
+              </a:rPr>
+              <a:t>cursor</a:t>
+            </a:r>
+            <a:r>
+              <a:rPr lang="pt-BR" sz="2000" dirty="0">
+                <a:solidFill>
+                  <a:schemeClr val="tx1"/>
+                </a:solidFill>
+                <a:latin typeface="Times New Roman" panose="02020603050405020304" pitchFamily="18" charset="0"/>
+                <a:cs typeface="Times New Roman" panose="02020603050405020304" pitchFamily="18" charset="0"/>
+              </a:rPr>
+              <a:t>()</a:t>
+            </a:r>
+          </a:p>
+          <a:p>
+            <a:pPr marL="0" indent="0" algn="just">
+              <a:buNone/>
+            </a:pPr>
+            <a:r>
+              <a:rPr lang="pt-BR" sz="2000" dirty="0" err="1">
+                <a:solidFill>
+                  <a:schemeClr val="tx1"/>
+                </a:solidFill>
+                <a:latin typeface="Times New Roman" panose="02020603050405020304" pitchFamily="18" charset="0"/>
+                <a:cs typeface="Times New Roman" panose="02020603050405020304" pitchFamily="18" charset="0"/>
+              </a:rPr>
+              <a:t>cursor.</a:t>
+            </a:r>
+            <a:r>
+              <a:rPr lang="pt-BR" sz="2000" b="1" dirty="0" err="1">
+                <a:solidFill>
+                  <a:schemeClr val="tx1"/>
+                </a:solidFill>
+                <a:latin typeface="Times New Roman" panose="02020603050405020304" pitchFamily="18" charset="0"/>
+                <a:cs typeface="Times New Roman" panose="02020603050405020304" pitchFamily="18" charset="0"/>
+              </a:rPr>
+              <a:t>execute</a:t>
+            </a:r>
+            <a:r>
+              <a:rPr lang="pt-BR" sz="2000" dirty="0">
+                <a:solidFill>
+                  <a:schemeClr val="tx1"/>
+                </a:solidFill>
+                <a:latin typeface="Times New Roman" panose="02020603050405020304" pitchFamily="18" charset="0"/>
+                <a:cs typeface="Times New Roman" panose="02020603050405020304" pitchFamily="18" charset="0"/>
+              </a:rPr>
+              <a:t>("</a:t>
+            </a:r>
+            <a:r>
+              <a:rPr lang="pt-BR" sz="2000" b="1" dirty="0" err="1">
+                <a:solidFill>
+                  <a:schemeClr val="tx1"/>
+                </a:solidFill>
+                <a:latin typeface="Times New Roman" panose="02020603050405020304" pitchFamily="18" charset="0"/>
+                <a:cs typeface="Times New Roman" panose="02020603050405020304" pitchFamily="18" charset="0"/>
+              </a:rPr>
+              <a:t>select</a:t>
+            </a:r>
+            <a:r>
+              <a:rPr lang="pt-BR" sz="2000" dirty="0">
+                <a:solidFill>
+                  <a:schemeClr val="tx1"/>
+                </a:solidFill>
+                <a:latin typeface="Times New Roman" panose="02020603050405020304" pitchFamily="18" charset="0"/>
+                <a:cs typeface="Times New Roman" panose="02020603050405020304" pitchFamily="18" charset="0"/>
+              </a:rPr>
+              <a:t> </a:t>
+            </a:r>
+            <a:r>
+              <a:rPr lang="pt-BR" sz="2000" dirty="0" err="1">
+                <a:solidFill>
+                  <a:schemeClr val="tx1"/>
+                </a:solidFill>
+                <a:latin typeface="Times New Roman" panose="02020603050405020304" pitchFamily="18" charset="0"/>
+                <a:cs typeface="Times New Roman" panose="02020603050405020304" pitchFamily="18" charset="0"/>
+              </a:rPr>
+              <a:t>database</a:t>
+            </a:r>
+            <a:r>
+              <a:rPr lang="pt-BR" sz="2000" dirty="0">
+                <a:solidFill>
+                  <a:schemeClr val="tx1"/>
+                </a:solidFill>
+                <a:latin typeface="Times New Roman" panose="02020603050405020304" pitchFamily="18" charset="0"/>
+                <a:cs typeface="Times New Roman" panose="02020603050405020304" pitchFamily="18" charset="0"/>
+              </a:rPr>
+              <a:t>(); ")</a:t>
+            </a:r>
+          </a:p>
+          <a:p>
+            <a:pPr marL="0" indent="0" algn="just">
+              <a:buNone/>
+            </a:pPr>
+            <a:r>
+              <a:rPr lang="pt-BR" sz="2000" dirty="0">
+                <a:solidFill>
+                  <a:schemeClr val="tx1"/>
+                </a:solidFill>
+                <a:latin typeface="Times New Roman" panose="02020603050405020304" pitchFamily="18" charset="0"/>
+                <a:cs typeface="Times New Roman" panose="02020603050405020304" pitchFamily="18" charset="0"/>
+              </a:rPr>
+              <a:t>linha = </a:t>
+            </a:r>
+            <a:r>
+              <a:rPr lang="pt-BR" sz="2000" dirty="0" err="1">
+                <a:solidFill>
+                  <a:schemeClr val="tx1"/>
+                </a:solidFill>
+                <a:latin typeface="Times New Roman" panose="02020603050405020304" pitchFamily="18" charset="0"/>
+                <a:cs typeface="Times New Roman" panose="02020603050405020304" pitchFamily="18" charset="0"/>
+              </a:rPr>
+              <a:t>cursor.</a:t>
+            </a:r>
+            <a:r>
+              <a:rPr lang="pt-BR" sz="2000" b="1" dirty="0" err="1">
+                <a:solidFill>
+                  <a:srgbClr val="FF0000"/>
+                </a:solidFill>
+                <a:latin typeface="Times New Roman" panose="02020603050405020304" pitchFamily="18" charset="0"/>
+                <a:cs typeface="Times New Roman" panose="02020603050405020304" pitchFamily="18" charset="0"/>
+              </a:rPr>
+              <a:t>fetchone</a:t>
+            </a:r>
+            <a:r>
+              <a:rPr lang="pt-BR" sz="2000" dirty="0">
+                <a:solidFill>
+                  <a:schemeClr val="tx1"/>
+                </a:solidFill>
+                <a:latin typeface="Times New Roman" panose="02020603050405020304" pitchFamily="18" charset="0"/>
+                <a:cs typeface="Times New Roman" panose="02020603050405020304" pitchFamily="18" charset="0"/>
+              </a:rPr>
+              <a:t>()</a:t>
+            </a:r>
+          </a:p>
+          <a:p>
+            <a:pPr marL="0" indent="0" algn="just">
+              <a:buNone/>
+            </a:pPr>
+            <a:r>
+              <a:rPr lang="pt-BR" sz="2000" b="1" dirty="0">
+                <a:solidFill>
+                  <a:schemeClr val="tx1"/>
+                </a:solidFill>
+                <a:latin typeface="Times New Roman" panose="02020603050405020304" pitchFamily="18" charset="0"/>
+                <a:cs typeface="Times New Roman" panose="02020603050405020304" pitchFamily="18" charset="0"/>
+              </a:rPr>
+              <a:t>print</a:t>
+            </a:r>
+            <a:r>
+              <a:rPr lang="pt-BR" sz="2000" dirty="0">
+                <a:solidFill>
+                  <a:schemeClr val="tx1"/>
+                </a:solidFill>
+                <a:latin typeface="Times New Roman" panose="02020603050405020304" pitchFamily="18" charset="0"/>
+                <a:cs typeface="Times New Roman" panose="02020603050405020304" pitchFamily="18" charset="0"/>
+              </a:rPr>
+              <a:t>("conectado ao banco de dados: ", linha)</a:t>
+            </a:r>
+          </a:p>
+          <a:p>
+            <a:pPr marL="0" indent="0" algn="just">
+              <a:buNone/>
+            </a:pPr>
             <a:endParaRPr lang="pt-BR" sz="2000" dirty="0">
+              <a:solidFill>
+                <a:schemeClr val="tx1"/>
+              </a:solidFill>
               <a:latin typeface="Times New Roman" panose="02020603050405020304" pitchFamily="18" charset="0"/>
               <a:cs typeface="Times New Roman" panose="02020603050405020304" pitchFamily="18" charset="0"/>
             </a:endParaRPr>
@@ -5735,33 +8038,145 @@
               <a:buNone/>
             </a:pPr>
             <a:r>
+              <a:rPr lang="pt-BR" sz="2000" b="1" dirty="0" err="1">
+                <a:solidFill>
+                  <a:schemeClr val="tx1"/>
+                </a:solidFill>
+                <a:latin typeface="Times New Roman" panose="02020603050405020304" pitchFamily="18" charset="0"/>
+                <a:cs typeface="Times New Roman" panose="02020603050405020304" pitchFamily="18" charset="0"/>
+              </a:rPr>
+              <a:t>if</a:t>
+            </a:r>
+            <a:r>
+              <a:rPr lang="pt-BR" sz="2000" b="1" dirty="0">
+                <a:solidFill>
+                  <a:schemeClr val="tx1"/>
+                </a:solidFill>
+                <a:latin typeface="Times New Roman" panose="02020603050405020304" pitchFamily="18" charset="0"/>
+                <a:cs typeface="Times New Roman" panose="02020603050405020304" pitchFamily="18" charset="0"/>
+              </a:rPr>
+              <a:t> </a:t>
+            </a:r>
+            <a:r>
+              <a:rPr lang="pt-BR" sz="2000" dirty="0" err="1">
+                <a:solidFill>
+                  <a:schemeClr val="tx1"/>
+                </a:solidFill>
+                <a:latin typeface="Times New Roman" panose="02020603050405020304" pitchFamily="18" charset="0"/>
+                <a:cs typeface="Times New Roman" panose="02020603050405020304" pitchFamily="18" charset="0"/>
+              </a:rPr>
+              <a:t>conn.</a:t>
+            </a:r>
+            <a:r>
+              <a:rPr lang="pt-BR" sz="2000" b="1" dirty="0" err="1">
+                <a:solidFill>
+                  <a:srgbClr val="FF0000"/>
+                </a:solidFill>
+                <a:latin typeface="Times New Roman" panose="02020603050405020304" pitchFamily="18" charset="0"/>
+                <a:cs typeface="Times New Roman" panose="02020603050405020304" pitchFamily="18" charset="0"/>
+              </a:rPr>
+              <a:t>is_connected</a:t>
+            </a:r>
+            <a:r>
               <a:rPr lang="pt-BR" sz="2000" dirty="0">
-                <a:latin typeface="Times New Roman" panose="02020603050405020304" pitchFamily="18" charset="0"/>
-                <a:cs typeface="Times New Roman" panose="02020603050405020304" pitchFamily="18" charset="0"/>
-              </a:rPr>
-              <a:t>[1] </a:t>
-            </a:r>
+                <a:solidFill>
+                  <a:schemeClr val="tx1"/>
+                </a:solidFill>
+                <a:latin typeface="Times New Roman" panose="02020603050405020304" pitchFamily="18" charset="0"/>
+                <a:cs typeface="Times New Roman" panose="02020603050405020304" pitchFamily="18" charset="0"/>
+              </a:rPr>
+              <a:t>(): # testando se está conectado</a:t>
+            </a:r>
+          </a:p>
+          <a:p>
+            <a:pPr marL="0" indent="0" algn="just">
+              <a:buNone/>
+            </a:pPr>
             <a:r>
               <a:rPr lang="pt-BR" sz="2000" dirty="0">
-                <a:latin typeface="Times New Roman" panose="02020603050405020304" pitchFamily="18" charset="0"/>
-                <a:cs typeface="Times New Roman" panose="02020603050405020304" pitchFamily="18" charset="0"/>
-                <a:hlinkClick r:id="rId3"/>
-              </a:rPr>
-              <a:t>https://www.programiz.com/python-programming/variables-constants-literals</a:t>
-            </a:r>
-            <a:endParaRPr lang="pt-BR" sz="2000" dirty="0">
-              <a:latin typeface="Times New Roman" panose="02020603050405020304" pitchFamily="18" charset="0"/>
-              <a:cs typeface="Times New Roman" panose="02020603050405020304" pitchFamily="18" charset="0"/>
-            </a:endParaRPr>
+                <a:solidFill>
+                  <a:schemeClr val="tx1"/>
+                </a:solidFill>
+                <a:latin typeface="Times New Roman" panose="02020603050405020304" pitchFamily="18" charset="0"/>
+                <a:cs typeface="Times New Roman" panose="02020603050405020304" pitchFamily="18" charset="0"/>
+              </a:rPr>
+              <a:t>    </a:t>
+            </a:r>
+            <a:r>
+              <a:rPr lang="pt-BR" sz="2000" dirty="0" err="1">
+                <a:solidFill>
+                  <a:schemeClr val="tx1"/>
+                </a:solidFill>
+                <a:latin typeface="Times New Roman" panose="02020603050405020304" pitchFamily="18" charset="0"/>
+                <a:cs typeface="Times New Roman" panose="02020603050405020304" pitchFamily="18" charset="0"/>
+              </a:rPr>
+              <a:t>cursor.</a:t>
+            </a:r>
+            <a:r>
+              <a:rPr lang="pt-BR" sz="2000" b="1" dirty="0" err="1">
+                <a:solidFill>
+                  <a:schemeClr val="tx1"/>
+                </a:solidFill>
+                <a:latin typeface="Times New Roman" panose="02020603050405020304" pitchFamily="18" charset="0"/>
+                <a:cs typeface="Times New Roman" panose="02020603050405020304" pitchFamily="18" charset="0"/>
+              </a:rPr>
+              <a:t>close</a:t>
+            </a:r>
+            <a:r>
+              <a:rPr lang="pt-BR" sz="2000" dirty="0">
+                <a:solidFill>
+                  <a:schemeClr val="tx1"/>
+                </a:solidFill>
+                <a:latin typeface="Times New Roman" panose="02020603050405020304" pitchFamily="18" charset="0"/>
+                <a:cs typeface="Times New Roman" panose="02020603050405020304" pitchFamily="18" charset="0"/>
+              </a:rPr>
+              <a:t>()</a:t>
+            </a:r>
           </a:p>
           <a:p>
             <a:pPr marL="0" indent="0" algn="just">
               <a:buNone/>
             </a:pPr>
-            <a:endParaRPr lang="pt-BR" sz="2000" dirty="0">
-              <a:latin typeface="Times New Roman" panose="02020603050405020304" pitchFamily="18" charset="0"/>
-              <a:cs typeface="Times New Roman" panose="02020603050405020304" pitchFamily="18" charset="0"/>
-            </a:endParaRPr>
+            <a:r>
+              <a:rPr lang="pt-BR" sz="2000" dirty="0">
+                <a:solidFill>
+                  <a:schemeClr val="tx1"/>
+                </a:solidFill>
+                <a:latin typeface="Times New Roman" panose="02020603050405020304" pitchFamily="18" charset="0"/>
+                <a:cs typeface="Times New Roman" panose="02020603050405020304" pitchFamily="18" charset="0"/>
+              </a:rPr>
+              <a:t>    </a:t>
+            </a:r>
+            <a:r>
+              <a:rPr lang="pt-BR" sz="2000" dirty="0" err="1">
+                <a:solidFill>
+                  <a:schemeClr val="tx1"/>
+                </a:solidFill>
+                <a:latin typeface="Times New Roman" panose="02020603050405020304" pitchFamily="18" charset="0"/>
+                <a:cs typeface="Times New Roman" panose="02020603050405020304" pitchFamily="18" charset="0"/>
+              </a:rPr>
+              <a:t>conn.</a:t>
+            </a:r>
+            <a:r>
+              <a:rPr lang="pt-BR" sz="2000" b="1" dirty="0" err="1">
+                <a:solidFill>
+                  <a:schemeClr val="tx1"/>
+                </a:solidFill>
+                <a:latin typeface="Times New Roman" panose="02020603050405020304" pitchFamily="18" charset="0"/>
+                <a:cs typeface="Times New Roman" panose="02020603050405020304" pitchFamily="18" charset="0"/>
+              </a:rPr>
+              <a:t>close</a:t>
+            </a:r>
+            <a:r>
+              <a:rPr lang="pt-BR" sz="2000" dirty="0">
+                <a:solidFill>
+                  <a:schemeClr val="tx1"/>
+                </a:solidFill>
+                <a:latin typeface="Times New Roman" panose="02020603050405020304" pitchFamily="18" charset="0"/>
+                <a:cs typeface="Times New Roman" panose="02020603050405020304" pitchFamily="18" charset="0"/>
+              </a:rPr>
+              <a:t>()</a:t>
+            </a:r>
           </a:p>
           <a:p>
             <a:pPr marL="0" indent="0" algn="just">
@@ -5769,38 +8184,41 @@
             </a:pPr>
             <a:r>
               <a:rPr lang="pt-BR" sz="2000" dirty="0">
-                <a:latin typeface="Times New Roman" panose="02020603050405020304" pitchFamily="18" charset="0"/>
-                <a:cs typeface="Times New Roman" panose="02020603050405020304" pitchFamily="18" charset="0"/>
-              </a:rPr>
-              <a:t>[2] </a:t>
+                <a:solidFill>
+                  <a:schemeClr val="tx1"/>
+                </a:solidFill>
+                <a:latin typeface="Times New Roman" panose="02020603050405020304" pitchFamily="18" charset="0"/>
+                <a:cs typeface="Times New Roman" panose="02020603050405020304" pitchFamily="18" charset="0"/>
+              </a:rPr>
+              <a:t>    </a:t>
+            </a:r>
+            <a:r>
+              <a:rPr lang="pt-BR" sz="2000" b="1" dirty="0">
+                <a:solidFill>
+                  <a:schemeClr val="tx1"/>
+                </a:solidFill>
+                <a:latin typeface="Times New Roman" panose="02020603050405020304" pitchFamily="18" charset="0"/>
+                <a:cs typeface="Times New Roman" panose="02020603050405020304" pitchFamily="18" charset="0"/>
+              </a:rPr>
+              <a:t>print</a:t>
             </a:r>
             <a:r>
               <a:rPr lang="pt-BR" sz="2000" dirty="0">
-                <a:latin typeface="Times New Roman" panose="02020603050405020304" pitchFamily="18" charset="0"/>
-                <a:cs typeface="Times New Roman" panose="02020603050405020304" pitchFamily="18" charset="0"/>
-                <a:hlinkClick r:id="rId4"/>
-              </a:rPr>
-              <a:t>https://www.programiz.com/python-programming/examples/swap-variables</a:t>
-            </a:r>
-            <a:endParaRPr lang="pt-BR" sz="2000" dirty="0">
-              <a:latin typeface="Times New Roman" panose="02020603050405020304" pitchFamily="18" charset="0"/>
-              <a:cs typeface="Times New Roman" panose="02020603050405020304" pitchFamily="18" charset="0"/>
-            </a:endParaRPr>
-          </a:p>
-          <a:p>
-            <a:pPr marL="0" indent="0" algn="just">
-              <a:buNone/>
-            </a:pPr>
-            <a:endParaRPr lang="pt-BR" sz="2000" dirty="0">
-              <a:latin typeface="Calibri" panose="020F0502020204030204" pitchFamily="34" charset="0"/>
-            </a:endParaRPr>
+                <a:solidFill>
+                  <a:schemeClr val="tx1"/>
+                </a:solidFill>
+                <a:latin typeface="Times New Roman" panose="02020603050405020304" pitchFamily="18" charset="0"/>
+                <a:cs typeface="Times New Roman" panose="02020603050405020304" pitchFamily="18" charset="0"/>
+              </a:rPr>
+              <a:t>("Conexão encerrada")</a:t>
+            </a:r>
           </a:p>
         </p:txBody>
       </p:sp>
     </p:spTree>
     <p:extLst>
       <p:ext uri="{BB962C8B-B14F-4D97-AF65-F5344CB8AC3E}">
-        <p14:creationId xmlns:p14="http://schemas.microsoft.com/office/powerpoint/2010/main" val="3680270425"/>
+        <p14:creationId xmlns:p14="http://schemas.microsoft.com/office/powerpoint/2010/main" val="2794041733"/>
       </p:ext>
     </p:extLst>
   </p:cSld>
@@ -5838,42 +8256,27 @@
             <p:ph type="title"/>
           </p:nvPr>
         </p:nvSpPr>
-        <p:spPr/>
+        <p:spPr>
+          <a:xfrm>
+            <a:off x="237995" y="265188"/>
+            <a:ext cx="8763140" cy="596760"/>
+          </a:xfrm>
+        </p:spPr>
         <p:txBody>
           <a:bodyPr>
             <a:normAutofit/>
           </a:bodyPr>
           <a:lstStyle/>
           <a:p>
-            <a:r>
-              <a:rPr lang="en-US" b="1" dirty="0" err="1">
+            <a:pPr algn="ctr"/>
+            <a:r>
+              <a:rPr lang="en-US" b="1" dirty="0">
                 <a:solidFill>
                   <a:srgbClr val="0070C0"/>
                 </a:solidFill>
               </a:rPr>
-              <a:t>Dinâmica</a:t>
-            </a:r>
-            <a:r>
-              <a:rPr lang="en-US" b="1" dirty="0">
-                <a:solidFill>
-                  <a:srgbClr val="0070C0"/>
-                </a:solidFill>
-              </a:rPr>
-              <a:t>/</a:t>
-            </a:r>
-            <a:r>
-              <a:rPr lang="en-US" b="1" dirty="0" err="1">
-                <a:solidFill>
-                  <a:srgbClr val="0070C0"/>
-                </a:solidFill>
-              </a:rPr>
-              <a:t>Atividades</a:t>
-            </a:r>
-            <a:endParaRPr lang="en-US" b="1" dirty="0">
-              <a:solidFill>
-                <a:srgbClr val="0070C0"/>
-              </a:solidFill>
-            </a:endParaRPr>
+              <a:t>Python – BANCO DE DADOS – CRUD READ</a:t>
+            </a:r>
           </a:p>
         </p:txBody>
       </p:sp>
@@ -5889,8 +8292,8 @@
         </p:nvSpPr>
         <p:spPr>
           <a:xfrm>
-            <a:off x="139472" y="1063230"/>
-            <a:ext cx="8865056" cy="3606305"/>
+            <a:off x="142865" y="836895"/>
+            <a:ext cx="8865056" cy="4160989"/>
           </a:xfrm>
         </p:spPr>
         <p:txBody>
@@ -5899,16 +8302,48 @@
           </a:bodyPr>
           <a:lstStyle/>
           <a:p>
-            <a:pPr algn="just">
-              <a:buFontTx/>
-              <a:buChar char="-"/>
+            <a:pPr marL="0" indent="0" algn="just">
+              <a:buNone/>
             </a:pPr>
             <a:r>
-              <a:rPr lang="pt-BR" dirty="0">
-                <a:latin typeface="Times New Roman" panose="02020603050405020304" pitchFamily="18" charset="0"/>
-                <a:cs typeface="Times New Roman" panose="02020603050405020304" pitchFamily="18" charset="0"/>
-              </a:rPr>
-              <a:t>Exercícios de Fixação</a:t>
+              <a:rPr lang="pt-BR" sz="2000" dirty="0">
+                <a:solidFill>
+                  <a:schemeClr val="tx1"/>
+                </a:solidFill>
+                <a:latin typeface="Times New Roman" panose="02020603050405020304" pitchFamily="18" charset="0"/>
+                <a:cs typeface="Times New Roman" panose="02020603050405020304" pitchFamily="18" charset="0"/>
+              </a:rPr>
+              <a:t>cursor = </a:t>
+            </a:r>
+            <a:r>
+              <a:rPr lang="pt-BR" sz="2000" dirty="0" err="1">
+                <a:solidFill>
+                  <a:schemeClr val="tx1"/>
+                </a:solidFill>
+                <a:latin typeface="Times New Roman" panose="02020603050405020304" pitchFamily="18" charset="0"/>
+                <a:cs typeface="Times New Roman" panose="02020603050405020304" pitchFamily="18" charset="0"/>
+              </a:rPr>
+              <a:t>conn.</a:t>
+            </a:r>
+            <a:r>
+              <a:rPr lang="pt-BR" sz="2000" b="1" dirty="0" err="1">
+                <a:solidFill>
+                  <a:srgbClr val="FF0000"/>
+                </a:solidFill>
+                <a:latin typeface="Times New Roman" panose="02020603050405020304" pitchFamily="18" charset="0"/>
+                <a:cs typeface="Times New Roman" panose="02020603050405020304" pitchFamily="18" charset="0"/>
+              </a:rPr>
+              <a:t>cursor</a:t>
+            </a:r>
+            <a:r>
+              <a:rPr lang="pt-BR" sz="2000" dirty="0">
+                <a:solidFill>
+                  <a:schemeClr val="tx1"/>
+                </a:solidFill>
+                <a:latin typeface="Times New Roman" panose="02020603050405020304" pitchFamily="18" charset="0"/>
+                <a:cs typeface="Times New Roman" panose="02020603050405020304" pitchFamily="18" charset="0"/>
+              </a:rPr>
+              <a:t>()</a:t>
             </a:r>
           </a:p>
           <a:p>
@@ -5916,11 +8351,204 @@
               <a:buNone/>
             </a:pPr>
             <a:r>
-              <a:rPr lang="pt-BR" dirty="0">
-                <a:latin typeface="Times New Roman" panose="02020603050405020304" pitchFamily="18" charset="0"/>
-                <a:cs typeface="Times New Roman" panose="02020603050405020304" pitchFamily="18" charset="0"/>
-              </a:rPr>
-              <a:t>	Desafios em Sala de Aula.</a:t>
+              <a:rPr lang="pt-BR" sz="2000" dirty="0">
+                <a:latin typeface="Times New Roman" panose="02020603050405020304" pitchFamily="18" charset="0"/>
+                <a:cs typeface="Times New Roman" panose="02020603050405020304" pitchFamily="18" charset="0"/>
+              </a:rPr>
+              <a:t>nome = “pessoal”</a:t>
+            </a:r>
+            <a:endParaRPr lang="pt-BR" sz="2000" dirty="0">
+              <a:solidFill>
+                <a:schemeClr val="tx1"/>
+              </a:solidFill>
+              <a:latin typeface="Times New Roman" panose="02020603050405020304" pitchFamily="18" charset="0"/>
+              <a:cs typeface="Times New Roman" panose="02020603050405020304" pitchFamily="18" charset="0"/>
+            </a:endParaRPr>
+          </a:p>
+          <a:p>
+            <a:pPr marL="0" indent="0" algn="just">
+              <a:buNone/>
+            </a:pPr>
+            <a:r>
+              <a:rPr lang="pt-BR" sz="2000" dirty="0" err="1">
+                <a:latin typeface="Times New Roman" panose="02020603050405020304" pitchFamily="18" charset="0"/>
+                <a:cs typeface="Times New Roman" panose="02020603050405020304" pitchFamily="18" charset="0"/>
+              </a:rPr>
+              <a:t>sql</a:t>
+            </a:r>
+            <a:r>
+              <a:rPr lang="pt-BR" sz="2000" dirty="0">
+                <a:latin typeface="Times New Roman" panose="02020603050405020304" pitchFamily="18" charset="0"/>
+                <a:cs typeface="Times New Roman" panose="02020603050405020304" pitchFamily="18" charset="0"/>
+              </a:rPr>
+              <a:t> = </a:t>
+            </a:r>
+            <a:r>
+              <a:rPr lang="pt-BR" sz="2000" b="1" dirty="0">
+                <a:solidFill>
+                  <a:srgbClr val="FF0000"/>
+                </a:solidFill>
+                <a:latin typeface="Times New Roman" panose="02020603050405020304" pitchFamily="18" charset="0"/>
+                <a:cs typeface="Times New Roman" panose="02020603050405020304" pitchFamily="18" charset="0"/>
+              </a:rPr>
+              <a:t>f</a:t>
+            </a:r>
+            <a:r>
+              <a:rPr lang="pt-BR" sz="2000" dirty="0">
+                <a:solidFill>
+                  <a:schemeClr val="tx1"/>
+                </a:solidFill>
+                <a:latin typeface="Times New Roman" panose="02020603050405020304" pitchFamily="18" charset="0"/>
+                <a:cs typeface="Times New Roman" panose="02020603050405020304" pitchFamily="18" charset="0"/>
+              </a:rPr>
+              <a:t> "</a:t>
+            </a:r>
+            <a:r>
+              <a:rPr lang="pt-BR" sz="2000" b="1" dirty="0" err="1">
+                <a:latin typeface="Times New Roman" panose="02020603050405020304" pitchFamily="18" charset="0"/>
+                <a:cs typeface="Times New Roman" panose="02020603050405020304" pitchFamily="18" charset="0"/>
+              </a:rPr>
+              <a:t>select</a:t>
+            </a:r>
+            <a:r>
+              <a:rPr lang="pt-BR" sz="2000" dirty="0">
+                <a:solidFill>
+                  <a:schemeClr val="tx1"/>
+                </a:solidFill>
+                <a:latin typeface="Times New Roman" panose="02020603050405020304" pitchFamily="18" charset="0"/>
+                <a:cs typeface="Times New Roman" panose="02020603050405020304" pitchFamily="18" charset="0"/>
+              </a:rPr>
+              <a:t> * </a:t>
+            </a:r>
+            <a:r>
+              <a:rPr lang="pt-BR" sz="2000" b="1" dirty="0" err="1">
+                <a:solidFill>
+                  <a:schemeClr val="tx1"/>
+                </a:solidFill>
+                <a:latin typeface="Times New Roman" panose="02020603050405020304" pitchFamily="18" charset="0"/>
+                <a:cs typeface="Times New Roman" panose="02020603050405020304" pitchFamily="18" charset="0"/>
+              </a:rPr>
+              <a:t>from</a:t>
+            </a:r>
+            <a:r>
+              <a:rPr lang="pt-BR" sz="2000" b="1" dirty="0">
+                <a:solidFill>
+                  <a:schemeClr val="tx1"/>
+                </a:solidFill>
+                <a:latin typeface="Times New Roman" panose="02020603050405020304" pitchFamily="18" charset="0"/>
+                <a:cs typeface="Times New Roman" panose="02020603050405020304" pitchFamily="18" charset="0"/>
+              </a:rPr>
+              <a:t> </a:t>
+            </a:r>
+            <a:r>
+              <a:rPr lang="pt-BR" sz="2000" dirty="0">
+                <a:solidFill>
+                  <a:schemeClr val="tx1"/>
+                </a:solidFill>
+                <a:latin typeface="Times New Roman" panose="02020603050405020304" pitchFamily="18" charset="0"/>
+                <a:cs typeface="Times New Roman" panose="02020603050405020304" pitchFamily="18" charset="0"/>
+              </a:rPr>
+              <a:t>departamento"</a:t>
+            </a:r>
+          </a:p>
+          <a:p>
+            <a:pPr marL="0" indent="0" algn="just">
+              <a:buNone/>
+            </a:pPr>
+            <a:r>
+              <a:rPr lang="pt-BR" sz="2000" dirty="0" err="1">
+                <a:solidFill>
+                  <a:schemeClr val="tx1"/>
+                </a:solidFill>
+                <a:latin typeface="Times New Roman" panose="02020603050405020304" pitchFamily="18" charset="0"/>
+                <a:cs typeface="Times New Roman" panose="02020603050405020304" pitchFamily="18" charset="0"/>
+              </a:rPr>
+              <a:t>cursor.</a:t>
+            </a:r>
+            <a:r>
+              <a:rPr lang="pt-BR" sz="2000" b="1" dirty="0" err="1">
+                <a:solidFill>
+                  <a:schemeClr val="tx1"/>
+                </a:solidFill>
+                <a:latin typeface="Times New Roman" panose="02020603050405020304" pitchFamily="18" charset="0"/>
+                <a:cs typeface="Times New Roman" panose="02020603050405020304" pitchFamily="18" charset="0"/>
+              </a:rPr>
+              <a:t>execute</a:t>
+            </a:r>
+            <a:r>
+              <a:rPr lang="pt-BR" sz="2000" dirty="0">
+                <a:solidFill>
+                  <a:schemeClr val="tx1"/>
+                </a:solidFill>
+                <a:latin typeface="Times New Roman" panose="02020603050405020304" pitchFamily="18" charset="0"/>
+                <a:cs typeface="Times New Roman" panose="02020603050405020304" pitchFamily="18" charset="0"/>
+              </a:rPr>
+              <a:t>(</a:t>
+            </a:r>
+            <a:r>
+              <a:rPr lang="pt-BR" sz="2000" dirty="0" err="1">
+                <a:solidFill>
+                  <a:schemeClr val="tx1"/>
+                </a:solidFill>
+                <a:latin typeface="Times New Roman" panose="02020603050405020304" pitchFamily="18" charset="0"/>
+                <a:cs typeface="Times New Roman" panose="02020603050405020304" pitchFamily="18" charset="0"/>
+              </a:rPr>
+              <a:t>sql</a:t>
+            </a:r>
+            <a:r>
+              <a:rPr lang="pt-BR" sz="2000" dirty="0">
+                <a:solidFill>
+                  <a:schemeClr val="tx1"/>
+                </a:solidFill>
+                <a:latin typeface="Times New Roman" panose="02020603050405020304" pitchFamily="18" charset="0"/>
+                <a:cs typeface="Times New Roman" panose="02020603050405020304" pitchFamily="18" charset="0"/>
+              </a:rPr>
+              <a:t>)</a:t>
+            </a:r>
+          </a:p>
+          <a:p>
+            <a:pPr marL="0" indent="0" algn="just">
+              <a:buNone/>
+            </a:pPr>
+            <a:r>
+              <a:rPr lang="pt-BR" sz="2000" dirty="0">
+                <a:solidFill>
+                  <a:schemeClr val="tx1"/>
+                </a:solidFill>
+                <a:latin typeface="Times New Roman" panose="02020603050405020304" pitchFamily="18" charset="0"/>
+                <a:cs typeface="Times New Roman" panose="02020603050405020304" pitchFamily="18" charset="0"/>
+              </a:rPr>
+              <a:t>linha = </a:t>
+            </a:r>
+            <a:r>
+              <a:rPr lang="pt-BR" sz="2000" dirty="0" err="1">
+                <a:solidFill>
+                  <a:schemeClr val="tx1"/>
+                </a:solidFill>
+                <a:latin typeface="Times New Roman" panose="02020603050405020304" pitchFamily="18" charset="0"/>
+                <a:cs typeface="Times New Roman" panose="02020603050405020304" pitchFamily="18" charset="0"/>
+              </a:rPr>
+              <a:t>cursor.</a:t>
+            </a:r>
+            <a:r>
+              <a:rPr lang="pt-BR" sz="2000" b="1" dirty="0" err="1">
+                <a:solidFill>
+                  <a:srgbClr val="FF0000"/>
+                </a:solidFill>
+                <a:latin typeface="Times New Roman" panose="02020603050405020304" pitchFamily="18" charset="0"/>
+                <a:cs typeface="Times New Roman" panose="02020603050405020304" pitchFamily="18" charset="0"/>
+              </a:rPr>
+              <a:t>fetchall</a:t>
+            </a:r>
+            <a:r>
+              <a:rPr lang="pt-BR" sz="2000" dirty="0">
+                <a:solidFill>
+                  <a:schemeClr val="tx1"/>
+                </a:solidFill>
+                <a:latin typeface="Times New Roman" panose="02020603050405020304" pitchFamily="18" charset="0"/>
+                <a:cs typeface="Times New Roman" panose="02020603050405020304" pitchFamily="18" charset="0"/>
+              </a:rPr>
+              <a:t>()</a:t>
             </a:r>
           </a:p>
         </p:txBody>
@@ -5928,7 +8556,7 @@
     </p:spTree>
     <p:extLst>
       <p:ext uri="{BB962C8B-B14F-4D97-AF65-F5344CB8AC3E}">
-        <p14:creationId xmlns:p14="http://schemas.microsoft.com/office/powerpoint/2010/main" val="2470652989"/>
+        <p14:creationId xmlns:p14="http://schemas.microsoft.com/office/powerpoint/2010/main" val="484425744"/>
       </p:ext>
     </p:extLst>
   </p:cSld>
@@ -5966,42 +8594,27 @@
             <p:ph type="title"/>
           </p:nvPr>
         </p:nvSpPr>
-        <p:spPr/>
+        <p:spPr>
+          <a:xfrm>
+            <a:off x="237995" y="265188"/>
+            <a:ext cx="8763140" cy="596760"/>
+          </a:xfrm>
+        </p:spPr>
         <p:txBody>
           <a:bodyPr>
             <a:normAutofit/>
           </a:bodyPr>
           <a:lstStyle/>
           <a:p>
-            <a:r>
-              <a:rPr lang="en-US" b="1" dirty="0" err="1">
+            <a:pPr algn="ctr"/>
+            <a:r>
+              <a:rPr lang="en-US" b="1" dirty="0">
                 <a:solidFill>
                   <a:srgbClr val="0070C0"/>
                 </a:solidFill>
               </a:rPr>
-              <a:t>Referências</a:t>
-            </a:r>
-            <a:r>
-              <a:rPr lang="en-US" b="1" dirty="0">
-                <a:solidFill>
-                  <a:srgbClr val="0070C0"/>
-                </a:solidFill>
-              </a:rPr>
-              <a:t> </a:t>
-            </a:r>
-            <a:r>
-              <a:rPr lang="en-US" b="1" dirty="0" err="1">
-                <a:solidFill>
-                  <a:srgbClr val="0070C0"/>
-                </a:solidFill>
-              </a:rPr>
-              <a:t>Bibliográficas</a:t>
-            </a:r>
-            <a:endParaRPr lang="en-US" b="1" dirty="0">
-              <a:solidFill>
-                <a:srgbClr val="0070C0"/>
-              </a:solidFill>
-            </a:endParaRPr>
+              <a:t>Python – BANCO DE DADOS – CRUD INSERT</a:t>
+            </a:r>
           </a:p>
         </p:txBody>
       </p:sp>
@@ -6017,8 +8630,8 @@
         </p:nvSpPr>
         <p:spPr>
           <a:xfrm>
-            <a:off x="142865" y="1200151"/>
-            <a:ext cx="8865056" cy="3394472"/>
+            <a:off x="142865" y="836895"/>
+            <a:ext cx="8865056" cy="4160989"/>
           </a:xfrm>
         </p:spPr>
         <p:txBody>
@@ -6030,7 +8643,62 @@
             <a:pPr marL="0" indent="0" algn="just">
               <a:buNone/>
             </a:pPr>
-            <a:endParaRPr lang="pt-BR" sz="1800" dirty="0">
+            <a:r>
+              <a:rPr lang="pt-BR" sz="2000" dirty="0">
+                <a:solidFill>
+                  <a:schemeClr val="tx1"/>
+                </a:solidFill>
+                <a:latin typeface="Times New Roman" panose="02020603050405020304" pitchFamily="18" charset="0"/>
+                <a:cs typeface="Times New Roman" panose="02020603050405020304" pitchFamily="18" charset="0"/>
+              </a:rPr>
+              <a:t>cursor = </a:t>
+            </a:r>
+            <a:r>
+              <a:rPr lang="pt-BR" sz="2000" dirty="0" err="1">
+                <a:solidFill>
+                  <a:schemeClr val="tx1"/>
+                </a:solidFill>
+                <a:latin typeface="Times New Roman" panose="02020603050405020304" pitchFamily="18" charset="0"/>
+                <a:cs typeface="Times New Roman" panose="02020603050405020304" pitchFamily="18" charset="0"/>
+              </a:rPr>
+              <a:t>conn.</a:t>
+            </a:r>
+            <a:r>
+              <a:rPr lang="pt-BR" sz="2000" b="1" dirty="0" err="1">
+                <a:solidFill>
+                  <a:srgbClr val="FF0000"/>
+                </a:solidFill>
+                <a:latin typeface="Times New Roman" panose="02020603050405020304" pitchFamily="18" charset="0"/>
+                <a:cs typeface="Times New Roman" panose="02020603050405020304" pitchFamily="18" charset="0"/>
+              </a:rPr>
+              <a:t>cursor</a:t>
+            </a:r>
+            <a:r>
+              <a:rPr lang="pt-BR" sz="2000" dirty="0">
+                <a:solidFill>
+                  <a:schemeClr val="tx1"/>
+                </a:solidFill>
+                <a:latin typeface="Times New Roman" panose="02020603050405020304" pitchFamily="18" charset="0"/>
+                <a:cs typeface="Times New Roman" panose="02020603050405020304" pitchFamily="18" charset="0"/>
+              </a:rPr>
+              <a:t>()</a:t>
+            </a:r>
+          </a:p>
+          <a:p>
+            <a:pPr marL="0" indent="0" algn="just">
+              <a:buNone/>
+            </a:pPr>
+            <a:r>
+              <a:rPr lang="pt-BR" sz="2000" dirty="0">
+                <a:latin typeface="Times New Roman" panose="02020603050405020304" pitchFamily="18" charset="0"/>
+                <a:cs typeface="Times New Roman" panose="02020603050405020304" pitchFamily="18" charset="0"/>
+              </a:rPr>
+              <a:t>nome = “pessoal”</a:t>
+            </a:r>
+            <a:endParaRPr lang="pt-BR" sz="2000" dirty="0">
+              <a:solidFill>
+                <a:schemeClr val="tx1"/>
+              </a:solidFill>
               <a:latin typeface="Times New Roman" panose="02020603050405020304" pitchFamily="18" charset="0"/>
               <a:cs typeface="Times New Roman" panose="02020603050405020304" pitchFamily="18" charset="0"/>
             </a:endParaRPr>
@@ -6040,18 +8708,224 @@
               <a:buNone/>
             </a:pPr>
             <a:r>
-              <a:rPr lang="pt-BR" sz="1800" dirty="0">
-                <a:latin typeface="Times New Roman" panose="02020603050405020304" pitchFamily="18" charset="0"/>
-                <a:cs typeface="Times New Roman" panose="02020603050405020304" pitchFamily="18" charset="0"/>
-              </a:rPr>
-              <a:t>[1] SEBESTA, Robert W. Conceitos de Linguagens de Programação. 11. edição. Porto Alegre: Bookman, 2018., Capítulo 1 (Preliminares).</a:t>
+              <a:rPr lang="pt-BR" sz="2000" b="1" dirty="0" err="1">
+                <a:latin typeface="Times New Roman" panose="02020603050405020304" pitchFamily="18" charset="0"/>
+                <a:cs typeface="Times New Roman" panose="02020603050405020304" pitchFamily="18" charset="0"/>
+              </a:rPr>
+              <a:t>sql</a:t>
+            </a:r>
+            <a:r>
+              <a:rPr lang="pt-BR" sz="2000" dirty="0">
+                <a:latin typeface="Times New Roman" panose="02020603050405020304" pitchFamily="18" charset="0"/>
+                <a:cs typeface="Times New Roman" panose="02020603050405020304" pitchFamily="18" charset="0"/>
+              </a:rPr>
+              <a:t> = </a:t>
+            </a:r>
+            <a:r>
+              <a:rPr lang="pt-BR" sz="2000" b="1" dirty="0" err="1">
+                <a:solidFill>
+                  <a:srgbClr val="FF0000"/>
+                </a:solidFill>
+                <a:latin typeface="Times New Roman" panose="02020603050405020304" pitchFamily="18" charset="0"/>
+                <a:cs typeface="Times New Roman" panose="02020603050405020304" pitchFamily="18" charset="0"/>
+              </a:rPr>
+              <a:t>f</a:t>
+            </a:r>
+            <a:r>
+              <a:rPr lang="pt-BR" sz="2000" dirty="0" err="1">
+                <a:solidFill>
+                  <a:schemeClr val="tx1"/>
+                </a:solidFill>
+                <a:latin typeface="Times New Roman" panose="02020603050405020304" pitchFamily="18" charset="0"/>
+                <a:cs typeface="Times New Roman" panose="02020603050405020304" pitchFamily="18" charset="0"/>
+              </a:rPr>
+              <a:t>"</a:t>
+            </a:r>
+            <a:r>
+              <a:rPr lang="pt-BR" sz="2000" b="1" dirty="0" err="1">
+                <a:solidFill>
+                  <a:schemeClr val="tx1"/>
+                </a:solidFill>
+                <a:latin typeface="Times New Roman" panose="02020603050405020304" pitchFamily="18" charset="0"/>
+                <a:cs typeface="Times New Roman" panose="02020603050405020304" pitchFamily="18" charset="0"/>
+              </a:rPr>
+              <a:t>insert</a:t>
+            </a:r>
+            <a:r>
+              <a:rPr lang="pt-BR" sz="2000" dirty="0">
+                <a:solidFill>
+                  <a:schemeClr val="tx1"/>
+                </a:solidFill>
+                <a:latin typeface="Times New Roman" panose="02020603050405020304" pitchFamily="18" charset="0"/>
+                <a:cs typeface="Times New Roman" panose="02020603050405020304" pitchFamily="18" charset="0"/>
+              </a:rPr>
+              <a:t> </a:t>
+            </a:r>
+            <a:r>
+              <a:rPr lang="pt-BR" sz="2000" b="1" dirty="0" err="1">
+                <a:solidFill>
+                  <a:schemeClr val="tx1"/>
+                </a:solidFill>
+                <a:latin typeface="Times New Roman" panose="02020603050405020304" pitchFamily="18" charset="0"/>
+                <a:cs typeface="Times New Roman" panose="02020603050405020304" pitchFamily="18" charset="0"/>
+              </a:rPr>
+              <a:t>into</a:t>
+            </a:r>
+            <a:r>
+              <a:rPr lang="pt-BR" sz="2000" dirty="0">
+                <a:solidFill>
+                  <a:schemeClr val="tx1"/>
+                </a:solidFill>
+                <a:latin typeface="Times New Roman" panose="02020603050405020304" pitchFamily="18" charset="0"/>
+                <a:cs typeface="Times New Roman" panose="02020603050405020304" pitchFamily="18" charset="0"/>
+              </a:rPr>
+              <a:t> departamento (nome) </a:t>
+            </a:r>
+            <a:r>
+              <a:rPr lang="pt-BR" sz="2000" b="1" dirty="0" err="1">
+                <a:solidFill>
+                  <a:schemeClr val="tx1"/>
+                </a:solidFill>
+                <a:latin typeface="Times New Roman" panose="02020603050405020304" pitchFamily="18" charset="0"/>
+                <a:cs typeface="Times New Roman" panose="02020603050405020304" pitchFamily="18" charset="0"/>
+              </a:rPr>
+              <a:t>values</a:t>
+            </a:r>
+            <a:r>
+              <a:rPr lang="pt-BR" sz="2000" dirty="0">
+                <a:solidFill>
+                  <a:schemeClr val="tx1"/>
+                </a:solidFill>
+                <a:latin typeface="Times New Roman" panose="02020603050405020304" pitchFamily="18" charset="0"/>
+                <a:cs typeface="Times New Roman" panose="02020603050405020304" pitchFamily="18" charset="0"/>
+              </a:rPr>
+              <a:t> (</a:t>
+            </a:r>
+            <a:r>
+              <a:rPr lang="pt-BR" sz="2000" b="1" dirty="0">
+                <a:solidFill>
+                  <a:schemeClr val="tx1"/>
+                </a:solidFill>
+                <a:latin typeface="Times New Roman" panose="02020603050405020304" pitchFamily="18" charset="0"/>
+                <a:cs typeface="Times New Roman" panose="02020603050405020304" pitchFamily="18" charset="0"/>
+              </a:rPr>
+              <a:t>‘</a:t>
+            </a:r>
+            <a:r>
+              <a:rPr lang="pt-BR" sz="2000" dirty="0">
+                <a:solidFill>
+                  <a:schemeClr val="tx1"/>
+                </a:solidFill>
+                <a:latin typeface="Times New Roman" panose="02020603050405020304" pitchFamily="18" charset="0"/>
+                <a:cs typeface="Times New Roman" panose="02020603050405020304" pitchFamily="18" charset="0"/>
+              </a:rPr>
+              <a:t>{</a:t>
+            </a:r>
+            <a:r>
+              <a:rPr lang="pt-BR" sz="2000" dirty="0">
+                <a:latin typeface="Times New Roman" panose="02020603050405020304" pitchFamily="18" charset="0"/>
+                <a:cs typeface="Times New Roman" panose="02020603050405020304" pitchFamily="18" charset="0"/>
+              </a:rPr>
+              <a:t>nome</a:t>
+            </a:r>
+            <a:r>
+              <a:rPr lang="pt-BR" sz="2000" dirty="0">
+                <a:solidFill>
+                  <a:schemeClr val="tx1"/>
+                </a:solidFill>
+                <a:latin typeface="Times New Roman" panose="02020603050405020304" pitchFamily="18" charset="0"/>
+                <a:cs typeface="Times New Roman" panose="02020603050405020304" pitchFamily="18" charset="0"/>
+              </a:rPr>
+              <a:t>}’)"</a:t>
             </a:r>
           </a:p>
           <a:p>
             <a:pPr marL="0" indent="0" algn="just">
               <a:buNone/>
             </a:pPr>
-            <a:endParaRPr lang="pt-BR" sz="1800" dirty="0">
+            <a:r>
+              <a:rPr lang="pt-BR" sz="2000" dirty="0" err="1">
+                <a:solidFill>
+                  <a:schemeClr val="tx1"/>
+                </a:solidFill>
+                <a:latin typeface="Times New Roman" panose="02020603050405020304" pitchFamily="18" charset="0"/>
+                <a:cs typeface="Times New Roman" panose="02020603050405020304" pitchFamily="18" charset="0"/>
+              </a:rPr>
+              <a:t>cursor.</a:t>
+            </a:r>
+            <a:r>
+              <a:rPr lang="pt-BR" sz="2000" b="1" dirty="0" err="1">
+                <a:solidFill>
+                  <a:schemeClr val="tx1"/>
+                </a:solidFill>
+                <a:latin typeface="Times New Roman" panose="02020603050405020304" pitchFamily="18" charset="0"/>
+                <a:cs typeface="Times New Roman" panose="02020603050405020304" pitchFamily="18" charset="0"/>
+              </a:rPr>
+              <a:t>execute</a:t>
+            </a:r>
+            <a:r>
+              <a:rPr lang="pt-BR" sz="2000" dirty="0">
+                <a:solidFill>
+                  <a:schemeClr val="tx1"/>
+                </a:solidFill>
+                <a:latin typeface="Times New Roman" panose="02020603050405020304" pitchFamily="18" charset="0"/>
+                <a:cs typeface="Times New Roman" panose="02020603050405020304" pitchFamily="18" charset="0"/>
+              </a:rPr>
+              <a:t>(</a:t>
+            </a:r>
+            <a:r>
+              <a:rPr lang="pt-BR" sz="2000" dirty="0" err="1">
+                <a:solidFill>
+                  <a:schemeClr val="tx1"/>
+                </a:solidFill>
+                <a:latin typeface="Times New Roman" panose="02020603050405020304" pitchFamily="18" charset="0"/>
+                <a:cs typeface="Times New Roman" panose="02020603050405020304" pitchFamily="18" charset="0"/>
+              </a:rPr>
+              <a:t>sql</a:t>
+            </a:r>
+            <a:r>
+              <a:rPr lang="pt-BR" sz="2000" dirty="0">
+                <a:solidFill>
+                  <a:schemeClr val="tx1"/>
+                </a:solidFill>
+                <a:latin typeface="Times New Roman" panose="02020603050405020304" pitchFamily="18" charset="0"/>
+                <a:cs typeface="Times New Roman" panose="02020603050405020304" pitchFamily="18" charset="0"/>
+              </a:rPr>
+              <a:t>)</a:t>
+            </a:r>
+          </a:p>
+          <a:p>
+            <a:pPr marL="0" indent="0" algn="just">
+              <a:buNone/>
+            </a:pPr>
+            <a:r>
+              <a:rPr lang="pt-BR" sz="2000" dirty="0" err="1">
+                <a:latin typeface="Times New Roman" panose="02020603050405020304" pitchFamily="18" charset="0"/>
+                <a:cs typeface="Times New Roman" panose="02020603050405020304" pitchFamily="18" charset="0"/>
+              </a:rPr>
+              <a:t>conn.</a:t>
+            </a:r>
+            <a:r>
+              <a:rPr lang="pt-BR" sz="2000" b="1" dirty="0" err="1">
+                <a:solidFill>
+                  <a:srgbClr val="FF0000"/>
+                </a:solidFill>
+                <a:latin typeface="Times New Roman" panose="02020603050405020304" pitchFamily="18" charset="0"/>
+                <a:cs typeface="Times New Roman" panose="02020603050405020304" pitchFamily="18" charset="0"/>
+              </a:rPr>
+              <a:t>commit</a:t>
+            </a:r>
+            <a:r>
+              <a:rPr lang="pt-BR" sz="2000" dirty="0">
+                <a:latin typeface="Times New Roman" panose="02020603050405020304" pitchFamily="18" charset="0"/>
+                <a:cs typeface="Times New Roman" panose="02020603050405020304" pitchFamily="18" charset="0"/>
+              </a:rPr>
+              <a:t>();</a:t>
+            </a:r>
+            <a:endParaRPr lang="pt-BR" sz="2000" dirty="0">
+              <a:solidFill>
+                <a:schemeClr val="tx1"/>
+              </a:solidFill>
               <a:latin typeface="Times New Roman" panose="02020603050405020304" pitchFamily="18" charset="0"/>
               <a:cs typeface="Times New Roman" panose="02020603050405020304" pitchFamily="18" charset="0"/>
             </a:endParaRPr>
@@ -6061,32 +8935,23 @@
               <a:buNone/>
             </a:pPr>
             <a:r>
-              <a:rPr lang="pt-BR" sz="1800" dirty="0">
-                <a:latin typeface="Times New Roman" panose="02020603050405020304" pitchFamily="18" charset="0"/>
-                <a:cs typeface="Times New Roman" panose="02020603050405020304" pitchFamily="18" charset="0"/>
-              </a:rPr>
-              <a:t>[2] BORGES, Luiz Eduardo. Python para desenvolvedores: aborda Python 3.3. </a:t>
-            </a:r>
-            <a:r>
-              <a:rPr lang="pt-BR" sz="1800" dirty="0" err="1">
-                <a:latin typeface="Times New Roman" panose="02020603050405020304" pitchFamily="18" charset="0"/>
-                <a:cs typeface="Times New Roman" panose="02020603050405020304" pitchFamily="18" charset="0"/>
-              </a:rPr>
-              <a:t>Novatec</a:t>
-            </a:r>
-            <a:r>
-              <a:rPr lang="pt-BR" sz="1800" dirty="0">
-                <a:latin typeface="Times New Roman" panose="02020603050405020304" pitchFamily="18" charset="0"/>
-                <a:cs typeface="Times New Roman" panose="02020603050405020304" pitchFamily="18" charset="0"/>
-              </a:rPr>
-              <a:t> Editora, 2014.</a:t>
-            </a:r>
-          </a:p>
-          <a:p>
-            <a:pPr marL="0" indent="0" algn="just">
-              <a:buNone/>
-            </a:pPr>
-            <a:endParaRPr lang="pt-BR" sz="1800" dirty="0">
+              <a:rPr lang="pt-BR" sz="2000" b="1" dirty="0">
+                <a:latin typeface="Times New Roman" panose="02020603050405020304" pitchFamily="18" charset="0"/>
+                <a:cs typeface="Times New Roman" panose="02020603050405020304" pitchFamily="18" charset="0"/>
+              </a:rPr>
+              <a:t>print</a:t>
+            </a:r>
+            <a:r>
+              <a:rPr lang="pt-BR" sz="2000" dirty="0">
+                <a:latin typeface="Times New Roman" panose="02020603050405020304" pitchFamily="18" charset="0"/>
+                <a:cs typeface="Times New Roman" panose="02020603050405020304" pitchFamily="18" charset="0"/>
+              </a:rPr>
+              <a:t>(“Inserido com sucesso”</a:t>
+            </a:r>
+            <a:endParaRPr lang="pt-BR" sz="2000" dirty="0">
+              <a:solidFill>
+                <a:schemeClr val="tx1"/>
+              </a:solidFill>
               <a:latin typeface="Times New Roman" panose="02020603050405020304" pitchFamily="18" charset="0"/>
               <a:cs typeface="Times New Roman" panose="02020603050405020304" pitchFamily="18" charset="0"/>
             </a:endParaRPr>
@@ -6096,7 +8961,7 @@
     </p:spTree>
     <p:extLst>
       <p:ext uri="{BB962C8B-B14F-4D97-AF65-F5344CB8AC3E}">
-        <p14:creationId xmlns:p14="http://schemas.microsoft.com/office/powerpoint/2010/main" val="1115311843"/>
+        <p14:creationId xmlns:p14="http://schemas.microsoft.com/office/powerpoint/2010/main" val="3817461576"/>
       </p:ext>
     </p:extLst>
   </p:cSld>
@@ -6124,107 +8989,54 @@
           <a:chExt cx="0" cy="0"/>
         </a:xfrm>
       </p:grpSpPr>
-      <p:pic>
-        <p:nvPicPr>
-          <p:cNvPr id="112" name="Picture 6" descr="Picture 6"/>
-          <p:cNvPicPr>
-            <a:picLocks noChangeAspect="1"/>
-          </p:cNvPicPr>
-          <p:nvPr/>
-        </p:nvPicPr>
-        <p:blipFill>
-          <a:blip r:embed="rId2"/>
-          <a:stretch>
-            <a:fillRect/>
-          </a:stretch>
-        </p:blipFill>
+      <p:sp>
+        <p:nvSpPr>
+          <p:cNvPr id="6" name="Title 1"/>
+          <p:cNvSpPr>
+            <a:spLocks noGrp="1"/>
+          </p:cNvSpPr>
+          <p:nvPr>
+            <p:ph type="title"/>
+          </p:nvPr>
+        </p:nvSpPr>
         <p:spPr>
           <a:xfrm>
-            <a:off x="0" y="0"/>
-            <a:ext cx="9144000" cy="5143500"/>
+            <a:off x="237995" y="265188"/>
+            <a:ext cx="8763140" cy="596760"/>
           </a:xfrm>
-          <a:prstGeom prst="rect">
-            <a:avLst/>
-          </a:prstGeom>
-          <a:ln w="12700">
-            <a:miter lim="400000"/>
-            <a:headEnd/>
-            <a:tailEnd/>
-          </a:ln>
         </p:spPr>
-      </p:pic>
-      <p:pic>
-        <p:nvPicPr>
-          <p:cNvPr id="114" name="Picture 5" descr="Picture 5"/>
-          <p:cNvPicPr>
-            <a:picLocks noChangeAspect="1"/>
-          </p:cNvPicPr>
-          <p:nvPr/>
-        </p:nvPicPr>
-        <p:blipFill>
-          <a:blip r:embed="rId3"/>
-          <a:stretch>
-            <a:fillRect/>
-          </a:stretch>
-        </p:blipFill>
+        <p:txBody>
+          <a:bodyPr>
+            <a:normAutofit/>
+          </a:bodyPr>
+          <a:lstStyle/>
+          <a:p>
+            <a:pPr algn="ctr"/>
+            <a:r>
+              <a:rPr lang="en-US" b="1" dirty="0">
+                <a:solidFill>
+                  <a:srgbClr val="0070C0"/>
+                </a:solidFill>
+              </a:rPr>
+              <a:t>Python – BANCO DE DADOS – CRUD UPDATE</a:t>
+            </a:r>
+          </a:p>
+        </p:txBody>
+      </p:sp>
+      <p:sp>
+        <p:nvSpPr>
+          <p:cNvPr id="8" name="Text Placeholder 2"/>
+          <p:cNvSpPr>
+            <a:spLocks noGrp="1"/>
+          </p:cNvSpPr>
+          <p:nvPr>
+            <p:ph type="body" sz="half" idx="1"/>
+          </p:nvPr>
+        </p:nvSpPr>
         <p:spPr>
           <a:xfrm>
-            <a:off x="469900" y="0"/>
-            <a:ext cx="4391984" cy="171450"/>
-          </a:xfrm>
-          <a:prstGeom prst="rect">
-            <a:avLst/>
-          </a:prstGeom>
-          <a:ln w="12700">
-            <a:miter lim="400000"/>
-            <a:headEnd/>
-            <a:tailEnd/>
-          </a:ln>
-        </p:spPr>
-      </p:pic>
-      <p:pic>
-        <p:nvPicPr>
-          <p:cNvPr id="115" name="Imagem" descr="Imagem"/>
-          <p:cNvPicPr>
-            <a:picLocks noChangeAspect="1"/>
-          </p:cNvPicPr>
-          <p:nvPr/>
-        </p:nvPicPr>
-        <p:blipFill>
-          <a:blip r:embed="rId4"/>
-          <a:stretch>
-            <a:fillRect/>
-          </a:stretch>
-        </p:blipFill>
-        <p:spPr>
-          <a:xfrm>
-            <a:off x="823046" y="300823"/>
-            <a:ext cx="3685692" cy="1189055"/>
-          </a:xfrm>
-          <a:prstGeom prst="rect">
-            <a:avLst/>
-          </a:prstGeom>
-          <a:ln w="12700">
-            <a:miter lim="400000"/>
-            <a:headEnd/>
-            <a:tailEnd/>
-          </a:ln>
-        </p:spPr>
-      </p:pic>
-      <p:sp>
-        <p:nvSpPr>
-          <p:cNvPr id="3" name="Título 2"/>
-          <p:cNvSpPr>
-            <a:spLocks noGrp="1"/>
-          </p:cNvSpPr>
-          <p:nvPr>
-            <p:ph type="ctrTitle"/>
-          </p:nvPr>
-        </p:nvSpPr>
-        <p:spPr>
-          <a:xfrm>
-            <a:off x="285751" y="2386770"/>
-            <a:ext cx="8615364" cy="1102519"/>
+            <a:off x="142865" y="836895"/>
+            <a:ext cx="8865056" cy="4160989"/>
           </a:xfrm>
         </p:spPr>
         <p:txBody>
@@ -6233,327 +9045,640 @@
           </a:bodyPr>
           <a:lstStyle/>
           <a:p>
-            <a:r>
-              <a:rPr lang="pt-BR" sz="4800" b="1" dirty="0">
-                <a:solidFill>
-                  <a:schemeClr val="bg1"/>
-                </a:solidFill>
-              </a:rPr>
-              <a:t>Programação Python</a:t>
-            </a:r>
+            <a:pPr marL="0" indent="0" algn="just">
+              <a:buNone/>
+            </a:pPr>
+            <a:r>
+              <a:rPr lang="pt-BR" sz="2000" dirty="0">
+                <a:solidFill>
+                  <a:schemeClr val="tx1"/>
+                </a:solidFill>
+                <a:latin typeface="Times New Roman" panose="02020603050405020304" pitchFamily="18" charset="0"/>
+                <a:cs typeface="Times New Roman" panose="02020603050405020304" pitchFamily="18" charset="0"/>
+              </a:rPr>
+              <a:t>cursor = </a:t>
+            </a:r>
+            <a:r>
+              <a:rPr lang="pt-BR" sz="2000" dirty="0" err="1">
+                <a:solidFill>
+                  <a:schemeClr val="tx1"/>
+                </a:solidFill>
+                <a:latin typeface="Times New Roman" panose="02020603050405020304" pitchFamily="18" charset="0"/>
+                <a:cs typeface="Times New Roman" panose="02020603050405020304" pitchFamily="18" charset="0"/>
+              </a:rPr>
+              <a:t>conn.</a:t>
+            </a:r>
+            <a:r>
+              <a:rPr lang="pt-BR" sz="2000" b="1" dirty="0" err="1">
+                <a:solidFill>
+                  <a:srgbClr val="FF0000"/>
+                </a:solidFill>
+                <a:latin typeface="Times New Roman" panose="02020603050405020304" pitchFamily="18" charset="0"/>
+                <a:cs typeface="Times New Roman" panose="02020603050405020304" pitchFamily="18" charset="0"/>
+              </a:rPr>
+              <a:t>cursor</a:t>
+            </a:r>
+            <a:r>
+              <a:rPr lang="pt-BR" sz="2000" dirty="0">
+                <a:solidFill>
+                  <a:schemeClr val="tx1"/>
+                </a:solidFill>
+                <a:latin typeface="Times New Roman" panose="02020603050405020304" pitchFamily="18" charset="0"/>
+                <a:cs typeface="Times New Roman" panose="02020603050405020304" pitchFamily="18" charset="0"/>
+              </a:rPr>
+              <a:t>()</a:t>
+            </a:r>
+          </a:p>
+          <a:p>
+            <a:pPr marL="0" indent="0" algn="just">
+              <a:buNone/>
+            </a:pPr>
+            <a:r>
+              <a:rPr lang="pt-BR" sz="2000" dirty="0">
+                <a:latin typeface="Times New Roman" panose="02020603050405020304" pitchFamily="18" charset="0"/>
+                <a:cs typeface="Times New Roman" panose="02020603050405020304" pitchFamily="18" charset="0"/>
+              </a:rPr>
+              <a:t>id = 63</a:t>
+            </a:r>
+            <a:endParaRPr lang="pt-BR" sz="2000" dirty="0">
+              <a:solidFill>
+                <a:schemeClr val="tx1"/>
+              </a:solidFill>
+              <a:latin typeface="Times New Roman" panose="02020603050405020304" pitchFamily="18" charset="0"/>
+              <a:cs typeface="Times New Roman" panose="02020603050405020304" pitchFamily="18" charset="0"/>
+            </a:endParaRPr>
+          </a:p>
+          <a:p>
+            <a:pPr marL="0" indent="0" algn="just">
+              <a:buNone/>
+            </a:pPr>
+            <a:r>
+              <a:rPr lang="pt-BR" sz="2000" dirty="0">
+                <a:latin typeface="Times New Roman" panose="02020603050405020304" pitchFamily="18" charset="0"/>
+                <a:cs typeface="Times New Roman" panose="02020603050405020304" pitchFamily="18" charset="0"/>
+              </a:rPr>
+              <a:t>nome = "recursos humanos"</a:t>
+            </a:r>
+          </a:p>
+          <a:p>
+            <a:pPr marL="0" indent="0" algn="just">
+              <a:buNone/>
+            </a:pPr>
+            <a:r>
+              <a:rPr lang="pt-BR" sz="2000" dirty="0" err="1">
+                <a:latin typeface="Times New Roman" panose="02020603050405020304" pitchFamily="18" charset="0"/>
+                <a:cs typeface="Times New Roman" panose="02020603050405020304" pitchFamily="18" charset="0"/>
+              </a:rPr>
+              <a:t>sql</a:t>
+            </a:r>
+            <a:r>
+              <a:rPr lang="pt-BR" sz="2000" dirty="0">
+                <a:latin typeface="Times New Roman" panose="02020603050405020304" pitchFamily="18" charset="0"/>
+                <a:cs typeface="Times New Roman" panose="02020603050405020304" pitchFamily="18" charset="0"/>
+              </a:rPr>
+              <a:t> = </a:t>
+            </a:r>
+            <a:r>
+              <a:rPr lang="pt-BR" sz="2000" b="1" dirty="0" err="1">
+                <a:solidFill>
+                  <a:srgbClr val="FF0000"/>
+                </a:solidFill>
+                <a:latin typeface="Times New Roman" panose="02020603050405020304" pitchFamily="18" charset="0"/>
+                <a:cs typeface="Times New Roman" panose="02020603050405020304" pitchFamily="18" charset="0"/>
+              </a:rPr>
+              <a:t>f</a:t>
+            </a:r>
+            <a:r>
+              <a:rPr lang="pt-BR" sz="2000" dirty="0" err="1">
+                <a:latin typeface="Times New Roman" panose="02020603050405020304" pitchFamily="18" charset="0"/>
+                <a:cs typeface="Times New Roman" panose="02020603050405020304" pitchFamily="18" charset="0"/>
+              </a:rPr>
+              <a:t>"</a:t>
+            </a:r>
+            <a:r>
+              <a:rPr lang="pt-BR" sz="2000" b="1" dirty="0" err="1">
+                <a:latin typeface="Times New Roman" panose="02020603050405020304" pitchFamily="18" charset="0"/>
+                <a:cs typeface="Times New Roman" panose="02020603050405020304" pitchFamily="18" charset="0"/>
+              </a:rPr>
+              <a:t>update</a:t>
+            </a:r>
+            <a:r>
+              <a:rPr lang="pt-BR" sz="2000" dirty="0">
+                <a:latin typeface="Times New Roman" panose="02020603050405020304" pitchFamily="18" charset="0"/>
+                <a:cs typeface="Times New Roman" panose="02020603050405020304" pitchFamily="18" charset="0"/>
+              </a:rPr>
+              <a:t> </a:t>
+            </a:r>
+            <a:r>
+              <a:rPr lang="pt-BR" sz="2000" dirty="0" err="1">
+                <a:latin typeface="Times New Roman" panose="02020603050405020304" pitchFamily="18" charset="0"/>
+                <a:cs typeface="Times New Roman" panose="02020603050405020304" pitchFamily="18" charset="0"/>
+              </a:rPr>
+              <a:t>department</a:t>
+            </a:r>
+            <a:r>
+              <a:rPr lang="pt-BR" sz="2000" dirty="0">
+                <a:latin typeface="Times New Roman" panose="02020603050405020304" pitchFamily="18" charset="0"/>
+                <a:cs typeface="Times New Roman" panose="02020603050405020304" pitchFamily="18" charset="0"/>
+              </a:rPr>
+              <a:t> </a:t>
+            </a:r>
+            <a:r>
+              <a:rPr lang="pt-BR" sz="2000" b="1" dirty="0">
+                <a:latin typeface="Times New Roman" panose="02020603050405020304" pitchFamily="18" charset="0"/>
+                <a:cs typeface="Times New Roman" panose="02020603050405020304" pitchFamily="18" charset="0"/>
+              </a:rPr>
+              <a:t>set</a:t>
+            </a:r>
+            <a:r>
+              <a:rPr lang="pt-BR" sz="2000" dirty="0">
+                <a:latin typeface="Times New Roman" panose="02020603050405020304" pitchFamily="18" charset="0"/>
+                <a:cs typeface="Times New Roman" panose="02020603050405020304" pitchFamily="18" charset="0"/>
+              </a:rPr>
+              <a:t> </a:t>
+            </a:r>
+            <a:r>
+              <a:rPr lang="pt-BR" sz="2000" dirty="0" err="1">
+                <a:latin typeface="Times New Roman" panose="02020603050405020304" pitchFamily="18" charset="0"/>
+                <a:cs typeface="Times New Roman" panose="02020603050405020304" pitchFamily="18" charset="0"/>
+              </a:rPr>
+              <a:t>Name</a:t>
+            </a:r>
+            <a:r>
+              <a:rPr lang="pt-BR" sz="2000" dirty="0">
+                <a:latin typeface="Times New Roman" panose="02020603050405020304" pitchFamily="18" charset="0"/>
+                <a:cs typeface="Times New Roman" panose="02020603050405020304" pitchFamily="18" charset="0"/>
+              </a:rPr>
+              <a:t> = '{nome}' </a:t>
+            </a:r>
+            <a:r>
+              <a:rPr lang="pt-BR" sz="2000" b="1" dirty="0" err="1">
+                <a:latin typeface="Times New Roman" panose="02020603050405020304" pitchFamily="18" charset="0"/>
+                <a:cs typeface="Times New Roman" panose="02020603050405020304" pitchFamily="18" charset="0"/>
+              </a:rPr>
+              <a:t>where</a:t>
+            </a:r>
+            <a:r>
+              <a:rPr lang="pt-BR" sz="2000" dirty="0">
+                <a:latin typeface="Times New Roman" panose="02020603050405020304" pitchFamily="18" charset="0"/>
+                <a:cs typeface="Times New Roman" panose="02020603050405020304" pitchFamily="18" charset="0"/>
+              </a:rPr>
+              <a:t> Id = {id}"</a:t>
+            </a:r>
+          </a:p>
+          <a:p>
+            <a:pPr marL="0" indent="0" algn="just">
+              <a:buNone/>
+            </a:pPr>
+            <a:r>
+              <a:rPr lang="pt-BR" sz="2000" dirty="0" err="1">
+                <a:latin typeface="Times New Roman" panose="02020603050405020304" pitchFamily="18" charset="0"/>
+                <a:cs typeface="Times New Roman" panose="02020603050405020304" pitchFamily="18" charset="0"/>
+              </a:rPr>
+              <a:t>cursor.</a:t>
+            </a:r>
+            <a:r>
+              <a:rPr lang="pt-BR" sz="2000" b="1" dirty="0" err="1">
+                <a:solidFill>
+                  <a:srgbClr val="FF0000"/>
+                </a:solidFill>
+                <a:latin typeface="Times New Roman" panose="02020603050405020304" pitchFamily="18" charset="0"/>
+                <a:cs typeface="Times New Roman" panose="02020603050405020304" pitchFamily="18" charset="0"/>
+              </a:rPr>
+              <a:t>execute</a:t>
+            </a:r>
+            <a:r>
+              <a:rPr lang="pt-BR" sz="2000" dirty="0">
+                <a:latin typeface="Times New Roman" panose="02020603050405020304" pitchFamily="18" charset="0"/>
+                <a:cs typeface="Times New Roman" panose="02020603050405020304" pitchFamily="18" charset="0"/>
+              </a:rPr>
+              <a:t>(</a:t>
+            </a:r>
+            <a:r>
+              <a:rPr lang="pt-BR" sz="2000" dirty="0" err="1">
+                <a:latin typeface="Times New Roman" panose="02020603050405020304" pitchFamily="18" charset="0"/>
+                <a:cs typeface="Times New Roman" panose="02020603050405020304" pitchFamily="18" charset="0"/>
+              </a:rPr>
+              <a:t>sql</a:t>
+            </a:r>
+            <a:r>
+              <a:rPr lang="pt-BR" sz="2000" dirty="0">
+                <a:latin typeface="Times New Roman" panose="02020603050405020304" pitchFamily="18" charset="0"/>
+                <a:cs typeface="Times New Roman" panose="02020603050405020304" pitchFamily="18" charset="0"/>
+              </a:rPr>
+              <a:t>)</a:t>
+            </a:r>
+          </a:p>
+          <a:p>
+            <a:pPr marL="0" indent="0" algn="just">
+              <a:buNone/>
+            </a:pPr>
+            <a:r>
+              <a:rPr lang="pt-BR" sz="2000" dirty="0" err="1">
+                <a:latin typeface="Times New Roman" panose="02020603050405020304" pitchFamily="18" charset="0"/>
+                <a:cs typeface="Times New Roman" panose="02020603050405020304" pitchFamily="18" charset="0"/>
+              </a:rPr>
+              <a:t>conn.</a:t>
+            </a:r>
+            <a:r>
+              <a:rPr lang="pt-BR" sz="2000" b="1" dirty="0" err="1">
+                <a:solidFill>
+                  <a:srgbClr val="FF0000"/>
+                </a:solidFill>
+                <a:latin typeface="Times New Roman" panose="02020603050405020304" pitchFamily="18" charset="0"/>
+                <a:cs typeface="Times New Roman" panose="02020603050405020304" pitchFamily="18" charset="0"/>
+              </a:rPr>
+              <a:t>commit</a:t>
+            </a:r>
+            <a:r>
+              <a:rPr lang="pt-BR" sz="2000" dirty="0">
+                <a:latin typeface="Times New Roman" panose="02020603050405020304" pitchFamily="18" charset="0"/>
+                <a:cs typeface="Times New Roman" panose="02020603050405020304" pitchFamily="18" charset="0"/>
+              </a:rPr>
+              <a:t>()</a:t>
+            </a:r>
+          </a:p>
+          <a:p>
+            <a:pPr marL="0" indent="0" algn="just">
+              <a:buNone/>
+            </a:pPr>
+            <a:r>
+              <a:rPr lang="pt-BR" sz="2000" b="1" dirty="0">
+                <a:latin typeface="Times New Roman" panose="02020603050405020304" pitchFamily="18" charset="0"/>
+                <a:cs typeface="Times New Roman" panose="02020603050405020304" pitchFamily="18" charset="0"/>
+              </a:rPr>
+              <a:t>print</a:t>
+            </a:r>
+            <a:r>
+              <a:rPr lang="pt-BR" sz="2000" dirty="0">
+                <a:latin typeface="Times New Roman" panose="02020603050405020304" pitchFamily="18" charset="0"/>
+                <a:cs typeface="Times New Roman" panose="02020603050405020304" pitchFamily="18" charset="0"/>
+              </a:rPr>
+              <a:t>("Atualizado com sucesso")</a:t>
+            </a:r>
+            <a:endParaRPr lang="pt-BR" sz="2000" dirty="0">
+              <a:solidFill>
+                <a:schemeClr val="tx1"/>
+              </a:solidFill>
+              <a:latin typeface="Times New Roman" panose="02020603050405020304" pitchFamily="18" charset="0"/>
+              <a:cs typeface="Times New Roman" panose="02020603050405020304" pitchFamily="18" charset="0"/>
+            </a:endParaRPr>
           </a:p>
         </p:txBody>
       </p:sp>
-      <p:sp>
-        <p:nvSpPr>
-          <p:cNvPr id="6" name="Título 2"/>
-          <p:cNvSpPr txBox="1"/>
-          <p:nvPr/>
-        </p:nvSpPr>
-        <p:spPr>
-          <a:xfrm>
-            <a:off x="975683" y="3866663"/>
-            <a:ext cx="7772400" cy="1102519"/>
-          </a:xfrm>
-          <a:prstGeom prst="rect">
-            <a:avLst/>
-          </a:prstGeom>
-          <a:ln w="12700">
-            <a:miter lim="400000"/>
-          </a:ln>
-        </p:spPr>
-        <p:txBody>
-          <a:bodyPr lIns="45718" tIns="45718" rIns="45718" bIns="45718" anchor="ctr">
-            <a:noAutofit/>
-          </a:bodyPr>
-          <a:lstStyle>
-            <a:lvl1pPr marL="0" marR="0" indent="0" algn="ctr" defTabSz="457200" rtl="0" latinLnBrk="0">
-              <a:lnSpc>
-                <a:spcPct val="100000"/>
-              </a:lnSpc>
-              <a:spcBef>
-                <a:spcPts val="0"/>
-              </a:spcBef>
-              <a:spcAft>
-                <a:spcPts val="0"/>
-              </a:spcAft>
-              <a:buClrTx/>
-              <a:buSzTx/>
-              <a:buFontTx/>
-              <a:buNone/>
-              <a:defRPr sz="4400" b="0" i="0" u="none" strike="noStrike" cap="none" spc="0" baseline="0">
-                <a:ln>
-                  <a:noFill/>
-                </a:ln>
-                <a:solidFill>
-                  <a:srgbClr val="000000"/>
-                </a:solidFill>
-                <a:uFillTx/>
-                <a:latin typeface="+mj-lt"/>
-                <a:ea typeface="+mj-ea"/>
-                <a:cs typeface="+mj-cs"/>
-                <a:sym typeface="Calibri"/>
-              </a:defRPr>
-            </a:lvl1pPr>
-            <a:lvl2pPr marL="0" marR="0" indent="0" algn="ctr" defTabSz="457200" rtl="0" latinLnBrk="0">
-              <a:lnSpc>
-                <a:spcPct val="100000"/>
-              </a:lnSpc>
-              <a:spcBef>
-                <a:spcPts val="0"/>
-              </a:spcBef>
-              <a:spcAft>
-                <a:spcPts val="0"/>
-              </a:spcAft>
-              <a:buClrTx/>
-              <a:buSzTx/>
-              <a:buFontTx/>
-              <a:buNone/>
-              <a:defRPr sz="4400" b="0" i="0" u="none" strike="noStrike" cap="none" spc="0" baseline="0">
-                <a:ln>
-                  <a:noFill/>
-                </a:ln>
-                <a:solidFill>
-                  <a:srgbClr val="000000"/>
-                </a:solidFill>
-                <a:uFillTx/>
-                <a:latin typeface="+mj-lt"/>
-                <a:ea typeface="+mj-ea"/>
-                <a:cs typeface="+mj-cs"/>
-                <a:sym typeface="Calibri"/>
-              </a:defRPr>
-            </a:lvl2pPr>
-            <a:lvl3pPr marL="0" marR="0" indent="0" algn="ctr" defTabSz="457200" rtl="0" latinLnBrk="0">
-              <a:lnSpc>
-                <a:spcPct val="100000"/>
-              </a:lnSpc>
-              <a:spcBef>
-                <a:spcPts val="0"/>
-              </a:spcBef>
-              <a:spcAft>
-                <a:spcPts val="0"/>
-              </a:spcAft>
-              <a:buClrTx/>
-              <a:buSzTx/>
-              <a:buFontTx/>
-              <a:buNone/>
-              <a:defRPr sz="4400" b="0" i="0" u="none" strike="noStrike" cap="none" spc="0" baseline="0">
-                <a:ln>
-                  <a:noFill/>
-                </a:ln>
-                <a:solidFill>
-                  <a:srgbClr val="000000"/>
-                </a:solidFill>
-                <a:uFillTx/>
-                <a:latin typeface="+mj-lt"/>
-                <a:ea typeface="+mj-ea"/>
-                <a:cs typeface="+mj-cs"/>
-                <a:sym typeface="Calibri"/>
-              </a:defRPr>
-            </a:lvl3pPr>
-            <a:lvl4pPr marL="0" marR="0" indent="0" algn="ctr" defTabSz="457200" rtl="0" latinLnBrk="0">
-              <a:lnSpc>
-                <a:spcPct val="100000"/>
-              </a:lnSpc>
-              <a:spcBef>
-                <a:spcPts val="0"/>
-              </a:spcBef>
-              <a:spcAft>
-                <a:spcPts val="0"/>
-              </a:spcAft>
-              <a:buClrTx/>
-              <a:buSzTx/>
-              <a:buFontTx/>
-              <a:buNone/>
-              <a:defRPr sz="4400" b="0" i="0" u="none" strike="noStrike" cap="none" spc="0" baseline="0">
-                <a:ln>
-                  <a:noFill/>
-                </a:ln>
-                <a:solidFill>
-                  <a:srgbClr val="000000"/>
-                </a:solidFill>
-                <a:uFillTx/>
-                <a:latin typeface="+mj-lt"/>
-                <a:ea typeface="+mj-ea"/>
-                <a:cs typeface="+mj-cs"/>
-                <a:sym typeface="Calibri"/>
-              </a:defRPr>
-            </a:lvl4pPr>
-            <a:lvl5pPr marL="0" marR="0" indent="0" algn="ctr" defTabSz="457200" rtl="0" latinLnBrk="0">
-              <a:lnSpc>
-                <a:spcPct val="100000"/>
-              </a:lnSpc>
-              <a:spcBef>
-                <a:spcPts val="0"/>
-              </a:spcBef>
-              <a:spcAft>
-                <a:spcPts val="0"/>
-              </a:spcAft>
-              <a:buClrTx/>
-              <a:buSzTx/>
-              <a:buFontTx/>
-              <a:buNone/>
-              <a:defRPr sz="4400" b="0" i="0" u="none" strike="noStrike" cap="none" spc="0" baseline="0">
-                <a:ln>
-                  <a:noFill/>
-                </a:ln>
-                <a:solidFill>
-                  <a:srgbClr val="000000"/>
-                </a:solidFill>
-                <a:uFillTx/>
-                <a:latin typeface="+mj-lt"/>
-                <a:ea typeface="+mj-ea"/>
-                <a:cs typeface="+mj-cs"/>
-                <a:sym typeface="Calibri"/>
-              </a:defRPr>
-            </a:lvl5pPr>
-            <a:lvl6pPr marL="0" marR="0" indent="0" algn="ctr" defTabSz="457200" rtl="0" latinLnBrk="0">
-              <a:lnSpc>
-                <a:spcPct val="100000"/>
-              </a:lnSpc>
-              <a:spcBef>
-                <a:spcPts val="0"/>
-              </a:spcBef>
-              <a:spcAft>
-                <a:spcPts val="0"/>
-              </a:spcAft>
-              <a:buClrTx/>
-              <a:buSzTx/>
-              <a:buFontTx/>
-              <a:buNone/>
-              <a:defRPr sz="4400" b="0" i="0" u="none" strike="noStrike" cap="none" spc="0" baseline="0">
-                <a:ln>
-                  <a:noFill/>
-                </a:ln>
-                <a:solidFill>
-                  <a:srgbClr val="000000"/>
-                </a:solidFill>
-                <a:uFillTx/>
-                <a:latin typeface="+mj-lt"/>
-                <a:ea typeface="+mj-ea"/>
-                <a:cs typeface="+mj-cs"/>
-                <a:sym typeface="Calibri"/>
-              </a:defRPr>
-            </a:lvl6pPr>
-            <a:lvl7pPr marL="0" marR="0" indent="0" algn="ctr" defTabSz="457200" rtl="0" latinLnBrk="0">
-              <a:lnSpc>
-                <a:spcPct val="100000"/>
-              </a:lnSpc>
-              <a:spcBef>
-                <a:spcPts val="0"/>
-              </a:spcBef>
-              <a:spcAft>
-                <a:spcPts val="0"/>
-              </a:spcAft>
-              <a:buClrTx/>
-              <a:buSzTx/>
-              <a:buFontTx/>
-              <a:buNone/>
-              <a:defRPr sz="4400" b="0" i="0" u="none" strike="noStrike" cap="none" spc="0" baseline="0">
-                <a:ln>
-                  <a:noFill/>
-                </a:ln>
-                <a:solidFill>
-                  <a:srgbClr val="000000"/>
-                </a:solidFill>
-                <a:uFillTx/>
-                <a:latin typeface="+mj-lt"/>
-                <a:ea typeface="+mj-ea"/>
-                <a:cs typeface="+mj-cs"/>
-                <a:sym typeface="Calibri"/>
-              </a:defRPr>
-            </a:lvl7pPr>
-            <a:lvl8pPr marL="0" marR="0" indent="0" algn="ctr" defTabSz="457200" rtl="0" latinLnBrk="0">
-              <a:lnSpc>
-                <a:spcPct val="100000"/>
-              </a:lnSpc>
-              <a:spcBef>
-                <a:spcPts val="0"/>
-              </a:spcBef>
-              <a:spcAft>
-                <a:spcPts val="0"/>
-              </a:spcAft>
-              <a:buClrTx/>
-              <a:buSzTx/>
-              <a:buFontTx/>
-              <a:buNone/>
-              <a:defRPr sz="4400" b="0" i="0" u="none" strike="noStrike" cap="none" spc="0" baseline="0">
-                <a:ln>
-                  <a:noFill/>
-                </a:ln>
-                <a:solidFill>
-                  <a:srgbClr val="000000"/>
-                </a:solidFill>
-                <a:uFillTx/>
-                <a:latin typeface="+mj-lt"/>
-                <a:ea typeface="+mj-ea"/>
-                <a:cs typeface="+mj-cs"/>
-                <a:sym typeface="Calibri"/>
-              </a:defRPr>
-            </a:lvl8pPr>
-            <a:lvl9pPr marL="0" marR="0" indent="0" algn="ctr" defTabSz="457200" rtl="0" latinLnBrk="0">
-              <a:lnSpc>
-                <a:spcPct val="100000"/>
-              </a:lnSpc>
-              <a:spcBef>
-                <a:spcPts val="0"/>
-              </a:spcBef>
-              <a:spcAft>
-                <a:spcPts val="0"/>
-              </a:spcAft>
-              <a:buClrTx/>
-              <a:buSzTx/>
-              <a:buFontTx/>
-              <a:buNone/>
-              <a:defRPr sz="4400" b="0" i="0" u="none" strike="noStrike" cap="none" spc="0" baseline="0">
-                <a:ln>
-                  <a:noFill/>
-                </a:ln>
-                <a:solidFill>
-                  <a:srgbClr val="000000"/>
-                </a:solidFill>
-                <a:uFillTx/>
-                <a:latin typeface="+mj-lt"/>
-                <a:ea typeface="+mj-ea"/>
-                <a:cs typeface="+mj-cs"/>
-                <a:sym typeface="Calibri"/>
-              </a:defRPr>
-            </a:lvl9pPr>
-          </a:lstStyle>
-          <a:p>
-            <a:pPr algn="r" hangingPunct="1"/>
-            <a:r>
-              <a:rPr lang="pt-BR" sz="2000" b="1" dirty="0">
-                <a:solidFill>
-                  <a:schemeClr val="bg1"/>
-                </a:solidFill>
-              </a:rPr>
-              <a:t>Professor </a:t>
-            </a:r>
-            <a:r>
-              <a:rPr lang="pt-BR" sz="2000" b="1">
-                <a:solidFill>
-                  <a:schemeClr val="bg1"/>
-                </a:solidFill>
-              </a:rPr>
-              <a:t>M.Sc</a:t>
-            </a:r>
-            <a:r>
-              <a:rPr lang="pt-BR" sz="2000" b="1" dirty="0">
-                <a:solidFill>
-                  <a:schemeClr val="bg1"/>
-                </a:solidFill>
-              </a:rPr>
-              <a:t>. Heleno Cardoso</a:t>
-            </a:r>
-          </a:p>
-        </p:txBody>
-      </p:sp>
     </p:spTree>
+    <p:extLst>
+      <p:ext uri="{BB962C8B-B14F-4D97-AF65-F5344CB8AC3E}">
+        <p14:creationId xmlns:p14="http://schemas.microsoft.com/office/powerpoint/2010/main" val="4197986306"/>
+      </p:ext>
+    </p:extLst>
   </p:cSld>
   <p:clrMapOvr>
     <a:masterClrMapping/>
   </p:clrMapOvr>
+  <p:transition spd="med"/>
+</p:sld>
+</file>
+
+<file path=ppt/slides/slide9.xml><?xml version="1.0" encoding="utf-8"?>
+<p:sld xmlns:a="http://schemas.openxmlformats.org/drawingml/2006/main" xmlns:r="http://schemas.openxmlformats.org/officeDocument/2006/relationships" xmlns:p="http://schemas.openxmlformats.org/presentationml/2006/main">
+  <p:cSld>
+    <p:spTree>
+      <p:nvGrpSpPr>
+        <p:cNvPr id="1" name=""/>
+        <p:cNvGrpSpPr/>
+        <p:nvPr/>
+      </p:nvGrpSpPr>
+      <p:grpSpPr>
+        <a:xfrm>
+          <a:off x="0" y="0"/>
+          <a:ext cx="0" cy="0"/>
+          <a:chOff x="0" y="0"/>
+          <a:chExt cx="0" cy="0"/>
+        </a:xfrm>
+      </p:grpSpPr>
+      <p:sp>
+        <p:nvSpPr>
+          <p:cNvPr id="6" name="Title 1"/>
+          <p:cNvSpPr>
+            <a:spLocks noGrp="1"/>
+          </p:cNvSpPr>
+          <p:nvPr>
+            <p:ph type="title"/>
+          </p:nvPr>
+        </p:nvSpPr>
+        <p:spPr>
+          <a:xfrm>
+            <a:off x="237995" y="265188"/>
+            <a:ext cx="8763140" cy="596760"/>
+          </a:xfrm>
+        </p:spPr>
+        <p:txBody>
+          <a:bodyPr>
+            <a:normAutofit/>
+          </a:bodyPr>
+          <a:lstStyle/>
+          <a:p>
+            <a:pPr algn="ctr"/>
+            <a:r>
+              <a:rPr lang="en-US" b="1" dirty="0">
+                <a:solidFill>
+                  <a:srgbClr val="0070C0"/>
+                </a:solidFill>
+              </a:rPr>
+              <a:t>Python – BANCO DE DADOS – CRUD DELETE</a:t>
+            </a:r>
+          </a:p>
+        </p:txBody>
+      </p:sp>
+      <p:sp>
+        <p:nvSpPr>
+          <p:cNvPr id="8" name="Text Placeholder 2"/>
+          <p:cNvSpPr>
+            <a:spLocks noGrp="1"/>
+          </p:cNvSpPr>
+          <p:nvPr>
+            <p:ph type="body" sz="half" idx="1"/>
+          </p:nvPr>
+        </p:nvSpPr>
+        <p:spPr>
+          <a:xfrm>
+            <a:off x="142865" y="836895"/>
+            <a:ext cx="8865056" cy="4160989"/>
+          </a:xfrm>
+        </p:spPr>
+        <p:txBody>
+          <a:bodyPr>
+            <a:noAutofit/>
+          </a:bodyPr>
+          <a:lstStyle/>
+          <a:p>
+            <a:pPr marL="0" indent="0" algn="just">
+              <a:buNone/>
+            </a:pPr>
+            <a:r>
+              <a:rPr lang="pt-BR" sz="2000" dirty="0">
+                <a:solidFill>
+                  <a:schemeClr val="tx1"/>
+                </a:solidFill>
+                <a:latin typeface="Times New Roman" panose="02020603050405020304" pitchFamily="18" charset="0"/>
+                <a:cs typeface="Times New Roman" panose="02020603050405020304" pitchFamily="18" charset="0"/>
+              </a:rPr>
+              <a:t>cursor = </a:t>
+            </a:r>
+            <a:r>
+              <a:rPr lang="pt-BR" sz="2000" dirty="0" err="1">
+                <a:solidFill>
+                  <a:schemeClr val="tx1"/>
+                </a:solidFill>
+                <a:latin typeface="Times New Roman" panose="02020603050405020304" pitchFamily="18" charset="0"/>
+                <a:cs typeface="Times New Roman" panose="02020603050405020304" pitchFamily="18" charset="0"/>
+              </a:rPr>
+              <a:t>conn.</a:t>
+            </a:r>
+            <a:r>
+              <a:rPr lang="pt-BR" sz="2000" b="1" dirty="0" err="1">
+                <a:solidFill>
+                  <a:srgbClr val="FF0000"/>
+                </a:solidFill>
+                <a:latin typeface="Times New Roman" panose="02020603050405020304" pitchFamily="18" charset="0"/>
+                <a:cs typeface="Times New Roman" panose="02020603050405020304" pitchFamily="18" charset="0"/>
+              </a:rPr>
+              <a:t>cursor</a:t>
+            </a:r>
+            <a:r>
+              <a:rPr lang="pt-BR" sz="2000" dirty="0">
+                <a:solidFill>
+                  <a:schemeClr val="tx1"/>
+                </a:solidFill>
+                <a:latin typeface="Times New Roman" panose="02020603050405020304" pitchFamily="18" charset="0"/>
+                <a:cs typeface="Times New Roman" panose="02020603050405020304" pitchFamily="18" charset="0"/>
+              </a:rPr>
+              <a:t>()</a:t>
+            </a:r>
+          </a:p>
+          <a:p>
+            <a:pPr marL="0" indent="0" algn="just">
+              <a:buNone/>
+            </a:pPr>
+            <a:r>
+              <a:rPr lang="pt-BR" sz="2000" dirty="0">
+                <a:latin typeface="Times New Roman" panose="02020603050405020304" pitchFamily="18" charset="0"/>
+                <a:cs typeface="Times New Roman" panose="02020603050405020304" pitchFamily="18" charset="0"/>
+              </a:rPr>
+              <a:t>id = 63</a:t>
+            </a:r>
+            <a:endParaRPr lang="pt-BR" sz="2000" dirty="0">
+              <a:solidFill>
+                <a:schemeClr val="tx1"/>
+              </a:solidFill>
+              <a:latin typeface="Times New Roman" panose="02020603050405020304" pitchFamily="18" charset="0"/>
+              <a:cs typeface="Times New Roman" panose="02020603050405020304" pitchFamily="18" charset="0"/>
+            </a:endParaRPr>
+          </a:p>
+          <a:p>
+            <a:pPr marL="0" indent="0" algn="just">
+              <a:buNone/>
+            </a:pPr>
+            <a:r>
+              <a:rPr lang="pt-BR" sz="2000" dirty="0" err="1">
+                <a:latin typeface="Times New Roman" panose="02020603050405020304" pitchFamily="18" charset="0"/>
+                <a:cs typeface="Times New Roman" panose="02020603050405020304" pitchFamily="18" charset="0"/>
+              </a:rPr>
+              <a:t>sql</a:t>
+            </a:r>
+            <a:r>
+              <a:rPr lang="pt-BR" sz="2000" dirty="0">
+                <a:latin typeface="Times New Roman" panose="02020603050405020304" pitchFamily="18" charset="0"/>
+                <a:cs typeface="Times New Roman" panose="02020603050405020304" pitchFamily="18" charset="0"/>
+              </a:rPr>
+              <a:t> = </a:t>
+            </a:r>
+            <a:r>
+              <a:rPr lang="pt-BR" sz="2000" b="1" dirty="0" err="1">
+                <a:solidFill>
+                  <a:srgbClr val="FF0000"/>
+                </a:solidFill>
+                <a:latin typeface="Times New Roman" panose="02020603050405020304" pitchFamily="18" charset="0"/>
+                <a:cs typeface="Times New Roman" panose="02020603050405020304" pitchFamily="18" charset="0"/>
+              </a:rPr>
+              <a:t>f</a:t>
+            </a:r>
+            <a:r>
+              <a:rPr lang="pt-BR" sz="2000" dirty="0" err="1">
+                <a:latin typeface="Times New Roman" panose="02020603050405020304" pitchFamily="18" charset="0"/>
+                <a:cs typeface="Times New Roman" panose="02020603050405020304" pitchFamily="18" charset="0"/>
+              </a:rPr>
+              <a:t>“</a:t>
+            </a:r>
+            <a:r>
+              <a:rPr lang="pt-BR" sz="2000" b="1" dirty="0" err="1">
+                <a:latin typeface="Times New Roman" panose="02020603050405020304" pitchFamily="18" charset="0"/>
+                <a:cs typeface="Times New Roman" panose="02020603050405020304" pitchFamily="18" charset="0"/>
+              </a:rPr>
+              <a:t>delete</a:t>
+            </a:r>
+            <a:r>
+              <a:rPr lang="pt-BR" sz="2000" dirty="0">
+                <a:latin typeface="Times New Roman" panose="02020603050405020304" pitchFamily="18" charset="0"/>
+                <a:cs typeface="Times New Roman" panose="02020603050405020304" pitchFamily="18" charset="0"/>
+              </a:rPr>
+              <a:t> </a:t>
+            </a:r>
+            <a:r>
+              <a:rPr lang="pt-BR" sz="2000" b="1" dirty="0" err="1">
+                <a:latin typeface="Times New Roman" panose="02020603050405020304" pitchFamily="18" charset="0"/>
+                <a:cs typeface="Times New Roman" panose="02020603050405020304" pitchFamily="18" charset="0"/>
+              </a:rPr>
+              <a:t>from</a:t>
+            </a:r>
+            <a:r>
+              <a:rPr lang="pt-BR" sz="2000" b="1" dirty="0">
+                <a:latin typeface="Times New Roman" panose="02020603050405020304" pitchFamily="18" charset="0"/>
+                <a:cs typeface="Times New Roman" panose="02020603050405020304" pitchFamily="18" charset="0"/>
+              </a:rPr>
+              <a:t> </a:t>
+            </a:r>
+            <a:r>
+              <a:rPr lang="pt-BR" sz="2000" dirty="0" err="1">
+                <a:latin typeface="Times New Roman" panose="02020603050405020304" pitchFamily="18" charset="0"/>
+                <a:cs typeface="Times New Roman" panose="02020603050405020304" pitchFamily="18" charset="0"/>
+              </a:rPr>
+              <a:t>department</a:t>
+            </a:r>
+            <a:r>
+              <a:rPr lang="pt-BR" sz="2000" dirty="0">
+                <a:latin typeface="Times New Roman" panose="02020603050405020304" pitchFamily="18" charset="0"/>
+                <a:cs typeface="Times New Roman" panose="02020603050405020304" pitchFamily="18" charset="0"/>
+              </a:rPr>
+              <a:t> </a:t>
+            </a:r>
+            <a:r>
+              <a:rPr lang="pt-BR" sz="2000" b="1" dirty="0" err="1">
+                <a:latin typeface="Times New Roman" panose="02020603050405020304" pitchFamily="18" charset="0"/>
+                <a:cs typeface="Times New Roman" panose="02020603050405020304" pitchFamily="18" charset="0"/>
+              </a:rPr>
+              <a:t>where</a:t>
+            </a:r>
+            <a:r>
+              <a:rPr lang="pt-BR" sz="2000" dirty="0">
+                <a:latin typeface="Times New Roman" panose="02020603050405020304" pitchFamily="18" charset="0"/>
+                <a:cs typeface="Times New Roman" panose="02020603050405020304" pitchFamily="18" charset="0"/>
+              </a:rPr>
+              <a:t> Id = {id}"</a:t>
+            </a:r>
+          </a:p>
+          <a:p>
+            <a:pPr marL="0" indent="0" algn="just">
+              <a:buNone/>
+            </a:pPr>
+            <a:r>
+              <a:rPr lang="pt-BR" sz="2000" dirty="0" err="1">
+                <a:latin typeface="Times New Roman" panose="02020603050405020304" pitchFamily="18" charset="0"/>
+                <a:cs typeface="Times New Roman" panose="02020603050405020304" pitchFamily="18" charset="0"/>
+              </a:rPr>
+              <a:t>cursor.</a:t>
+            </a:r>
+            <a:r>
+              <a:rPr lang="pt-BR" sz="2000" b="1" dirty="0" err="1">
+                <a:solidFill>
+                  <a:srgbClr val="FF0000"/>
+                </a:solidFill>
+                <a:latin typeface="Times New Roman" panose="02020603050405020304" pitchFamily="18" charset="0"/>
+                <a:cs typeface="Times New Roman" panose="02020603050405020304" pitchFamily="18" charset="0"/>
+              </a:rPr>
+              <a:t>execute</a:t>
+            </a:r>
+            <a:r>
+              <a:rPr lang="pt-BR" sz="2000" dirty="0">
+                <a:latin typeface="Times New Roman" panose="02020603050405020304" pitchFamily="18" charset="0"/>
+                <a:cs typeface="Times New Roman" panose="02020603050405020304" pitchFamily="18" charset="0"/>
+              </a:rPr>
+              <a:t>(</a:t>
+            </a:r>
+            <a:r>
+              <a:rPr lang="pt-BR" sz="2000" dirty="0" err="1">
+                <a:latin typeface="Times New Roman" panose="02020603050405020304" pitchFamily="18" charset="0"/>
+                <a:cs typeface="Times New Roman" panose="02020603050405020304" pitchFamily="18" charset="0"/>
+              </a:rPr>
+              <a:t>sql</a:t>
+            </a:r>
+            <a:r>
+              <a:rPr lang="pt-BR" sz="2000" dirty="0">
+                <a:latin typeface="Times New Roman" panose="02020603050405020304" pitchFamily="18" charset="0"/>
+                <a:cs typeface="Times New Roman" panose="02020603050405020304" pitchFamily="18" charset="0"/>
+              </a:rPr>
+              <a:t>)</a:t>
+            </a:r>
+          </a:p>
+          <a:p>
+            <a:pPr marL="0" indent="0" algn="just">
+              <a:buNone/>
+            </a:pPr>
+            <a:r>
+              <a:rPr lang="pt-BR" sz="2000" dirty="0" err="1">
+                <a:latin typeface="Times New Roman" panose="02020603050405020304" pitchFamily="18" charset="0"/>
+                <a:cs typeface="Times New Roman" panose="02020603050405020304" pitchFamily="18" charset="0"/>
+              </a:rPr>
+              <a:t>conn.</a:t>
+            </a:r>
+            <a:r>
+              <a:rPr lang="pt-BR" sz="2000" b="1" dirty="0" err="1">
+                <a:solidFill>
+                  <a:srgbClr val="FF0000"/>
+                </a:solidFill>
+                <a:latin typeface="Times New Roman" panose="02020603050405020304" pitchFamily="18" charset="0"/>
+                <a:cs typeface="Times New Roman" panose="02020603050405020304" pitchFamily="18" charset="0"/>
+              </a:rPr>
+              <a:t>commit</a:t>
+            </a:r>
+            <a:r>
+              <a:rPr lang="pt-BR" sz="2000" dirty="0">
+                <a:latin typeface="Times New Roman" panose="02020603050405020304" pitchFamily="18" charset="0"/>
+                <a:cs typeface="Times New Roman" panose="02020603050405020304" pitchFamily="18" charset="0"/>
+              </a:rPr>
+              <a:t>()</a:t>
+            </a:r>
+          </a:p>
+          <a:p>
+            <a:pPr marL="0" indent="0" algn="just">
+              <a:buNone/>
+            </a:pPr>
+            <a:r>
+              <a:rPr lang="pt-BR" sz="2000" b="1" dirty="0">
+                <a:latin typeface="Times New Roman" panose="02020603050405020304" pitchFamily="18" charset="0"/>
+                <a:cs typeface="Times New Roman" panose="02020603050405020304" pitchFamily="18" charset="0"/>
+              </a:rPr>
+              <a:t>print</a:t>
+            </a:r>
+            <a:r>
+              <a:rPr lang="pt-BR" sz="2000" dirty="0">
+                <a:latin typeface="Times New Roman" panose="02020603050405020304" pitchFamily="18" charset="0"/>
+                <a:cs typeface="Times New Roman" panose="02020603050405020304" pitchFamily="18" charset="0"/>
+              </a:rPr>
+              <a:t>(“Excluído com sucesso")</a:t>
+            </a:r>
+            <a:endParaRPr lang="pt-BR" sz="2000" dirty="0">
+              <a:solidFill>
+                <a:schemeClr val="tx1"/>
+              </a:solidFill>
+              <a:latin typeface="Times New Roman" panose="02020603050405020304" pitchFamily="18" charset="0"/>
+              <a:cs typeface="Times New Roman" panose="02020603050405020304" pitchFamily="18" charset="0"/>
+            </a:endParaRPr>
+          </a:p>
+        </p:txBody>
+      </p:sp>
+    </p:spTree>
+    <p:extLst>
+      <p:ext uri="{BB962C8B-B14F-4D97-AF65-F5344CB8AC3E}">
+        <p14:creationId xmlns:p14="http://schemas.microsoft.com/office/powerpoint/2010/main" val="4223033648"/>
+      </p:ext>
+    </p:extLst>
+  </p:cSld>
+  <p:clrMapOvr>
+    <a:masterClrMapping/>
+  </p:clrMapOvr>
+  <p:transition spd="med"/>
 </p:sld>
 </file>
 

</xml_diff>